<commit_message>
homa 수정, 이미지 추가(php, sql)
</commit_message>
<xml_diff>
--- a/include_home_img.pptx
+++ b/include_home_img.pptx
@@ -5,11 +5,12 @@
     <p:sldMasterId id="2147483648" r:id="rId1"/>
   </p:sldMasterIdLst>
   <p:notesMasterIdLst>
-    <p:notesMasterId r:id="rId4"/>
+    <p:notesMasterId r:id="rId5"/>
   </p:notesMasterIdLst>
   <p:sldIdLst>
     <p:sldId id="256" r:id="rId2"/>
     <p:sldId id="257" r:id="rId3"/>
+    <p:sldId id="258" r:id="rId4"/>
   </p:sldIdLst>
   <p:sldSz cx="12192000" cy="6858000"/>
   <p:notesSz cx="6858000" cy="9144000"/>
@@ -119,7 +120,7 @@
 <file path=ppt/revisionInfo.xml><?xml version="1.0" encoding="utf-8"?>
 <p1510:revInfo xmlns:a="http://schemas.openxmlformats.org/drawingml/2006/main" xmlns:r="http://schemas.openxmlformats.org/officeDocument/2006/relationships" xmlns:p1510="http://schemas.microsoft.com/office/powerpoint/2015/10/main">
   <p1510:revLst>
-    <p1510:client id="{2FF4D961-35C2-4468-87DC-0168A54CF785}" v="2045" dt="2018-11-29T17:46:51.684"/>
+    <p1510:client id="{2FF4D961-35C2-4468-87DC-0168A54CF785}" v="2427" dt="2018-11-29T19:34:44.336"/>
   </p1510:revLst>
 </p1510:revInfo>
 </file>
@@ -129,7 +130,7 @@
   <pc:docChgLst>
     <pc:chgData name="박 성훈" userId="ceb7f861bde8184c" providerId="LiveId" clId="{2FF4D961-35C2-4468-87DC-0168A54CF785}"/>
     <pc:docChg chg="undo custSel addSld delSld modSld">
-      <pc:chgData name="박 성훈" userId="ceb7f861bde8184c" providerId="LiveId" clId="{2FF4D961-35C2-4468-87DC-0168A54CF785}" dt="2018-11-29T17:46:51.684" v="2012" actId="478"/>
+      <pc:chgData name="박 성훈" userId="ceb7f861bde8184c" providerId="LiveId" clId="{2FF4D961-35C2-4468-87DC-0168A54CF785}" dt="2018-11-29T19:34:44.336" v="2383" actId="1076"/>
       <pc:docMkLst>
         <pc:docMk/>
       </pc:docMkLst>
@@ -1333,7 +1334,7 @@
         </pc:picChg>
       </pc:sldChg>
       <pc:sldChg chg="addSp delSp modSp add">
-        <pc:chgData name="박 성훈" userId="ceb7f861bde8184c" providerId="LiveId" clId="{2FF4D961-35C2-4468-87DC-0168A54CF785}" dt="2018-11-29T17:46:51.684" v="2012" actId="478"/>
+        <pc:chgData name="박 성훈" userId="ceb7f861bde8184c" providerId="LiveId" clId="{2FF4D961-35C2-4468-87DC-0168A54CF785}" dt="2018-11-29T19:17:42.668" v="2125"/>
         <pc:sldMkLst>
           <pc:docMk/>
           <pc:sldMk cId="2618606824" sldId="257"/>
@@ -1442,8 +1443,8 @@
             <ac:spMk id="15" creationId="{896014C6-8B36-4A10-A5C4-8D77FE88CAD6}"/>
           </ac:spMkLst>
         </pc:spChg>
-        <pc:spChg chg="add mod">
-          <ac:chgData name="박 성훈" userId="ceb7f861bde8184c" providerId="LiveId" clId="{2FF4D961-35C2-4468-87DC-0168A54CF785}" dt="2018-11-29T17:44:51.607" v="1971" actId="164"/>
+        <pc:spChg chg="add mod topLvl">
+          <ac:chgData name="박 성훈" userId="ceb7f861bde8184c" providerId="LiveId" clId="{2FF4D961-35C2-4468-87DC-0168A54CF785}" dt="2018-11-29T19:14:54.220" v="2120" actId="164"/>
           <ac:spMkLst>
             <pc:docMk/>
             <pc:sldMk cId="2618606824" sldId="257"/>
@@ -1451,7 +1452,7 @@
           </ac:spMkLst>
         </pc:spChg>
         <pc:spChg chg="add mod ord">
-          <ac:chgData name="박 성훈" userId="ceb7f861bde8184c" providerId="LiveId" clId="{2FF4D961-35C2-4468-87DC-0168A54CF785}" dt="2018-11-29T17:29:56.926" v="1688" actId="1076"/>
+          <ac:chgData name="박 성훈" userId="ceb7f861bde8184c" providerId="LiveId" clId="{2FF4D961-35C2-4468-87DC-0168A54CF785}" dt="2018-11-29T19:17:38.461" v="2123" actId="1076"/>
           <ac:spMkLst>
             <pc:docMk/>
             <pc:sldMk cId="2618606824" sldId="257"/>
@@ -1499,7 +1500,7 @@
           </ac:spMkLst>
         </pc:spChg>
         <pc:spChg chg="add mod topLvl">
-          <ac:chgData name="박 성훈" userId="ceb7f861bde8184c" providerId="LiveId" clId="{2FF4D961-35C2-4468-87DC-0168A54CF785}" dt="2018-11-29T17:44:51.607" v="1971" actId="164"/>
+          <ac:chgData name="박 성훈" userId="ceb7f861bde8184c" providerId="LiveId" clId="{2FF4D961-35C2-4468-87DC-0168A54CF785}" dt="2018-11-29T19:14:54.220" v="2120" actId="164"/>
           <ac:spMkLst>
             <pc:docMk/>
             <pc:sldMk cId="2618606824" sldId="257"/>
@@ -1507,7 +1508,7 @@
           </ac:spMkLst>
         </pc:spChg>
         <pc:spChg chg="add mod topLvl">
-          <ac:chgData name="박 성훈" userId="ceb7f861bde8184c" providerId="LiveId" clId="{2FF4D961-35C2-4468-87DC-0168A54CF785}" dt="2018-11-29T17:44:51.607" v="1971" actId="164"/>
+          <ac:chgData name="박 성훈" userId="ceb7f861bde8184c" providerId="LiveId" clId="{2FF4D961-35C2-4468-87DC-0168A54CF785}" dt="2018-11-29T19:14:54.220" v="2120" actId="164"/>
           <ac:spMkLst>
             <pc:docMk/>
             <pc:sldMk cId="2618606824" sldId="257"/>
@@ -1515,7 +1516,7 @@
           </ac:spMkLst>
         </pc:spChg>
         <pc:spChg chg="add mod topLvl">
-          <ac:chgData name="박 성훈" userId="ceb7f861bde8184c" providerId="LiveId" clId="{2FF4D961-35C2-4468-87DC-0168A54CF785}" dt="2018-11-29T17:44:51.607" v="1971" actId="164"/>
+          <ac:chgData name="박 성훈" userId="ceb7f861bde8184c" providerId="LiveId" clId="{2FF4D961-35C2-4468-87DC-0168A54CF785}" dt="2018-11-29T19:14:54.220" v="2120" actId="164"/>
           <ac:spMkLst>
             <pc:docMk/>
             <pc:sldMk cId="2618606824" sldId="257"/>
@@ -1523,7 +1524,7 @@
           </ac:spMkLst>
         </pc:spChg>
         <pc:spChg chg="add mod topLvl">
-          <ac:chgData name="박 성훈" userId="ceb7f861bde8184c" providerId="LiveId" clId="{2FF4D961-35C2-4468-87DC-0168A54CF785}" dt="2018-11-29T17:44:51.607" v="1971" actId="164"/>
+          <ac:chgData name="박 성훈" userId="ceb7f861bde8184c" providerId="LiveId" clId="{2FF4D961-35C2-4468-87DC-0168A54CF785}" dt="2018-11-29T19:14:54.220" v="2120" actId="164"/>
           <ac:spMkLst>
             <pc:docMk/>
             <pc:sldMk cId="2618606824" sldId="257"/>
@@ -1531,7 +1532,7 @@
           </ac:spMkLst>
         </pc:spChg>
         <pc:spChg chg="add mod topLvl">
-          <ac:chgData name="박 성훈" userId="ceb7f861bde8184c" providerId="LiveId" clId="{2FF4D961-35C2-4468-87DC-0168A54CF785}" dt="2018-11-29T17:44:51.607" v="1971" actId="164"/>
+          <ac:chgData name="박 성훈" userId="ceb7f861bde8184c" providerId="LiveId" clId="{2FF4D961-35C2-4468-87DC-0168A54CF785}" dt="2018-11-29T19:14:54.220" v="2120" actId="164"/>
           <ac:spMkLst>
             <pc:docMk/>
             <pc:sldMk cId="2618606824" sldId="257"/>
@@ -1539,7 +1540,7 @@
           </ac:spMkLst>
         </pc:spChg>
         <pc:spChg chg="add mod topLvl">
-          <ac:chgData name="박 성훈" userId="ceb7f861bde8184c" providerId="LiveId" clId="{2FF4D961-35C2-4468-87DC-0168A54CF785}" dt="2018-11-29T17:44:51.607" v="1971" actId="164"/>
+          <ac:chgData name="박 성훈" userId="ceb7f861bde8184c" providerId="LiveId" clId="{2FF4D961-35C2-4468-87DC-0168A54CF785}" dt="2018-11-29T19:14:54.220" v="2120" actId="164"/>
           <ac:spMkLst>
             <pc:docMk/>
             <pc:sldMk cId="2618606824" sldId="257"/>
@@ -1547,7 +1548,7 @@
           </ac:spMkLst>
         </pc:spChg>
         <pc:spChg chg="add mod topLvl">
-          <ac:chgData name="박 성훈" userId="ceb7f861bde8184c" providerId="LiveId" clId="{2FF4D961-35C2-4468-87DC-0168A54CF785}" dt="2018-11-29T17:44:51.607" v="1971" actId="164"/>
+          <ac:chgData name="박 성훈" userId="ceb7f861bde8184c" providerId="LiveId" clId="{2FF4D961-35C2-4468-87DC-0168A54CF785}" dt="2018-11-29T19:14:54.220" v="2120" actId="164"/>
           <ac:spMkLst>
             <pc:docMk/>
             <pc:sldMk cId="2618606824" sldId="257"/>
@@ -1571,7 +1572,7 @@
           </ac:spMkLst>
         </pc:spChg>
         <pc:spChg chg="add mod topLvl">
-          <ac:chgData name="박 성훈" userId="ceb7f861bde8184c" providerId="LiveId" clId="{2FF4D961-35C2-4468-87DC-0168A54CF785}" dt="2018-11-29T17:44:51.607" v="1971" actId="164"/>
+          <ac:chgData name="박 성훈" userId="ceb7f861bde8184c" providerId="LiveId" clId="{2FF4D961-35C2-4468-87DC-0168A54CF785}" dt="2018-11-29T19:14:54.220" v="2120" actId="164"/>
           <ac:spMkLst>
             <pc:docMk/>
             <pc:sldMk cId="2618606824" sldId="257"/>
@@ -1579,23 +1580,23 @@
           </ac:spMkLst>
         </pc:spChg>
         <pc:spChg chg="add mod topLvl">
-          <ac:chgData name="박 성훈" userId="ceb7f861bde8184c" providerId="LiveId" clId="{2FF4D961-35C2-4468-87DC-0168A54CF785}" dt="2018-11-29T17:44:51.607" v="1971" actId="164"/>
+          <ac:chgData name="박 성훈" userId="ceb7f861bde8184c" providerId="LiveId" clId="{2FF4D961-35C2-4468-87DC-0168A54CF785}" dt="2018-11-29T19:14:54.220" v="2120" actId="164"/>
           <ac:spMkLst>
             <pc:docMk/>
             <pc:sldMk cId="2618606824" sldId="257"/>
             <ac:spMk id="36" creationId="{C886320E-4E06-4A01-BD47-DF2EFDDD0C05}"/>
           </ac:spMkLst>
         </pc:spChg>
-        <pc:spChg chg="add mod">
-          <ac:chgData name="박 성훈" userId="ceb7f861bde8184c" providerId="LiveId" clId="{2FF4D961-35C2-4468-87DC-0168A54CF785}" dt="2018-11-29T17:44:51.607" v="1971" actId="164"/>
+        <pc:spChg chg="add mod topLvl">
+          <ac:chgData name="박 성훈" userId="ceb7f861bde8184c" providerId="LiveId" clId="{2FF4D961-35C2-4468-87DC-0168A54CF785}" dt="2018-11-29T19:14:54.220" v="2120" actId="164"/>
           <ac:spMkLst>
             <pc:docMk/>
             <pc:sldMk cId="2618606824" sldId="257"/>
             <ac:spMk id="38" creationId="{1AF0CD46-9E40-4747-BCF8-DEAEE72F20ED}"/>
           </ac:spMkLst>
         </pc:spChg>
-        <pc:spChg chg="add mod">
-          <ac:chgData name="박 성훈" userId="ceb7f861bde8184c" providerId="LiveId" clId="{2FF4D961-35C2-4468-87DC-0168A54CF785}" dt="2018-11-29T17:46:49.151" v="2011" actId="1076"/>
+        <pc:spChg chg="add mod topLvl">
+          <ac:chgData name="박 성훈" userId="ceb7f861bde8184c" providerId="LiveId" clId="{2FF4D961-35C2-4468-87DC-0168A54CF785}" dt="2018-11-29T19:14:54.220" v="2120" actId="164"/>
           <ac:spMkLst>
             <pc:docMk/>
             <pc:sldMk cId="2618606824" sldId="257"/>
@@ -1603,7 +1604,7 @@
           </ac:spMkLst>
         </pc:spChg>
         <pc:spChg chg="add mod topLvl">
-          <ac:chgData name="박 성훈" userId="ceb7f861bde8184c" providerId="LiveId" clId="{2FF4D961-35C2-4468-87DC-0168A54CF785}" dt="2018-11-29T17:31:06.993" v="1714" actId="164"/>
+          <ac:chgData name="박 성훈" userId="ceb7f861bde8184c" providerId="LiveId" clId="{2FF4D961-35C2-4468-87DC-0168A54CF785}" dt="2018-11-29T19:11:04.591" v="2090" actId="207"/>
           <ac:spMkLst>
             <pc:docMk/>
             <pc:sldMk cId="2618606824" sldId="257"/>
@@ -1619,7 +1620,7 @@
           </ac:spMkLst>
         </pc:spChg>
         <pc:spChg chg="add mod topLvl">
-          <ac:chgData name="박 성훈" userId="ceb7f861bde8184c" providerId="LiveId" clId="{2FF4D961-35C2-4468-87DC-0168A54CF785}" dt="2018-11-29T17:31:06.993" v="1714" actId="164"/>
+          <ac:chgData name="박 성훈" userId="ceb7f861bde8184c" providerId="LiveId" clId="{2FF4D961-35C2-4468-87DC-0168A54CF785}" dt="2018-11-29T19:07:35.185" v="2024" actId="692"/>
           <ac:spMkLst>
             <pc:docMk/>
             <pc:sldMk cId="2618606824" sldId="257"/>
@@ -1635,7 +1636,7 @@
           </ac:spMkLst>
         </pc:spChg>
         <pc:spChg chg="add mod topLvl">
-          <ac:chgData name="박 성훈" userId="ceb7f861bde8184c" providerId="LiveId" clId="{2FF4D961-35C2-4468-87DC-0168A54CF785}" dt="2018-11-29T17:31:04.514" v="1713" actId="1076"/>
+          <ac:chgData name="박 성훈" userId="ceb7f861bde8184c" providerId="LiveId" clId="{2FF4D961-35C2-4468-87DC-0168A54CF785}" dt="2018-11-29T19:14:36.126" v="2115" actId="1076"/>
           <ac:spMkLst>
             <pc:docMk/>
             <pc:sldMk cId="2618606824" sldId="257"/>
@@ -1650,24 +1651,24 @@
             <ac:spMk id="49" creationId="{2682196C-CE9F-4B0B-B6C3-B7D2CFEAC815}"/>
           </ac:spMkLst>
         </pc:spChg>
-        <pc:spChg chg="add mod">
-          <ac:chgData name="박 성훈" userId="ceb7f861bde8184c" providerId="LiveId" clId="{2FF4D961-35C2-4468-87DC-0168A54CF785}" dt="2018-11-29T17:28:38.614" v="1663" actId="14100"/>
+        <pc:spChg chg="add mod topLvl">
+          <ac:chgData name="박 성훈" userId="ceb7f861bde8184c" providerId="LiveId" clId="{2FF4D961-35C2-4468-87DC-0168A54CF785}" dt="2018-11-29T19:14:37.167" v="2116" actId="164"/>
           <ac:spMkLst>
             <pc:docMk/>
             <pc:sldMk cId="2618606824" sldId="257"/>
             <ac:spMk id="50" creationId="{8152CEA2-655F-4E4B-8D52-4F44335DE3DE}"/>
           </ac:spMkLst>
         </pc:spChg>
-        <pc:spChg chg="add mod">
-          <ac:chgData name="박 성훈" userId="ceb7f861bde8184c" providerId="LiveId" clId="{2FF4D961-35C2-4468-87DC-0168A54CF785}" dt="2018-11-29T17:28:43.084" v="1665" actId="1076"/>
+        <pc:spChg chg="add mod topLvl">
+          <ac:chgData name="박 성훈" userId="ceb7f861bde8184c" providerId="LiveId" clId="{2FF4D961-35C2-4468-87DC-0168A54CF785}" dt="2018-11-29T19:14:37.167" v="2116" actId="164"/>
           <ac:spMkLst>
             <pc:docMk/>
             <pc:sldMk cId="2618606824" sldId="257"/>
             <ac:spMk id="51" creationId="{D6611DFD-C6E4-4165-AD39-E1150D076194}"/>
           </ac:spMkLst>
         </pc:spChg>
-        <pc:spChg chg="add mod">
-          <ac:chgData name="박 성훈" userId="ceb7f861bde8184c" providerId="LiveId" clId="{2FF4D961-35C2-4468-87DC-0168A54CF785}" dt="2018-11-29T17:28:46.546" v="1667" actId="1076"/>
+        <pc:spChg chg="add mod topLvl">
+          <ac:chgData name="박 성훈" userId="ceb7f861bde8184c" providerId="LiveId" clId="{2FF4D961-35C2-4468-87DC-0168A54CF785}" dt="2018-11-29T19:14:37.167" v="2116" actId="164"/>
           <ac:spMkLst>
             <pc:docMk/>
             <pc:sldMk cId="2618606824" sldId="257"/>
@@ -1682,8 +1683,8 @@
             <ac:spMk id="64" creationId="{5C6DD628-4997-4444-8084-88EA3ABAA4D3}"/>
           </ac:spMkLst>
         </pc:spChg>
-        <pc:spChg chg="add mod ord">
-          <ac:chgData name="박 성훈" userId="ceb7f861bde8184c" providerId="LiveId" clId="{2FF4D961-35C2-4468-87DC-0168A54CF785}" dt="2018-11-29T17:41:32.323" v="1847" actId="164"/>
+        <pc:spChg chg="add mod ord topLvl">
+          <ac:chgData name="박 성훈" userId="ceb7f861bde8184c" providerId="LiveId" clId="{2FF4D961-35C2-4468-87DC-0168A54CF785}" dt="2018-11-29T19:14:54.220" v="2120" actId="164"/>
           <ac:spMkLst>
             <pc:docMk/>
             <pc:sldMk cId="2618606824" sldId="257"/>
@@ -1779,6 +1780,38 @@
           </ac:grpSpMkLst>
         </pc:grpChg>
         <pc:grpChg chg="add del mod">
+          <ac:chgData name="박 성훈" userId="ceb7f861bde8184c" providerId="LiveId" clId="{2FF4D961-35C2-4468-87DC-0168A54CF785}" dt="2018-11-29T19:10:09.623" v="2076" actId="164"/>
+          <ac:grpSpMkLst>
+            <pc:docMk/>
+            <pc:sldMk cId="2618606824" sldId="257"/>
+            <ac:grpSpMk id="22" creationId="{3477454A-0542-492C-8D04-2CA504D73D63}"/>
+          </ac:grpSpMkLst>
+        </pc:grpChg>
+        <pc:grpChg chg="add mod ord">
+          <ac:chgData name="박 성훈" userId="ceb7f861bde8184c" providerId="LiveId" clId="{2FF4D961-35C2-4468-87DC-0168A54CF785}" dt="2018-11-29T19:10:08.662" v="2071" actId="164"/>
+          <ac:grpSpMkLst>
+            <pc:docMk/>
+            <pc:sldMk cId="2618606824" sldId="257"/>
+            <ac:grpSpMk id="23" creationId="{9904AD70-D29B-4ADB-8DFE-F8B054F8EDB1}"/>
+          </ac:grpSpMkLst>
+        </pc:grpChg>
+        <pc:grpChg chg="add mod ord">
+          <ac:chgData name="박 성훈" userId="ceb7f861bde8184c" providerId="LiveId" clId="{2FF4D961-35C2-4468-87DC-0168A54CF785}" dt="2018-11-29T19:14:54.220" v="2120" actId="164"/>
+          <ac:grpSpMkLst>
+            <pc:docMk/>
+            <pc:sldMk cId="2618606824" sldId="257"/>
+            <ac:grpSpMk id="33" creationId="{0BE2183F-FD14-471B-82D7-0C7FAB5FAF38}"/>
+          </ac:grpSpMkLst>
+        </pc:grpChg>
+        <pc:grpChg chg="add del mod">
+          <ac:chgData name="박 성훈" userId="ceb7f861bde8184c" providerId="LiveId" clId="{2FF4D961-35C2-4468-87DC-0168A54CF785}" dt="2018-11-29T19:17:42.668" v="2125"/>
+          <ac:grpSpMkLst>
+            <pc:docMk/>
+            <pc:sldMk cId="2618606824" sldId="257"/>
+            <ac:grpSpMk id="34" creationId="{4B5A5EC5-4D57-4841-8E87-AC25876963A6}"/>
+          </ac:grpSpMkLst>
+        </pc:grpChg>
+        <pc:grpChg chg="add del mod">
           <ac:chgData name="박 성훈" userId="ceb7f861bde8184c" providerId="LiveId" clId="{2FF4D961-35C2-4468-87DC-0168A54CF785}" dt="2018-11-29T17:41:27.454" v="1845" actId="165"/>
           <ac:grpSpMkLst>
             <pc:docMk/>
@@ -1794,8 +1827,8 @@
             <ac:grpSpMk id="53" creationId="{95422439-CA7E-4B61-9929-FB9FE9AA0F79}"/>
           </ac:grpSpMkLst>
         </pc:grpChg>
-        <pc:grpChg chg="add mod">
-          <ac:chgData name="박 성훈" userId="ceb7f861bde8184c" providerId="LiveId" clId="{2FF4D961-35C2-4468-87DC-0168A54CF785}" dt="2018-11-29T17:31:06.993" v="1714" actId="164"/>
+        <pc:grpChg chg="add del mod">
+          <ac:chgData name="박 성훈" userId="ceb7f861bde8184c" providerId="LiveId" clId="{2FF4D961-35C2-4468-87DC-0168A54CF785}" dt="2018-11-29T19:08:53.613" v="2032" actId="478"/>
           <ac:grpSpMkLst>
             <pc:docMk/>
             <pc:sldMk cId="2618606824" sldId="257"/>
@@ -1818,30 +1851,46 @@
             <ac:grpSpMk id="80" creationId="{F8264B71-9BB1-456C-B853-CD4CEB8D1767}"/>
           </ac:grpSpMkLst>
         </pc:grpChg>
-        <pc:grpChg chg="add mod">
-          <ac:chgData name="박 성훈" userId="ceb7f861bde8184c" providerId="LiveId" clId="{2FF4D961-35C2-4468-87DC-0168A54CF785}" dt="2018-11-29T17:41:32.323" v="1847" actId="164"/>
+        <pc:grpChg chg="add mod topLvl">
+          <ac:chgData name="박 성훈" userId="ceb7f861bde8184c" providerId="LiveId" clId="{2FF4D961-35C2-4468-87DC-0168A54CF785}" dt="2018-11-29T19:14:54.220" v="2120" actId="164"/>
           <ac:grpSpMkLst>
             <pc:docMk/>
             <pc:sldMk cId="2618606824" sldId="257"/>
             <ac:grpSpMk id="84" creationId="{1A2433A1-BE72-444C-9CD8-449F30C4292B}"/>
           </ac:grpSpMkLst>
         </pc:grpChg>
-        <pc:grpChg chg="add mod">
-          <ac:chgData name="박 성훈" userId="ceb7f861bde8184c" providerId="LiveId" clId="{2FF4D961-35C2-4468-87DC-0168A54CF785}" dt="2018-11-29T17:44:51.607" v="1971" actId="164"/>
+        <pc:grpChg chg="add del mod topLvl">
+          <ac:chgData name="박 성훈" userId="ceb7f861bde8184c" providerId="LiveId" clId="{2FF4D961-35C2-4468-87DC-0168A54CF785}" dt="2018-11-29T19:10:29.245" v="2079" actId="165"/>
           <ac:grpSpMkLst>
             <pc:docMk/>
             <pc:sldMk cId="2618606824" sldId="257"/>
             <ac:grpSpMk id="85" creationId="{CE5CE65F-6460-4C34-A252-F9493264AD03}"/>
           </ac:grpSpMkLst>
         </pc:grpChg>
-        <pc:grpChg chg="add mod">
-          <ac:chgData name="박 성훈" userId="ceb7f861bde8184c" providerId="LiveId" clId="{2FF4D961-35C2-4468-87DC-0168A54CF785}" dt="2018-11-29T17:44:54.618" v="1972" actId="1076"/>
+        <pc:grpChg chg="add del mod">
+          <ac:chgData name="박 성훈" userId="ceb7f861bde8184c" providerId="LiveId" clId="{2FF4D961-35C2-4468-87DC-0168A54CF785}" dt="2018-11-29T19:06:49.407" v="2022" actId="165"/>
           <ac:grpSpMkLst>
             <pc:docMk/>
             <pc:sldMk cId="2618606824" sldId="257"/>
             <ac:grpSpMk id="86" creationId="{3466C381-30F8-4FBE-B7C6-9E5999F1B952}"/>
           </ac:grpSpMkLst>
         </pc:grpChg>
+        <pc:picChg chg="add mod">
+          <ac:chgData name="박 성훈" userId="ceb7f861bde8184c" providerId="LiveId" clId="{2FF4D961-35C2-4468-87DC-0168A54CF785}" dt="2018-11-29T19:14:54.220" v="2120" actId="164"/>
+          <ac:picMkLst>
+            <pc:docMk/>
+            <pc:sldMk cId="2618606824" sldId="257"/>
+            <ac:picMk id="25" creationId="{4203C8DB-FF5D-447B-ABB6-3A75C1DE632F}"/>
+          </ac:picMkLst>
+        </pc:picChg>
+        <pc:cxnChg chg="add del mod">
+          <ac:chgData name="박 성훈" userId="ceb7f861bde8184c" providerId="LiveId" clId="{2FF4D961-35C2-4468-87DC-0168A54CF785}" dt="2018-11-29T19:08:39.313" v="2030" actId="478"/>
+          <ac:cxnSpMkLst>
+            <pc:docMk/>
+            <pc:sldMk cId="2618606824" sldId="257"/>
+            <ac:cxnSpMk id="21" creationId="{E6A0508C-4D53-4684-B14A-863CFC331E86}"/>
+          </ac:cxnSpMkLst>
+        </pc:cxnChg>
         <pc:cxnChg chg="add del mod">
           <ac:chgData name="박 성훈" userId="ceb7f861bde8184c" providerId="LiveId" clId="{2FF4D961-35C2-4468-87DC-0168A54CF785}" dt="2018-11-29T17:15:43.419" v="1269" actId="478"/>
           <ac:cxnSpMkLst>
@@ -1851,31 +1900,31 @@
           </ac:cxnSpMkLst>
         </pc:cxnChg>
         <pc:cxnChg chg="add mod topLvl">
-          <ac:chgData name="박 성훈" userId="ceb7f861bde8184c" providerId="LiveId" clId="{2FF4D961-35C2-4468-87DC-0168A54CF785}" dt="2018-11-29T17:31:06.993" v="1714" actId="164"/>
+          <ac:chgData name="박 성훈" userId="ceb7f861bde8184c" providerId="LiveId" clId="{2FF4D961-35C2-4468-87DC-0168A54CF785}" dt="2018-11-29T19:07:35.185" v="2024" actId="692"/>
           <ac:cxnSpMkLst>
             <pc:docMk/>
             <pc:sldMk cId="2618606824" sldId="257"/>
             <ac:cxnSpMk id="42" creationId="{FFCAF9DB-AE7A-4D4B-94EC-109E5DB13660}"/>
           </ac:cxnSpMkLst>
         </pc:cxnChg>
-        <pc:cxnChg chg="add mod">
-          <ac:chgData name="박 성훈" userId="ceb7f861bde8184c" providerId="LiveId" clId="{2FF4D961-35C2-4468-87DC-0168A54CF785}" dt="2018-11-29T17:30:54.028" v="1709" actId="164"/>
+        <pc:cxnChg chg="add del mod">
+          <ac:chgData name="박 성훈" userId="ceb7f861bde8184c" providerId="LiveId" clId="{2FF4D961-35C2-4468-87DC-0168A54CF785}" dt="2018-11-29T19:08:53.613" v="2032" actId="478"/>
           <ac:cxnSpMkLst>
             <pc:docMk/>
             <pc:sldMk cId="2618606824" sldId="257"/>
             <ac:cxnSpMk id="55" creationId="{3466E302-61C9-4A76-A6F8-C3F11B46070E}"/>
           </ac:cxnSpMkLst>
         </pc:cxnChg>
-        <pc:cxnChg chg="add mod">
-          <ac:chgData name="박 성훈" userId="ceb7f861bde8184c" providerId="LiveId" clId="{2FF4D961-35C2-4468-87DC-0168A54CF785}" dt="2018-11-29T17:30:54.028" v="1709" actId="164"/>
+        <pc:cxnChg chg="add del mod">
+          <ac:chgData name="박 성훈" userId="ceb7f861bde8184c" providerId="LiveId" clId="{2FF4D961-35C2-4468-87DC-0168A54CF785}" dt="2018-11-29T19:08:53.613" v="2032" actId="478"/>
           <ac:cxnSpMkLst>
             <pc:docMk/>
             <pc:sldMk cId="2618606824" sldId="257"/>
             <ac:cxnSpMk id="56" creationId="{633DF1EB-444F-405D-B47B-60AB8981C014}"/>
           </ac:cxnSpMkLst>
         </pc:cxnChg>
-        <pc:cxnChg chg="add mod">
-          <ac:chgData name="박 성훈" userId="ceb7f861bde8184c" providerId="LiveId" clId="{2FF4D961-35C2-4468-87DC-0168A54CF785}" dt="2018-11-29T17:30:54.028" v="1709" actId="164"/>
+        <pc:cxnChg chg="add del mod">
+          <ac:chgData name="박 성훈" userId="ceb7f861bde8184c" providerId="LiveId" clId="{2FF4D961-35C2-4468-87DC-0168A54CF785}" dt="2018-11-29T19:08:53.613" v="2032" actId="478"/>
           <ac:cxnSpMkLst>
             <pc:docMk/>
             <pc:sldMk cId="2618606824" sldId="257"/>
@@ -1883,7 +1932,7 @@
           </ac:cxnSpMkLst>
         </pc:cxnChg>
         <pc:cxnChg chg="add mod topLvl">
-          <ac:chgData name="박 성훈" userId="ceb7f861bde8184c" providerId="LiveId" clId="{2FF4D961-35C2-4468-87DC-0168A54CF785}" dt="2018-11-29T17:40:48.195" v="1835" actId="164"/>
+          <ac:chgData name="박 성훈" userId="ceb7f861bde8184c" providerId="LiveId" clId="{2FF4D961-35C2-4468-87DC-0168A54CF785}" dt="2018-11-29T19:17:02.481" v="2121" actId="692"/>
           <ac:cxnSpMkLst>
             <pc:docMk/>
             <pc:sldMk cId="2618606824" sldId="257"/>
@@ -1897,6 +1946,581 @@
           <pc:docMk/>
           <pc:sldMk cId="1284353405" sldId="258"/>
         </pc:sldMkLst>
+      </pc:sldChg>
+      <pc:sldChg chg="addSp delSp modSp add">
+        <pc:chgData name="박 성훈" userId="ceb7f861bde8184c" providerId="LiveId" clId="{2FF4D961-35C2-4468-87DC-0168A54CF785}" dt="2018-11-29T19:34:44.336" v="2383" actId="1076"/>
+        <pc:sldMkLst>
+          <pc:docMk/>
+          <pc:sldMk cId="1383628516" sldId="258"/>
+        </pc:sldMkLst>
+        <pc:spChg chg="mod">
+          <ac:chgData name="박 성훈" userId="ceb7f861bde8184c" providerId="LiveId" clId="{2FF4D961-35C2-4468-87DC-0168A54CF785}" dt="2018-11-29T19:18:50.236" v="2136" actId="692"/>
+          <ac:spMkLst>
+            <pc:docMk/>
+            <pc:sldMk cId="1383628516" sldId="258"/>
+            <ac:spMk id="3" creationId="{1B234162-7BBA-46A9-8697-F37546ADABD8}"/>
+          </ac:spMkLst>
+        </pc:spChg>
+        <pc:spChg chg="mod">
+          <ac:chgData name="박 성훈" userId="ceb7f861bde8184c" providerId="LiveId" clId="{2FF4D961-35C2-4468-87DC-0168A54CF785}" dt="2018-11-29T19:18:26.259" v="2132" actId="1076"/>
+          <ac:spMkLst>
+            <pc:docMk/>
+            <pc:sldMk cId="1383628516" sldId="258"/>
+            <ac:spMk id="13" creationId="{4581CA6E-5285-4F92-8EF1-8345AA5D5BBE}"/>
+          </ac:spMkLst>
+        </pc:spChg>
+        <pc:spChg chg="mod">
+          <ac:chgData name="박 성훈" userId="ceb7f861bde8184c" providerId="LiveId" clId="{2FF4D961-35C2-4468-87DC-0168A54CF785}" dt="2018-11-29T19:18:33.143" v="2133" actId="1076"/>
+          <ac:spMkLst>
+            <pc:docMk/>
+            <pc:sldMk cId="1383628516" sldId="258"/>
+            <ac:spMk id="14" creationId="{6B39924B-DE62-4ECE-9618-5D6BFA19CF4A}"/>
+          </ac:spMkLst>
+        </pc:spChg>
+        <pc:spChg chg="mod">
+          <ac:chgData name="박 성훈" userId="ceb7f861bde8184c" providerId="LiveId" clId="{2FF4D961-35C2-4468-87DC-0168A54CF785}" dt="2018-11-29T19:18:35.936" v="2135" actId="1076"/>
+          <ac:spMkLst>
+            <pc:docMk/>
+            <pc:sldMk cId="1383628516" sldId="258"/>
+            <ac:spMk id="15" creationId="{B054604E-2366-4642-AA09-143B654A2B88}"/>
+          </ac:spMkLst>
+        </pc:spChg>
+        <pc:spChg chg="mod topLvl">
+          <ac:chgData name="박 성훈" userId="ceb7f861bde8184c" providerId="LiveId" clId="{2FF4D961-35C2-4468-87DC-0168A54CF785}" dt="2018-11-29T19:34:40.472" v="2382" actId="164"/>
+          <ac:spMkLst>
+            <pc:docMk/>
+            <pc:sldMk cId="1383628516" sldId="258"/>
+            <ac:spMk id="30" creationId="{16B946E3-D8CA-473D-85E0-B8E586D69590}"/>
+          </ac:spMkLst>
+        </pc:spChg>
+        <pc:spChg chg="mod topLvl">
+          <ac:chgData name="박 성훈" userId="ceb7f861bde8184c" providerId="LiveId" clId="{2FF4D961-35C2-4468-87DC-0168A54CF785}" dt="2018-11-29T19:34:40.472" v="2382" actId="164"/>
+          <ac:spMkLst>
+            <pc:docMk/>
+            <pc:sldMk cId="1383628516" sldId="258"/>
+            <ac:spMk id="31" creationId="{65D1EC44-6F8E-4F97-A7E7-D1268F7EF002}"/>
+          </ac:spMkLst>
+        </pc:spChg>
+        <pc:spChg chg="mod topLvl">
+          <ac:chgData name="박 성훈" userId="ceb7f861bde8184c" providerId="LiveId" clId="{2FF4D961-35C2-4468-87DC-0168A54CF785}" dt="2018-11-29T19:34:40.472" v="2382" actId="164"/>
+          <ac:spMkLst>
+            <pc:docMk/>
+            <pc:sldMk cId="1383628516" sldId="258"/>
+            <ac:spMk id="32" creationId="{5DE49F8D-825E-4C49-9ED5-842A3CC9A8ED}"/>
+          </ac:spMkLst>
+        </pc:spChg>
+        <pc:spChg chg="mod topLvl">
+          <ac:chgData name="박 성훈" userId="ceb7f861bde8184c" providerId="LiveId" clId="{2FF4D961-35C2-4468-87DC-0168A54CF785}" dt="2018-11-29T19:34:40.472" v="2382" actId="164"/>
+          <ac:spMkLst>
+            <pc:docMk/>
+            <pc:sldMk cId="1383628516" sldId="258"/>
+            <ac:spMk id="33" creationId="{33845208-EF98-4A8E-A584-D53F0E222EE6}"/>
+          </ac:spMkLst>
+        </pc:spChg>
+        <pc:spChg chg="mod topLvl">
+          <ac:chgData name="박 성훈" userId="ceb7f861bde8184c" providerId="LiveId" clId="{2FF4D961-35C2-4468-87DC-0168A54CF785}" dt="2018-11-29T19:34:40.472" v="2382" actId="164"/>
+          <ac:spMkLst>
+            <pc:docMk/>
+            <pc:sldMk cId="1383628516" sldId="258"/>
+            <ac:spMk id="34" creationId="{5CA5EBCD-E0D7-4650-95A4-DF6D35B16757}"/>
+          </ac:spMkLst>
+        </pc:spChg>
+        <pc:spChg chg="mod topLvl">
+          <ac:chgData name="박 성훈" userId="ceb7f861bde8184c" providerId="LiveId" clId="{2FF4D961-35C2-4468-87DC-0168A54CF785}" dt="2018-11-29T19:34:40.472" v="2382" actId="164"/>
+          <ac:spMkLst>
+            <pc:docMk/>
+            <pc:sldMk cId="1383628516" sldId="258"/>
+            <ac:spMk id="35" creationId="{CB3C1146-90B3-4F87-8A7F-9D4E02F8AF2E}"/>
+          </ac:spMkLst>
+        </pc:spChg>
+        <pc:spChg chg="mod topLvl">
+          <ac:chgData name="박 성훈" userId="ceb7f861bde8184c" providerId="LiveId" clId="{2FF4D961-35C2-4468-87DC-0168A54CF785}" dt="2018-11-29T19:34:40.472" v="2382" actId="164"/>
+          <ac:spMkLst>
+            <pc:docMk/>
+            <pc:sldMk cId="1383628516" sldId="258"/>
+            <ac:spMk id="36" creationId="{C30156A9-F1D7-4A3B-A8A7-6EFF7D027BF9}"/>
+          </ac:spMkLst>
+        </pc:spChg>
+        <pc:spChg chg="mod topLvl">
+          <ac:chgData name="박 성훈" userId="ceb7f861bde8184c" providerId="LiveId" clId="{2FF4D961-35C2-4468-87DC-0168A54CF785}" dt="2018-11-29T19:34:40.472" v="2382" actId="164"/>
+          <ac:spMkLst>
+            <pc:docMk/>
+            <pc:sldMk cId="1383628516" sldId="258"/>
+            <ac:spMk id="37" creationId="{09C7E219-AB71-437F-B083-60E197DD4691}"/>
+          </ac:spMkLst>
+        </pc:spChg>
+        <pc:spChg chg="mod topLvl">
+          <ac:chgData name="박 성훈" userId="ceb7f861bde8184c" providerId="LiveId" clId="{2FF4D961-35C2-4468-87DC-0168A54CF785}" dt="2018-11-29T19:34:40.472" v="2382" actId="164"/>
+          <ac:spMkLst>
+            <pc:docMk/>
+            <pc:sldMk cId="1383628516" sldId="258"/>
+            <ac:spMk id="38" creationId="{7704A794-04C2-4154-8B4D-0BEA95ECC263}"/>
+          </ac:spMkLst>
+        </pc:spChg>
+        <pc:spChg chg="mod topLvl">
+          <ac:chgData name="박 성훈" userId="ceb7f861bde8184c" providerId="LiveId" clId="{2FF4D961-35C2-4468-87DC-0168A54CF785}" dt="2018-11-29T19:34:40.472" v="2382" actId="164"/>
+          <ac:spMkLst>
+            <pc:docMk/>
+            <pc:sldMk cId="1383628516" sldId="258"/>
+            <ac:spMk id="39" creationId="{5A2E0ABF-71EC-4FAB-8224-B457B31663AB}"/>
+          </ac:spMkLst>
+        </pc:spChg>
+        <pc:spChg chg="mod topLvl">
+          <ac:chgData name="박 성훈" userId="ceb7f861bde8184c" providerId="LiveId" clId="{2FF4D961-35C2-4468-87DC-0168A54CF785}" dt="2018-11-29T19:34:40.472" v="2382" actId="164"/>
+          <ac:spMkLst>
+            <pc:docMk/>
+            <pc:sldMk cId="1383628516" sldId="258"/>
+            <ac:spMk id="40" creationId="{D55C9E45-2FAD-4D4D-AADB-E3EBFF6014EB}"/>
+          </ac:spMkLst>
+        </pc:spChg>
+        <pc:spChg chg="mod topLvl">
+          <ac:chgData name="박 성훈" userId="ceb7f861bde8184c" providerId="LiveId" clId="{2FF4D961-35C2-4468-87DC-0168A54CF785}" dt="2018-11-29T19:34:40.472" v="2382" actId="164"/>
+          <ac:spMkLst>
+            <pc:docMk/>
+            <pc:sldMk cId="1383628516" sldId="258"/>
+            <ac:spMk id="41" creationId="{D0391613-B06D-4215-8796-67B9E800CB94}"/>
+          </ac:spMkLst>
+        </pc:spChg>
+        <pc:spChg chg="mod topLvl">
+          <ac:chgData name="박 성훈" userId="ceb7f861bde8184c" providerId="LiveId" clId="{2FF4D961-35C2-4468-87DC-0168A54CF785}" dt="2018-11-29T19:34:40.472" v="2382" actId="164"/>
+          <ac:spMkLst>
+            <pc:docMk/>
+            <pc:sldMk cId="1383628516" sldId="258"/>
+            <ac:spMk id="42" creationId="{B9E240E7-0925-4787-ACF1-B5BE587B273A}"/>
+          </ac:spMkLst>
+        </pc:spChg>
+        <pc:spChg chg="del">
+          <ac:chgData name="박 성훈" userId="ceb7f861bde8184c" providerId="LiveId" clId="{2FF4D961-35C2-4468-87DC-0168A54CF785}" dt="2018-11-29T19:21:22.018" v="2156" actId="478"/>
+          <ac:spMkLst>
+            <pc:docMk/>
+            <pc:sldMk cId="1383628516" sldId="258"/>
+            <ac:spMk id="46" creationId="{BED5C84F-C4CA-4A9C-88E8-EF19B2660F3E}"/>
+          </ac:spMkLst>
+        </pc:spChg>
+        <pc:spChg chg="del">
+          <ac:chgData name="박 성훈" userId="ceb7f861bde8184c" providerId="LiveId" clId="{2FF4D961-35C2-4468-87DC-0168A54CF785}" dt="2018-11-29T19:21:22.018" v="2156" actId="478"/>
+          <ac:spMkLst>
+            <pc:docMk/>
+            <pc:sldMk cId="1383628516" sldId="258"/>
+            <ac:spMk id="47" creationId="{2FB7637F-7216-4CCE-A1FE-B827A96CC1DE}"/>
+          </ac:spMkLst>
+        </pc:spChg>
+        <pc:spChg chg="del">
+          <ac:chgData name="박 성훈" userId="ceb7f861bde8184c" providerId="LiveId" clId="{2FF4D961-35C2-4468-87DC-0168A54CF785}" dt="2018-11-29T19:21:22.018" v="2156" actId="478"/>
+          <ac:spMkLst>
+            <pc:docMk/>
+            <pc:sldMk cId="1383628516" sldId="258"/>
+            <ac:spMk id="48" creationId="{294C74B4-C62A-47B8-990E-6B57FA75DFAC}"/>
+          </ac:spMkLst>
+        </pc:spChg>
+        <pc:spChg chg="mod">
+          <ac:chgData name="박 성훈" userId="ceb7f861bde8184c" providerId="LiveId" clId="{2FF4D961-35C2-4468-87DC-0168A54CF785}" dt="2018-11-29T19:32:21.789" v="2361" actId="207"/>
+          <ac:spMkLst>
+            <pc:docMk/>
+            <pc:sldMk cId="1383628516" sldId="258"/>
+            <ac:spMk id="51" creationId="{69D9B656-36A7-4BA9-BF13-B6981A3952D8}"/>
+          </ac:spMkLst>
+        </pc:spChg>
+        <pc:spChg chg="add del mod">
+          <ac:chgData name="박 성훈" userId="ceb7f861bde8184c" providerId="LiveId" clId="{2FF4D961-35C2-4468-87DC-0168A54CF785}" dt="2018-11-29T19:21:31.171" v="2159" actId="478"/>
+          <ac:spMkLst>
+            <pc:docMk/>
+            <pc:sldMk cId="1383628516" sldId="258"/>
+            <ac:spMk id="54" creationId="{0546EC59-1D79-4514-8655-218A67FDE1C1}"/>
+          </ac:spMkLst>
+        </pc:spChg>
+        <pc:spChg chg="add mod">
+          <ac:chgData name="박 성훈" userId="ceb7f861bde8184c" providerId="LiveId" clId="{2FF4D961-35C2-4468-87DC-0168A54CF785}" dt="2018-11-29T19:31:16.458" v="2353" actId="164"/>
+          <ac:spMkLst>
+            <pc:docMk/>
+            <pc:sldMk cId="1383628516" sldId="258"/>
+            <ac:spMk id="81" creationId="{978C462F-9427-450A-945A-6CFF03A57BC0}"/>
+          </ac:spMkLst>
+        </pc:spChg>
+        <pc:spChg chg="add mod">
+          <ac:chgData name="박 성훈" userId="ceb7f861bde8184c" providerId="LiveId" clId="{2FF4D961-35C2-4468-87DC-0168A54CF785}" dt="2018-11-29T19:31:16.458" v="2353" actId="164"/>
+          <ac:spMkLst>
+            <pc:docMk/>
+            <pc:sldMk cId="1383628516" sldId="258"/>
+            <ac:spMk id="85" creationId="{B53B48AD-96F1-4473-B991-897BEDC1604B}"/>
+          </ac:spMkLst>
+        </pc:spChg>
+        <pc:spChg chg="add del mod">
+          <ac:chgData name="박 성훈" userId="ceb7f861bde8184c" providerId="LiveId" clId="{2FF4D961-35C2-4468-87DC-0168A54CF785}" dt="2018-11-29T19:26:06.110" v="2258" actId="478"/>
+          <ac:spMkLst>
+            <pc:docMk/>
+            <pc:sldMk cId="1383628516" sldId="258"/>
+            <ac:spMk id="86" creationId="{F3F42E47-4140-4F2F-9873-3F6B5EF865CA}"/>
+          </ac:spMkLst>
+        </pc:spChg>
+        <pc:spChg chg="add mod">
+          <ac:chgData name="박 성훈" userId="ceb7f861bde8184c" providerId="LiveId" clId="{2FF4D961-35C2-4468-87DC-0168A54CF785}" dt="2018-11-29T19:31:16.458" v="2353" actId="164"/>
+          <ac:spMkLst>
+            <pc:docMk/>
+            <pc:sldMk cId="1383628516" sldId="258"/>
+            <ac:spMk id="89" creationId="{F05EEA1D-27B3-4CE2-8F4F-128B2C9323F2}"/>
+          </ac:spMkLst>
+        </pc:spChg>
+        <pc:spChg chg="add del">
+          <ac:chgData name="박 성훈" userId="ceb7f861bde8184c" providerId="LiveId" clId="{2FF4D961-35C2-4468-87DC-0168A54CF785}" dt="2018-11-29T19:26:07.943" v="2260"/>
+          <ac:spMkLst>
+            <pc:docMk/>
+            <pc:sldMk cId="1383628516" sldId="258"/>
+            <ac:spMk id="90" creationId="{1505D25D-A371-444E-8C08-9DF463483993}"/>
+          </ac:spMkLst>
+        </pc:spChg>
+        <pc:spChg chg="add mod">
+          <ac:chgData name="박 성훈" userId="ceb7f861bde8184c" providerId="LiveId" clId="{2FF4D961-35C2-4468-87DC-0168A54CF785}" dt="2018-11-29T19:31:16.458" v="2353" actId="164"/>
+          <ac:spMkLst>
+            <pc:docMk/>
+            <pc:sldMk cId="1383628516" sldId="258"/>
+            <ac:spMk id="93" creationId="{DCACBAD6-5385-407A-B4A1-28FB9D409F23}"/>
+          </ac:spMkLst>
+        </pc:spChg>
+        <pc:spChg chg="add del mod">
+          <ac:chgData name="박 성훈" userId="ceb7f861bde8184c" providerId="LiveId" clId="{2FF4D961-35C2-4468-87DC-0168A54CF785}" dt="2018-11-29T19:27:27.794" v="2265" actId="478"/>
+          <ac:spMkLst>
+            <pc:docMk/>
+            <pc:sldMk cId="1383628516" sldId="258"/>
+            <ac:spMk id="94" creationId="{7239482F-EAD0-4AC7-9F6A-B65AE05452E7}"/>
+          </ac:spMkLst>
+        </pc:spChg>
+        <pc:spChg chg="add mod ord">
+          <ac:chgData name="박 성훈" userId="ceb7f861bde8184c" providerId="LiveId" clId="{2FF4D961-35C2-4468-87DC-0168A54CF785}" dt="2018-11-29T19:31:16.458" v="2353" actId="164"/>
+          <ac:spMkLst>
+            <pc:docMk/>
+            <pc:sldMk cId="1383628516" sldId="258"/>
+            <ac:spMk id="95" creationId="{C70D2D60-5719-418B-A8B3-3C63CB7019FD}"/>
+          </ac:spMkLst>
+        </pc:spChg>
+        <pc:spChg chg="add mod">
+          <ac:chgData name="박 성훈" userId="ceb7f861bde8184c" providerId="LiveId" clId="{2FF4D961-35C2-4468-87DC-0168A54CF785}" dt="2018-11-29T19:31:16.458" v="2353" actId="164"/>
+          <ac:spMkLst>
+            <pc:docMk/>
+            <pc:sldMk cId="1383628516" sldId="258"/>
+            <ac:spMk id="98" creationId="{7AC120CD-15F3-4C6B-BA3C-9A4D949B4DE1}"/>
+          </ac:spMkLst>
+        </pc:spChg>
+        <pc:spChg chg="add mod">
+          <ac:chgData name="박 성훈" userId="ceb7f861bde8184c" providerId="LiveId" clId="{2FF4D961-35C2-4468-87DC-0168A54CF785}" dt="2018-11-29T19:31:01.171" v="2347" actId="164"/>
+          <ac:spMkLst>
+            <pc:docMk/>
+            <pc:sldMk cId="1383628516" sldId="258"/>
+            <ac:spMk id="108" creationId="{5890148C-F3E5-4C73-9252-388EF5BC37BF}"/>
+          </ac:spMkLst>
+        </pc:spChg>
+        <pc:spChg chg="add mod">
+          <ac:chgData name="박 성훈" userId="ceb7f861bde8184c" providerId="LiveId" clId="{2FF4D961-35C2-4468-87DC-0168A54CF785}" dt="2018-11-29T19:31:01.171" v="2347" actId="164"/>
+          <ac:spMkLst>
+            <pc:docMk/>
+            <pc:sldMk cId="1383628516" sldId="258"/>
+            <ac:spMk id="109" creationId="{8B3D3382-F0D8-472B-8075-F21799E46937}"/>
+          </ac:spMkLst>
+        </pc:spChg>
+        <pc:grpChg chg="add mod">
+          <ac:chgData name="박 성훈" userId="ceb7f861bde8184c" providerId="LiveId" clId="{2FF4D961-35C2-4468-87DC-0168A54CF785}" dt="2018-11-29T19:17:46.039" v="2127" actId="1076"/>
+          <ac:grpSpMkLst>
+            <pc:docMk/>
+            <pc:sldMk cId="1383628516" sldId="258"/>
+            <ac:grpSpMk id="2" creationId="{450A61E9-E727-4F30-B847-BC00A4F7B602}"/>
+          </ac:grpSpMkLst>
+        </pc:grpChg>
+        <pc:grpChg chg="add del mod">
+          <ac:chgData name="박 성훈" userId="ceb7f861bde8184c" providerId="LiveId" clId="{2FF4D961-35C2-4468-87DC-0168A54CF785}" dt="2018-11-29T19:31:32.707" v="2356" actId="165"/>
+          <ac:grpSpMkLst>
+            <pc:docMk/>
+            <pc:sldMk cId="1383628516" sldId="258"/>
+            <ac:grpSpMk id="29" creationId="{5880CE76-A7D2-4BF2-9E4D-498E00E41DEC}"/>
+          </ac:grpSpMkLst>
+        </pc:grpChg>
+        <pc:grpChg chg="mod topLvl">
+          <ac:chgData name="박 성훈" userId="ceb7f861bde8184c" providerId="LiveId" clId="{2FF4D961-35C2-4468-87DC-0168A54CF785}" dt="2018-11-29T19:34:40.472" v="2382" actId="164"/>
+          <ac:grpSpMkLst>
+            <pc:docMk/>
+            <pc:sldMk cId="1383628516" sldId="258"/>
+            <ac:grpSpMk id="43" creationId="{2137F70F-1FD6-4390-AC6D-10EA74791378}"/>
+          </ac:grpSpMkLst>
+        </pc:grpChg>
+        <pc:grpChg chg="del mod">
+          <ac:chgData name="박 성훈" userId="ceb7f861bde8184c" providerId="LiveId" clId="{2FF4D961-35C2-4468-87DC-0168A54CF785}" dt="2018-11-29T19:21:22.018" v="2156" actId="478"/>
+          <ac:grpSpMkLst>
+            <pc:docMk/>
+            <pc:sldMk cId="1383628516" sldId="258"/>
+            <ac:grpSpMk id="45" creationId="{BF03FE7A-436A-45A9-B23D-DF7E7A6CB1A3}"/>
+          </ac:grpSpMkLst>
+        </pc:grpChg>
+        <pc:grpChg chg="mod">
+          <ac:chgData name="박 성훈" userId="ceb7f861bde8184c" providerId="LiveId" clId="{2FF4D961-35C2-4468-87DC-0168A54CF785}" dt="2018-11-29T19:20:08.033" v="2137"/>
+          <ac:grpSpMkLst>
+            <pc:docMk/>
+            <pc:sldMk cId="1383628516" sldId="258"/>
+            <ac:grpSpMk id="49" creationId="{0E3ECA79-F79D-422B-B530-2F17959E2DE7}"/>
+          </ac:grpSpMkLst>
+        </pc:grpChg>
+        <pc:grpChg chg="add del mod">
+          <ac:chgData name="박 성훈" userId="ceb7f861bde8184c" providerId="LiveId" clId="{2FF4D961-35C2-4468-87DC-0168A54CF785}" dt="2018-11-29T19:23:38.787" v="2216" actId="165"/>
+          <ac:grpSpMkLst>
+            <pc:docMk/>
+            <pc:sldMk cId="1383628516" sldId="258"/>
+            <ac:grpSpMk id="65" creationId="{CE4B4FCA-4F5B-47DE-9EED-A6057CDC9CCE}"/>
+          </ac:grpSpMkLst>
+        </pc:grpChg>
+        <pc:grpChg chg="add del mod">
+          <ac:chgData name="박 성훈" userId="ceb7f861bde8184c" providerId="LiveId" clId="{2FF4D961-35C2-4468-87DC-0168A54CF785}" dt="2018-11-29T19:24:35.101" v="2240"/>
+          <ac:grpSpMkLst>
+            <pc:docMk/>
+            <pc:sldMk cId="1383628516" sldId="258"/>
+            <ac:grpSpMk id="76" creationId="{2DE54DBB-08F3-4B9F-ABB6-5584BE5869B8}"/>
+          </ac:grpSpMkLst>
+        </pc:grpChg>
+        <pc:grpChg chg="add mod">
+          <ac:chgData name="박 성훈" userId="ceb7f861bde8184c" providerId="LiveId" clId="{2FF4D961-35C2-4468-87DC-0168A54CF785}" dt="2018-11-29T19:34:40.472" v="2382" actId="164"/>
+          <ac:grpSpMkLst>
+            <pc:docMk/>
+            <pc:sldMk cId="1383628516" sldId="258"/>
+            <ac:grpSpMk id="77" creationId="{AA48D9F6-6390-4F39-A7E1-8AD1BFCB8DC7}"/>
+          </ac:grpSpMkLst>
+        </pc:grpChg>
+        <pc:grpChg chg="add mod">
+          <ac:chgData name="박 성훈" userId="ceb7f861bde8184c" providerId="LiveId" clId="{2FF4D961-35C2-4468-87DC-0168A54CF785}" dt="2018-11-29T19:31:16.458" v="2353" actId="164"/>
+          <ac:grpSpMkLst>
+            <pc:docMk/>
+            <pc:sldMk cId="1383628516" sldId="258"/>
+            <ac:grpSpMk id="110" creationId="{E8EBD54C-7129-4E69-BCEF-AC1788765B63}"/>
+          </ac:grpSpMkLst>
+        </pc:grpChg>
+        <pc:grpChg chg="add mod">
+          <ac:chgData name="박 성훈" userId="ceb7f861bde8184c" providerId="LiveId" clId="{2FF4D961-35C2-4468-87DC-0168A54CF785}" dt="2018-11-29T19:31:16.458" v="2353" actId="164"/>
+          <ac:grpSpMkLst>
+            <pc:docMk/>
+            <pc:sldMk cId="1383628516" sldId="258"/>
+            <ac:grpSpMk id="111" creationId="{C4A14C03-4C0F-45C0-8F84-E85D105822F7}"/>
+          </ac:grpSpMkLst>
+        </pc:grpChg>
+        <pc:grpChg chg="add mod">
+          <ac:chgData name="박 성훈" userId="ceb7f861bde8184c" providerId="LiveId" clId="{2FF4D961-35C2-4468-87DC-0168A54CF785}" dt="2018-11-29T19:31:16.458" v="2353" actId="164"/>
+          <ac:grpSpMkLst>
+            <pc:docMk/>
+            <pc:sldMk cId="1383628516" sldId="258"/>
+            <ac:grpSpMk id="114" creationId="{5A2CD1BD-68E4-4B4D-8E4F-88F2B1F4D540}"/>
+          </ac:grpSpMkLst>
+        </pc:grpChg>
+        <pc:grpChg chg="add mod">
+          <ac:chgData name="박 성훈" userId="ceb7f861bde8184c" providerId="LiveId" clId="{2FF4D961-35C2-4468-87DC-0168A54CF785}" dt="2018-11-29T19:34:40.472" v="2382" actId="164"/>
+          <ac:grpSpMkLst>
+            <pc:docMk/>
+            <pc:sldMk cId="1383628516" sldId="258"/>
+            <ac:grpSpMk id="117" creationId="{51C7A4AA-7631-45B8-B2E5-E683279F2F01}"/>
+          </ac:grpSpMkLst>
+        </pc:grpChg>
+        <pc:grpChg chg="add mod">
+          <ac:chgData name="박 성훈" userId="ceb7f861bde8184c" providerId="LiveId" clId="{2FF4D961-35C2-4468-87DC-0168A54CF785}" dt="2018-11-29T19:34:36.326" v="2380" actId="164"/>
+          <ac:grpSpMkLst>
+            <pc:docMk/>
+            <pc:sldMk cId="1383628516" sldId="258"/>
+            <ac:grpSpMk id="120" creationId="{148F2A73-A324-4370-9744-85DB58EA0486}"/>
+          </ac:grpSpMkLst>
+        </pc:grpChg>
+        <pc:grpChg chg="add mod">
+          <ac:chgData name="박 성훈" userId="ceb7f861bde8184c" providerId="LiveId" clId="{2FF4D961-35C2-4468-87DC-0168A54CF785}" dt="2018-11-29T19:34:44.336" v="2383" actId="1076"/>
+          <ac:grpSpMkLst>
+            <pc:docMk/>
+            <pc:sldMk cId="1383628516" sldId="258"/>
+            <ac:grpSpMk id="121" creationId="{08C1DDAD-E6B2-42FA-B859-377B41C819CE}"/>
+          </ac:grpSpMkLst>
+        </pc:grpChg>
+        <pc:picChg chg="add mod">
+          <ac:chgData name="박 성훈" userId="ceb7f861bde8184c" providerId="LiveId" clId="{2FF4D961-35C2-4468-87DC-0168A54CF785}" dt="2018-11-29T19:34:38.957" v="2381" actId="1076"/>
+          <ac:picMkLst>
+            <pc:docMk/>
+            <pc:sldMk cId="1383628516" sldId="258"/>
+            <ac:picMk id="28" creationId="{A433E069-71B6-4946-B525-E03632F7D177}"/>
+          </ac:picMkLst>
+        </pc:picChg>
+        <pc:picChg chg="del">
+          <ac:chgData name="박 성훈" userId="ceb7f861bde8184c" providerId="LiveId" clId="{2FF4D961-35C2-4468-87DC-0168A54CF785}" dt="2018-11-29T19:24:57.839" v="2246" actId="478"/>
+          <ac:picMkLst>
+            <pc:docMk/>
+            <pc:sldMk cId="1383628516" sldId="258"/>
+            <ac:picMk id="44" creationId="{A0650417-BBB2-4421-BE69-B02B7284CA05}"/>
+          </ac:picMkLst>
+        </pc:picChg>
+        <pc:picChg chg="add del mod">
+          <ac:chgData name="박 성훈" userId="ceb7f861bde8184c" providerId="LiveId" clId="{2FF4D961-35C2-4468-87DC-0168A54CF785}" dt="2018-11-29T19:34:30.377" v="2376" actId="478"/>
+          <ac:picMkLst>
+            <pc:docMk/>
+            <pc:sldMk cId="1383628516" sldId="258"/>
+            <ac:picMk id="97" creationId="{16AA2E65-E148-4DA8-A278-436C24149254}"/>
+          </ac:picMkLst>
+        </pc:picChg>
+        <pc:picChg chg="add del mod">
+          <ac:chgData name="박 성훈" userId="ceb7f861bde8184c" providerId="LiveId" clId="{2FF4D961-35C2-4468-87DC-0168A54CF785}" dt="2018-11-29T19:34:29.645" v="2375" actId="478"/>
+          <ac:picMkLst>
+            <pc:docMk/>
+            <pc:sldMk cId="1383628516" sldId="258"/>
+            <ac:picMk id="119" creationId="{013232BC-88AF-4FA2-9A5B-FC768E154E4D}"/>
+          </ac:picMkLst>
+        </pc:picChg>
+        <pc:cxnChg chg="add mod topLvl">
+          <ac:chgData name="박 성훈" userId="ceb7f861bde8184c" providerId="LiveId" clId="{2FF4D961-35C2-4468-87DC-0168A54CF785}" dt="2018-11-29T19:24:33.005" v="2239" actId="164"/>
+          <ac:cxnSpMkLst>
+            <pc:docMk/>
+            <pc:sldMk cId="1383628516" sldId="258"/>
+            <ac:cxnSpMk id="56" creationId="{AC933E95-4D0A-4977-830A-F1CF360EA2B3}"/>
+          </ac:cxnSpMkLst>
+        </pc:cxnChg>
+        <pc:cxnChg chg="add del mod topLvl">
+          <ac:chgData name="박 성훈" userId="ceb7f861bde8184c" providerId="LiveId" clId="{2FF4D961-35C2-4468-87DC-0168A54CF785}" dt="2018-11-29T19:24:30.582" v="2238" actId="478"/>
+          <ac:cxnSpMkLst>
+            <pc:docMk/>
+            <pc:sldMk cId="1383628516" sldId="258"/>
+            <ac:cxnSpMk id="57" creationId="{50D1A08A-65DE-41E1-B391-A4219F693E56}"/>
+          </ac:cxnSpMkLst>
+        </pc:cxnChg>
+        <pc:cxnChg chg="add del mod topLvl">
+          <ac:chgData name="박 성훈" userId="ceb7f861bde8184c" providerId="LiveId" clId="{2FF4D961-35C2-4468-87DC-0168A54CF785}" dt="2018-11-29T19:24:30.582" v="2238" actId="478"/>
+          <ac:cxnSpMkLst>
+            <pc:docMk/>
+            <pc:sldMk cId="1383628516" sldId="258"/>
+            <ac:cxnSpMk id="63" creationId="{0CD5FB02-4252-434A-B9B4-DDA307C3D000}"/>
+          </ac:cxnSpMkLst>
+        </pc:cxnChg>
+        <pc:cxnChg chg="add mod">
+          <ac:chgData name="박 성훈" userId="ceb7f861bde8184c" providerId="LiveId" clId="{2FF4D961-35C2-4468-87DC-0168A54CF785}" dt="2018-11-29T19:24:33.005" v="2239" actId="164"/>
+          <ac:cxnSpMkLst>
+            <pc:docMk/>
+            <pc:sldMk cId="1383628516" sldId="258"/>
+            <ac:cxnSpMk id="67" creationId="{52E570FC-544F-428C-B31A-DB85B8A2F584}"/>
+          </ac:cxnSpMkLst>
+        </pc:cxnChg>
+        <pc:cxnChg chg="add mod">
+          <ac:chgData name="박 성훈" userId="ceb7f861bde8184c" providerId="LiveId" clId="{2FF4D961-35C2-4468-87DC-0168A54CF785}" dt="2018-11-29T19:24:33.005" v="2239" actId="164"/>
+          <ac:cxnSpMkLst>
+            <pc:docMk/>
+            <pc:sldMk cId="1383628516" sldId="258"/>
+            <ac:cxnSpMk id="71" creationId="{00BE5A57-7426-4810-9F6C-E3DC5052EC48}"/>
+          </ac:cxnSpMkLst>
+        </pc:cxnChg>
+        <pc:cxnChg chg="mod">
+          <ac:chgData name="박 성훈" userId="ceb7f861bde8184c" providerId="LiveId" clId="{2FF4D961-35C2-4468-87DC-0168A54CF785}" dt="2018-11-29T19:24:51.784" v="2245" actId="692"/>
+          <ac:cxnSpMkLst>
+            <pc:docMk/>
+            <pc:sldMk cId="1383628516" sldId="258"/>
+            <ac:cxnSpMk id="78" creationId="{5D6E3755-6F0B-45E3-B335-935A0574503E}"/>
+          </ac:cxnSpMkLst>
+        </pc:cxnChg>
+        <pc:cxnChg chg="mod">
+          <ac:chgData name="박 성훈" userId="ceb7f861bde8184c" providerId="LiveId" clId="{2FF4D961-35C2-4468-87DC-0168A54CF785}" dt="2018-11-29T19:24:51.784" v="2245" actId="692"/>
+          <ac:cxnSpMkLst>
+            <pc:docMk/>
+            <pc:sldMk cId="1383628516" sldId="258"/>
+            <ac:cxnSpMk id="79" creationId="{CF398EB9-7DD2-45FA-81F3-CCA0F5103009}"/>
+          </ac:cxnSpMkLst>
+        </pc:cxnChg>
+        <pc:cxnChg chg="mod">
+          <ac:chgData name="박 성훈" userId="ceb7f861bde8184c" providerId="LiveId" clId="{2FF4D961-35C2-4468-87DC-0168A54CF785}" dt="2018-11-29T19:24:51.784" v="2245" actId="692"/>
+          <ac:cxnSpMkLst>
+            <pc:docMk/>
+            <pc:sldMk cId="1383628516" sldId="258"/>
+            <ac:cxnSpMk id="80" creationId="{FF25B155-432B-44FA-8C78-3239B51B4187}"/>
+          </ac:cxnSpMkLst>
+        </pc:cxnChg>
+        <pc:cxnChg chg="add mod">
+          <ac:chgData name="박 성훈" userId="ceb7f861bde8184c" providerId="LiveId" clId="{2FF4D961-35C2-4468-87DC-0168A54CF785}" dt="2018-11-29T19:31:16.458" v="2353" actId="164"/>
+          <ac:cxnSpMkLst>
+            <pc:docMk/>
+            <pc:sldMk cId="1383628516" sldId="258"/>
+            <ac:cxnSpMk id="83" creationId="{9BBC6A9F-4143-4F3C-8613-8C9E901559C5}"/>
+          </ac:cxnSpMkLst>
+        </pc:cxnChg>
+        <pc:cxnChg chg="add mod">
+          <ac:chgData name="박 성훈" userId="ceb7f861bde8184c" providerId="LiveId" clId="{2FF4D961-35C2-4468-87DC-0168A54CF785}" dt="2018-11-29T19:31:16.458" v="2353" actId="164"/>
+          <ac:cxnSpMkLst>
+            <pc:docMk/>
+            <pc:sldMk cId="1383628516" sldId="258"/>
+            <ac:cxnSpMk id="84" creationId="{4AAF5394-292C-4B1F-92E8-F8DB51E8C67C}"/>
+          </ac:cxnSpMkLst>
+        </pc:cxnChg>
+        <pc:cxnChg chg="add mod">
+          <ac:chgData name="박 성훈" userId="ceb7f861bde8184c" providerId="LiveId" clId="{2FF4D961-35C2-4468-87DC-0168A54CF785}" dt="2018-11-29T19:31:16.458" v="2353" actId="164"/>
+          <ac:cxnSpMkLst>
+            <pc:docMk/>
+            <pc:sldMk cId="1383628516" sldId="258"/>
+            <ac:cxnSpMk id="87" creationId="{30514645-A395-4BD5-8B76-39C91E22A3FA}"/>
+          </ac:cxnSpMkLst>
+        </pc:cxnChg>
+        <pc:cxnChg chg="add mod">
+          <ac:chgData name="박 성훈" userId="ceb7f861bde8184c" providerId="LiveId" clId="{2FF4D961-35C2-4468-87DC-0168A54CF785}" dt="2018-11-29T19:31:16.458" v="2353" actId="164"/>
+          <ac:cxnSpMkLst>
+            <pc:docMk/>
+            <pc:sldMk cId="1383628516" sldId="258"/>
+            <ac:cxnSpMk id="88" creationId="{04FE7F65-5B9A-469F-8B6F-F81AB2493475}"/>
+          </ac:cxnSpMkLst>
+        </pc:cxnChg>
+        <pc:cxnChg chg="add mod">
+          <ac:chgData name="박 성훈" userId="ceb7f861bde8184c" providerId="LiveId" clId="{2FF4D961-35C2-4468-87DC-0168A54CF785}" dt="2018-11-29T19:31:16.458" v="2353" actId="164"/>
+          <ac:cxnSpMkLst>
+            <pc:docMk/>
+            <pc:sldMk cId="1383628516" sldId="258"/>
+            <ac:cxnSpMk id="91" creationId="{4ACC8DBE-C5A6-470F-80E8-33E5C5DE03EA}"/>
+          </ac:cxnSpMkLst>
+        </pc:cxnChg>
+        <pc:cxnChg chg="add mod">
+          <ac:chgData name="박 성훈" userId="ceb7f861bde8184c" providerId="LiveId" clId="{2FF4D961-35C2-4468-87DC-0168A54CF785}" dt="2018-11-29T19:31:16.458" v="2353" actId="164"/>
+          <ac:cxnSpMkLst>
+            <pc:docMk/>
+            <pc:sldMk cId="1383628516" sldId="258"/>
+            <ac:cxnSpMk id="92" creationId="{FD191FD8-56B1-4F30-9AF8-9BB6B32F539D}"/>
+          </ac:cxnSpMkLst>
+        </pc:cxnChg>
+        <pc:cxnChg chg="add del mod">
+          <ac:chgData name="박 성훈" userId="ceb7f861bde8184c" providerId="LiveId" clId="{2FF4D961-35C2-4468-87DC-0168A54CF785}" dt="2018-11-29T19:30:34.541" v="2336" actId="478"/>
+          <ac:cxnSpMkLst>
+            <pc:docMk/>
+            <pc:sldMk cId="1383628516" sldId="258"/>
+            <ac:cxnSpMk id="100" creationId="{6664DB80-12FB-46B6-BCF1-9D5DC1538810}"/>
+          </ac:cxnSpMkLst>
+        </pc:cxnChg>
+        <pc:cxnChg chg="add del mod">
+          <ac:chgData name="박 성훈" userId="ceb7f861bde8184c" providerId="LiveId" clId="{2FF4D961-35C2-4468-87DC-0168A54CF785}" dt="2018-11-29T19:30:05.912" v="2316"/>
+          <ac:cxnSpMkLst>
+            <pc:docMk/>
+            <pc:sldMk cId="1383628516" sldId="258"/>
+            <ac:cxnSpMk id="101" creationId="{71156147-02B7-4244-A368-35C08AB302CC}"/>
+          </ac:cxnSpMkLst>
+        </pc:cxnChg>
+        <pc:cxnChg chg="add mod">
+          <ac:chgData name="박 성훈" userId="ceb7f861bde8184c" providerId="LiveId" clId="{2FF4D961-35C2-4468-87DC-0168A54CF785}" dt="2018-11-29T19:31:16.458" v="2353" actId="164"/>
+          <ac:cxnSpMkLst>
+            <pc:docMk/>
+            <pc:sldMk cId="1383628516" sldId="258"/>
+            <ac:cxnSpMk id="102" creationId="{6A418CCE-743B-47A0-BCE1-ABE9143117D7}"/>
+          </ac:cxnSpMkLst>
+        </pc:cxnChg>
+        <pc:cxnChg chg="add del mod">
+          <ac:chgData name="박 성훈" userId="ceb7f861bde8184c" providerId="LiveId" clId="{2FF4D961-35C2-4468-87DC-0168A54CF785}" dt="2018-11-29T19:30:26.057" v="2327"/>
+          <ac:cxnSpMkLst>
+            <pc:docMk/>
+            <pc:sldMk cId="1383628516" sldId="258"/>
+            <ac:cxnSpMk id="103" creationId="{CEF8201C-B555-41EC-9CDF-022311068009}"/>
+          </ac:cxnSpMkLst>
+        </pc:cxnChg>
+        <pc:cxnChg chg="add mod">
+          <ac:chgData name="박 성훈" userId="ceb7f861bde8184c" providerId="LiveId" clId="{2FF4D961-35C2-4468-87DC-0168A54CF785}" dt="2018-11-29T19:31:16.458" v="2353" actId="164"/>
+          <ac:cxnSpMkLst>
+            <pc:docMk/>
+            <pc:sldMk cId="1383628516" sldId="258"/>
+            <ac:cxnSpMk id="106" creationId="{94A7CCB9-CB30-4D81-86F8-89A53E2B2D27}"/>
+          </ac:cxnSpMkLst>
+        </pc:cxnChg>
+        <pc:cxnChg chg="add mod">
+          <ac:chgData name="박 성훈" userId="ceb7f861bde8184c" providerId="LiveId" clId="{2FF4D961-35C2-4468-87DC-0168A54CF785}" dt="2018-11-29T19:31:16.458" v="2353" actId="164"/>
+          <ac:cxnSpMkLst>
+            <pc:docMk/>
+            <pc:sldMk cId="1383628516" sldId="258"/>
+            <ac:cxnSpMk id="107" creationId="{0863F527-C0AD-44FE-BF07-7B9E0EFD878A}"/>
+          </ac:cxnSpMkLst>
+        </pc:cxnChg>
       </pc:sldChg>
     </pc:docChg>
   </pc:docChgLst>
@@ -12400,7 +13024,7 @@
         </p:nvSpPr>
         <p:spPr>
           <a:xfrm>
-            <a:off x="8410921" y="740423"/>
+            <a:off x="-132315" y="23326"/>
             <a:ext cx="12192000" cy="6858000"/>
           </a:xfrm>
           <a:prstGeom prst="rect">
@@ -13129,7 +13753,7 @@
         </p:nvSpPr>
         <p:spPr>
           <a:xfrm>
-            <a:off x="1103997" y="2518881"/>
+            <a:off x="921850" y="2447065"/>
             <a:ext cx="1112741" cy="307777"/>
           </a:xfrm>
           <a:prstGeom prst="rect">
@@ -13163,174 +13787,42 @@
           </a:p>
         </p:txBody>
       </p:sp>
-      <p:sp>
-        <p:nvSpPr>
-          <p:cNvPr id="50" name="타원 49">
+    </p:spTree>
+    <p:extLst>
+      <p:ext uri="{BB962C8B-B14F-4D97-AF65-F5344CB8AC3E}">
+        <p14:creationId xmlns:p14="http://schemas.microsoft.com/office/powerpoint/2010/main" val="2618606824"/>
+      </p:ext>
+    </p:extLst>
+  </p:cSld>
+  <p:clrMapOvr>
+    <a:masterClrMapping/>
+  </p:clrMapOvr>
+</p:sld>
+</file>
+
+<file path=ppt/slides/slide3.xml><?xml version="1.0" encoding="utf-8"?>
+<p:sld xmlns:a="http://schemas.openxmlformats.org/drawingml/2006/main" xmlns:r="http://schemas.openxmlformats.org/officeDocument/2006/relationships" xmlns:p="http://schemas.openxmlformats.org/presentationml/2006/main">
+  <p:cSld>
+    <p:spTree>
+      <p:nvGrpSpPr>
+        <p:cNvPr id="1" name=""/>
+        <p:cNvGrpSpPr/>
+        <p:nvPr/>
+      </p:nvGrpSpPr>
+      <p:grpSpPr>
+        <a:xfrm>
+          <a:off x="0" y="0"/>
+          <a:ext cx="0" cy="0"/>
+          <a:chOff x="0" y="0"/>
+          <a:chExt cx="0" cy="0"/>
+        </a:xfrm>
+      </p:grpSpPr>
+      <p:grpSp>
+        <p:nvGrpSpPr>
+          <p:cNvPr id="2" name="그룹 1">
             <a:extLst>
               <a:ext uri="{FF2B5EF4-FFF2-40B4-BE49-F238E27FC236}">
-                <a16:creationId xmlns:a16="http://schemas.microsoft.com/office/drawing/2014/main" id="{8152CEA2-655F-4E4B-8D52-4F44335DE3DE}"/>
-              </a:ext>
-            </a:extLst>
-          </p:cNvPr>
-          <p:cNvSpPr/>
-          <p:nvPr/>
-        </p:nvSpPr>
-        <p:spPr>
-          <a:xfrm>
-            <a:off x="1249369" y="2977802"/>
-            <a:ext cx="77781" cy="71558"/>
-          </a:xfrm>
-          <a:prstGeom prst="ellipse">
-            <a:avLst/>
-          </a:prstGeom>
-          <a:solidFill>
-            <a:schemeClr val="bg1"/>
-          </a:solidFill>
-          <a:ln>
-            <a:solidFill>
-              <a:srgbClr val="88D4DC"/>
-            </a:solidFill>
-          </a:ln>
-        </p:spPr>
-        <p:style>
-          <a:lnRef idx="2">
-            <a:schemeClr val="accent1">
-              <a:shade val="50000"/>
-            </a:schemeClr>
-          </a:lnRef>
-          <a:fillRef idx="1">
-            <a:schemeClr val="accent1"/>
-          </a:fillRef>
-          <a:effectRef idx="0">
-            <a:schemeClr val="accent1"/>
-          </a:effectRef>
-          <a:fontRef idx="minor">
-            <a:schemeClr val="lt1"/>
-          </a:fontRef>
-        </p:style>
-        <p:txBody>
-          <a:bodyPr rtlCol="0" anchor="ctr"/>
-          <a:lstStyle/>
-          <a:p>
-            <a:pPr algn="ctr"/>
-            <a:endParaRPr lang="ko-KR" altLang="en-US"/>
-          </a:p>
-        </p:txBody>
-      </p:sp>
-      <p:sp>
-        <p:nvSpPr>
-          <p:cNvPr id="51" name="타원 50">
-            <a:extLst>
-              <a:ext uri="{FF2B5EF4-FFF2-40B4-BE49-F238E27FC236}">
-                <a16:creationId xmlns:a16="http://schemas.microsoft.com/office/drawing/2014/main" id="{D6611DFD-C6E4-4165-AD39-E1150D076194}"/>
-              </a:ext>
-            </a:extLst>
-          </p:cNvPr>
-          <p:cNvSpPr/>
-          <p:nvPr/>
-        </p:nvSpPr>
-        <p:spPr>
-          <a:xfrm>
-            <a:off x="1396470" y="2977405"/>
-            <a:ext cx="77781" cy="71558"/>
-          </a:xfrm>
-          <a:prstGeom prst="ellipse">
-            <a:avLst/>
-          </a:prstGeom>
-          <a:solidFill>
-            <a:schemeClr val="bg1"/>
-          </a:solidFill>
-          <a:ln>
-            <a:solidFill>
-              <a:srgbClr val="88D4DC"/>
-            </a:solidFill>
-          </a:ln>
-        </p:spPr>
-        <p:style>
-          <a:lnRef idx="2">
-            <a:schemeClr val="accent1">
-              <a:shade val="50000"/>
-            </a:schemeClr>
-          </a:lnRef>
-          <a:fillRef idx="1">
-            <a:schemeClr val="accent1"/>
-          </a:fillRef>
-          <a:effectRef idx="0">
-            <a:schemeClr val="accent1"/>
-          </a:effectRef>
-          <a:fontRef idx="minor">
-            <a:schemeClr val="lt1"/>
-          </a:fontRef>
-        </p:style>
-        <p:txBody>
-          <a:bodyPr rtlCol="0" anchor="ctr"/>
-          <a:lstStyle/>
-          <a:p>
-            <a:pPr algn="ctr"/>
-            <a:endParaRPr lang="ko-KR" altLang="en-US"/>
-          </a:p>
-        </p:txBody>
-      </p:sp>
-      <p:sp>
-        <p:nvSpPr>
-          <p:cNvPr id="52" name="타원 51">
-            <a:extLst>
-              <a:ext uri="{FF2B5EF4-FFF2-40B4-BE49-F238E27FC236}">
-                <a16:creationId xmlns:a16="http://schemas.microsoft.com/office/drawing/2014/main" id="{10878E1A-5654-4644-A945-90DC05F587E7}"/>
-              </a:ext>
-            </a:extLst>
-          </p:cNvPr>
-          <p:cNvSpPr/>
-          <p:nvPr/>
-        </p:nvSpPr>
-        <p:spPr>
-          <a:xfrm>
-            <a:off x="1543571" y="2983778"/>
-            <a:ext cx="77781" cy="71558"/>
-          </a:xfrm>
-          <a:prstGeom prst="ellipse">
-            <a:avLst/>
-          </a:prstGeom>
-          <a:solidFill>
-            <a:schemeClr val="bg1"/>
-          </a:solidFill>
-          <a:ln>
-            <a:solidFill>
-              <a:srgbClr val="88D4DC"/>
-            </a:solidFill>
-          </a:ln>
-        </p:spPr>
-        <p:style>
-          <a:lnRef idx="2">
-            <a:schemeClr val="accent1">
-              <a:shade val="50000"/>
-            </a:schemeClr>
-          </a:lnRef>
-          <a:fillRef idx="1">
-            <a:schemeClr val="accent1"/>
-          </a:fillRef>
-          <a:effectRef idx="0">
-            <a:schemeClr val="accent1"/>
-          </a:effectRef>
-          <a:fontRef idx="minor">
-            <a:schemeClr val="lt1"/>
-          </a:fontRef>
-        </p:style>
-        <p:txBody>
-          <a:bodyPr rtlCol="0" anchor="ctr"/>
-          <a:lstStyle/>
-          <a:p>
-            <a:pPr algn="ctr"/>
-            <a:endParaRPr lang="ko-KR" altLang="en-US"/>
-          </a:p>
-        </p:txBody>
-      </p:sp>
-      <p:grpSp>
-        <p:nvGrpSpPr>
-          <p:cNvPr id="86" name="그룹 85">
-            <a:extLst>
-              <a:ext uri="{FF2B5EF4-FFF2-40B4-BE49-F238E27FC236}">
-                <a16:creationId xmlns:a16="http://schemas.microsoft.com/office/drawing/2014/main" id="{3466C381-30F8-4FBE-B7C6-9E5999F1B952}"/>
+                <a16:creationId xmlns:a16="http://schemas.microsoft.com/office/drawing/2014/main" id="{450A61E9-E727-4F30-B847-BC00A4F7B602}"/>
               </a:ext>
             </a:extLst>
           </p:cNvPr>
@@ -13339,18 +13831,18 @@
         </p:nvGrpSpPr>
         <p:grpSpPr>
           <a:xfrm>
-            <a:off x="3847703" y="2096195"/>
+            <a:off x="451360" y="224687"/>
             <a:ext cx="3312590" cy="3704870"/>
-            <a:chOff x="4324629" y="2096089"/>
+            <a:chOff x="3854773" y="2156901"/>
             <a:chExt cx="3312590" cy="3704870"/>
           </a:xfrm>
         </p:grpSpPr>
         <p:sp>
           <p:nvSpPr>
-            <p:cNvPr id="17" name="사각형: 둥근 모서리 16">
+            <p:cNvPr id="3" name="사각형: 둥근 모서리 2">
               <a:extLst>
                 <a:ext uri="{FF2B5EF4-FFF2-40B4-BE49-F238E27FC236}">
-                  <a16:creationId xmlns:a16="http://schemas.microsoft.com/office/drawing/2014/main" id="{51BFACEC-1C09-47FE-B852-BD82A11254B9}"/>
+                  <a16:creationId xmlns:a16="http://schemas.microsoft.com/office/drawing/2014/main" id="{1B234162-7BBA-46A9-8697-F37546ADABD8}"/>
                 </a:ext>
               </a:extLst>
             </p:cNvPr>
@@ -13359,7 +13851,7 @@
           </p:nvSpPr>
           <p:spPr>
             <a:xfrm>
-              <a:off x="4324629" y="2096089"/>
+              <a:off x="3854773" y="2156901"/>
               <a:ext cx="3312590" cy="3704870"/>
             </a:xfrm>
             <a:prstGeom prst="roundRect">
@@ -13372,7 +13864,7 @@
             </a:solidFill>
             <a:ln>
               <a:solidFill>
-                <a:srgbClr val="1F646B"/>
+                <a:srgbClr val="6600CC"/>
               </a:solidFill>
             </a:ln>
           </p:spPr>
@@ -13403,10 +13895,10 @@
         </p:sp>
         <p:sp>
           <p:nvSpPr>
-            <p:cNvPr id="26" name="타원 25">
+            <p:cNvPr id="4" name="타원 3">
               <a:extLst>
                 <a:ext uri="{FF2B5EF4-FFF2-40B4-BE49-F238E27FC236}">
-                  <a16:creationId xmlns:a16="http://schemas.microsoft.com/office/drawing/2014/main" id="{4658E7FE-16DE-4603-BB9A-979E80010326}"/>
+                  <a16:creationId xmlns:a16="http://schemas.microsoft.com/office/drawing/2014/main" id="{3EF8CB06-241F-46CB-AD41-F1125FF26398}"/>
                 </a:ext>
               </a:extLst>
             </p:cNvPr>
@@ -13415,7 +13907,7 @@
           </p:nvSpPr>
           <p:spPr>
             <a:xfrm>
-              <a:off x="6563003" y="3121178"/>
+              <a:off x="6086077" y="3121284"/>
               <a:ext cx="106497" cy="97977"/>
             </a:xfrm>
             <a:prstGeom prst="ellipse">
@@ -13426,7 +13918,7 @@
             </a:solidFill>
             <a:ln>
               <a:solidFill>
-                <a:srgbClr val="88D4DC"/>
+                <a:srgbClr val="CB97FF"/>
               </a:solidFill>
             </a:ln>
           </p:spPr>
@@ -13457,10 +13949,10 @@
         </p:sp>
         <p:sp>
           <p:nvSpPr>
-            <p:cNvPr id="27" name="타원 26">
+            <p:cNvPr id="5" name="타원 4">
               <a:extLst>
                 <a:ext uri="{FF2B5EF4-FFF2-40B4-BE49-F238E27FC236}">
-                  <a16:creationId xmlns:a16="http://schemas.microsoft.com/office/drawing/2014/main" id="{2D6DC2DF-16A8-4139-A573-808C256581B1}"/>
+                  <a16:creationId xmlns:a16="http://schemas.microsoft.com/office/drawing/2014/main" id="{10964FB0-6092-4998-9A23-16F0DEF636C5}"/>
                 </a:ext>
               </a:extLst>
             </p:cNvPr>
@@ -13469,14 +13961,14 @@
           </p:nvSpPr>
           <p:spPr>
             <a:xfrm>
-              <a:off x="6393868" y="3137148"/>
+              <a:off x="5916942" y="3137254"/>
               <a:ext cx="53813" cy="49509"/>
             </a:xfrm>
             <a:prstGeom prst="ellipse">
               <a:avLst/>
             </a:prstGeom>
             <a:solidFill>
-              <a:srgbClr val="88D4DC"/>
+              <a:srgbClr val="6600CC"/>
             </a:solidFill>
             <a:ln>
               <a:noFill/>
@@ -13509,10 +14001,10 @@
         </p:sp>
         <p:sp>
           <p:nvSpPr>
-            <p:cNvPr id="28" name="더하기 기호 27">
+            <p:cNvPr id="6" name="더하기 기호 5">
               <a:extLst>
                 <a:ext uri="{FF2B5EF4-FFF2-40B4-BE49-F238E27FC236}">
-                  <a16:creationId xmlns:a16="http://schemas.microsoft.com/office/drawing/2014/main" id="{48AD55EE-A2A0-4449-A591-FAFC17BFDC39}"/>
+                  <a16:creationId xmlns:a16="http://schemas.microsoft.com/office/drawing/2014/main" id="{1779A002-FC10-41EA-A48D-E6DF158162CD}"/>
                 </a:ext>
               </a:extLst>
             </p:cNvPr>
@@ -13521,7 +14013,7 @@
           </p:nvSpPr>
           <p:spPr>
             <a:xfrm>
-              <a:off x="6746553" y="3322568"/>
+              <a:off x="6269627" y="3322674"/>
               <a:ext cx="184396" cy="184396"/>
             </a:xfrm>
             <a:prstGeom prst="mathPlus">
@@ -13530,7 +14022,7 @@
               </a:avLst>
             </a:prstGeom>
             <a:solidFill>
-              <a:srgbClr val="AFE2E7"/>
+              <a:srgbClr val="6600CC"/>
             </a:solidFill>
             <a:ln>
               <a:noFill/>
@@ -13563,10 +14055,10 @@
         </p:sp>
         <p:sp>
           <p:nvSpPr>
-            <p:cNvPr id="29" name="타원 28">
+            <p:cNvPr id="7" name="타원 6">
               <a:extLst>
                 <a:ext uri="{FF2B5EF4-FFF2-40B4-BE49-F238E27FC236}">
-                  <a16:creationId xmlns:a16="http://schemas.microsoft.com/office/drawing/2014/main" id="{FD071B17-DD39-45FB-AE63-ECEB7B4EFB77}"/>
+                  <a16:creationId xmlns:a16="http://schemas.microsoft.com/office/drawing/2014/main" id="{B419FF43-FB8F-479F-ABC3-889FF2B15D1D}"/>
                 </a:ext>
               </a:extLst>
             </p:cNvPr>
@@ -13575,7 +14067,7 @@
           </p:nvSpPr>
           <p:spPr>
             <a:xfrm>
-              <a:off x="4936201" y="3457975"/>
+              <a:off x="4459275" y="3458081"/>
               <a:ext cx="106497" cy="97977"/>
             </a:xfrm>
             <a:prstGeom prst="ellipse">
@@ -13586,7 +14078,7 @@
             </a:solidFill>
             <a:ln>
               <a:solidFill>
-                <a:srgbClr val="88D4DC"/>
+                <a:srgbClr val="CB97FF"/>
               </a:solidFill>
             </a:ln>
           </p:spPr>
@@ -13617,10 +14109,10 @@
         </p:sp>
         <p:sp>
           <p:nvSpPr>
-            <p:cNvPr id="30" name="타원 29">
+            <p:cNvPr id="8" name="타원 7">
               <a:extLst>
                 <a:ext uri="{FF2B5EF4-FFF2-40B4-BE49-F238E27FC236}">
-                  <a16:creationId xmlns:a16="http://schemas.microsoft.com/office/drawing/2014/main" id="{C85427B4-99A1-4E7F-AF95-0BE7C7DFAF83}"/>
+                  <a16:creationId xmlns:a16="http://schemas.microsoft.com/office/drawing/2014/main" id="{88F9E5D6-F378-4D8F-AA67-F399A28E0A03}"/>
                 </a:ext>
               </a:extLst>
             </p:cNvPr>
@@ -13629,14 +14121,14 @@
           </p:nvSpPr>
           <p:spPr>
             <a:xfrm>
-              <a:off x="5119750" y="3390011"/>
+              <a:off x="4642824" y="3390117"/>
               <a:ext cx="53813" cy="49509"/>
             </a:xfrm>
             <a:prstGeom prst="ellipse">
               <a:avLst/>
             </a:prstGeom>
             <a:solidFill>
-              <a:srgbClr val="88D4DC"/>
+              <a:srgbClr val="6600CC"/>
             </a:solidFill>
             <a:ln>
               <a:noFill/>
@@ -13669,10 +14161,10 @@
         </p:sp>
         <p:sp>
           <p:nvSpPr>
-            <p:cNvPr id="31" name="더하기 기호 30">
+            <p:cNvPr id="9" name="더하기 기호 8">
               <a:extLst>
                 <a:ext uri="{FF2B5EF4-FFF2-40B4-BE49-F238E27FC236}">
-                  <a16:creationId xmlns:a16="http://schemas.microsoft.com/office/drawing/2014/main" id="{94DB454B-F3B7-4549-ABDA-71A39B0158FF}"/>
+                  <a16:creationId xmlns:a16="http://schemas.microsoft.com/office/drawing/2014/main" id="{DA711091-C5BA-4DBC-8CF8-3581B90EB70B}"/>
                 </a:ext>
               </a:extLst>
             </p:cNvPr>
@@ -13681,7 +14173,7 @@
           </p:nvSpPr>
           <p:spPr>
             <a:xfrm>
-              <a:off x="4989449" y="3583074"/>
+              <a:off x="4512523" y="3583180"/>
               <a:ext cx="184396" cy="184396"/>
             </a:xfrm>
             <a:prstGeom prst="mathPlus">
@@ -13690,7 +14182,7 @@
               </a:avLst>
             </a:prstGeom>
             <a:solidFill>
-              <a:srgbClr val="3AB3C0"/>
+              <a:srgbClr val="6600CC"/>
             </a:solidFill>
             <a:ln>
               <a:noFill/>
@@ -13723,10 +14215,10 @@
         </p:sp>
         <p:sp>
           <p:nvSpPr>
-            <p:cNvPr id="32" name="더하기 기호 31">
+            <p:cNvPr id="10" name="더하기 기호 9">
               <a:extLst>
                 <a:ext uri="{FF2B5EF4-FFF2-40B4-BE49-F238E27FC236}">
-                  <a16:creationId xmlns:a16="http://schemas.microsoft.com/office/drawing/2014/main" id="{4A2EA841-106E-45E1-BCD9-4F28D7E5BA72}"/>
+                  <a16:creationId xmlns:a16="http://schemas.microsoft.com/office/drawing/2014/main" id="{AFCA614E-FB1F-4946-B0B8-8BDADD4CCE53}"/>
                 </a:ext>
               </a:extLst>
             </p:cNvPr>
@@ -13735,7 +14227,7 @@
           </p:nvSpPr>
           <p:spPr>
             <a:xfrm>
-              <a:off x="6746553" y="4272218"/>
+              <a:off x="6269627" y="4272324"/>
               <a:ext cx="184396" cy="184396"/>
             </a:xfrm>
             <a:prstGeom prst="mathPlus">
@@ -13744,7 +14236,7 @@
               </a:avLst>
             </a:prstGeom>
             <a:solidFill>
-              <a:srgbClr val="3AB3C0"/>
+              <a:srgbClr val="6600CC"/>
             </a:solidFill>
             <a:ln>
               <a:noFill/>
@@ -13777,10 +14269,10 @@
         </p:sp>
         <p:sp>
           <p:nvSpPr>
-            <p:cNvPr id="35" name="별: 꼭짓점 12개 34">
+            <p:cNvPr id="11" name="별: 꼭짓점 12개 10">
               <a:extLst>
                 <a:ext uri="{FF2B5EF4-FFF2-40B4-BE49-F238E27FC236}">
-                  <a16:creationId xmlns:a16="http://schemas.microsoft.com/office/drawing/2014/main" id="{F551170F-C634-4E67-9844-DBC201934972}"/>
+                  <a16:creationId xmlns:a16="http://schemas.microsoft.com/office/drawing/2014/main" id="{48B11FF0-D618-4301-9424-A16D867D092A}"/>
                 </a:ext>
               </a:extLst>
             </p:cNvPr>
@@ -13789,7 +14281,7 @@
           </p:nvSpPr>
           <p:spPr>
             <a:xfrm>
-              <a:off x="5700859" y="3055335"/>
+              <a:off x="5223933" y="3055441"/>
               <a:ext cx="112283" cy="87548"/>
             </a:xfrm>
             <a:prstGeom prst="star12">
@@ -13802,7 +14294,7 @@
             </a:solidFill>
             <a:ln>
               <a:solidFill>
-                <a:srgbClr val="88D4DC"/>
+                <a:srgbClr val="CB97FF"/>
               </a:solidFill>
             </a:ln>
           </p:spPr>
@@ -13833,10 +14325,10 @@
         </p:sp>
         <p:sp>
           <p:nvSpPr>
-            <p:cNvPr id="36" name="별: 꼭짓점 12개 35">
+            <p:cNvPr id="12" name="별: 꼭짓점 12개 11">
               <a:extLst>
                 <a:ext uri="{FF2B5EF4-FFF2-40B4-BE49-F238E27FC236}">
-                  <a16:creationId xmlns:a16="http://schemas.microsoft.com/office/drawing/2014/main" id="{C886320E-4E06-4A01-BD47-DF2EFDDD0C05}"/>
+                  <a16:creationId xmlns:a16="http://schemas.microsoft.com/office/drawing/2014/main" id="{34694819-0B92-4278-8225-8CD3F6879561}"/>
                 </a:ext>
               </a:extLst>
             </p:cNvPr>
@@ -13845,7 +14337,7 @@
           </p:nvSpPr>
           <p:spPr>
             <a:xfrm>
-              <a:off x="6872811" y="4169422"/>
+              <a:off x="6395885" y="4169528"/>
               <a:ext cx="96079" cy="74914"/>
             </a:xfrm>
             <a:prstGeom prst="star12">
@@ -13858,7 +14350,7 @@
             </a:solidFill>
             <a:ln>
               <a:solidFill>
-                <a:srgbClr val="88D4DC"/>
+                <a:srgbClr val="CB97FF"/>
               </a:solidFill>
             </a:ln>
           </p:spPr>
@@ -13889,10 +14381,10 @@
         </p:sp>
         <p:sp>
           <p:nvSpPr>
-            <p:cNvPr id="38" name="사각형: 둥근 모서리 37">
+            <p:cNvPr id="13" name="사각형: 둥근 모서리 12">
               <a:extLst>
                 <a:ext uri="{FF2B5EF4-FFF2-40B4-BE49-F238E27FC236}">
-                  <a16:creationId xmlns:a16="http://schemas.microsoft.com/office/drawing/2014/main" id="{1AF0CD46-9E40-4747-BCF8-DEAEE72F20ED}"/>
+                  <a16:creationId xmlns:a16="http://schemas.microsoft.com/office/drawing/2014/main" id="{4581CA6E-5285-4F92-8EF1-8345AA5D5BBE}"/>
                 </a:ext>
               </a:extLst>
             </p:cNvPr>
@@ -13901,7 +14393,7 @@
           </p:nvSpPr>
           <p:spPr>
             <a:xfrm>
-              <a:off x="4883621" y="4972883"/>
+              <a:off x="4406695" y="5031879"/>
               <a:ext cx="2194606" cy="525629"/>
             </a:xfrm>
             <a:prstGeom prst="roundRect">
@@ -13910,7 +14402,7 @@
               </a:avLst>
             </a:prstGeom>
             <a:solidFill>
-              <a:srgbClr val="88D4DC"/>
+              <a:srgbClr val="CB97FF"/>
             </a:solidFill>
             <a:ln>
               <a:noFill/>
@@ -13960,10 +14452,10 @@
         </p:sp>
         <p:sp>
           <p:nvSpPr>
-            <p:cNvPr id="39" name="TextBox 38">
+            <p:cNvPr id="14" name="TextBox 13">
               <a:extLst>
                 <a:ext uri="{FF2B5EF4-FFF2-40B4-BE49-F238E27FC236}">
-                  <a16:creationId xmlns:a16="http://schemas.microsoft.com/office/drawing/2014/main" id="{9316C98B-A5E3-43C2-9234-34DEB8882793}"/>
+                  <a16:creationId xmlns:a16="http://schemas.microsoft.com/office/drawing/2014/main" id="{6B39924B-DE62-4ECE-9618-5D6BFA19CF4A}"/>
                 </a:ext>
               </a:extLst>
             </p:cNvPr>
@@ -13972,7 +14464,7 @@
           </p:nvSpPr>
           <p:spPr>
             <a:xfrm>
-              <a:off x="5493077" y="2293453"/>
+              <a:off x="4990200" y="2363442"/>
               <a:ext cx="1149125" cy="646331"/>
             </a:xfrm>
             <a:prstGeom prst="rect">
@@ -13989,16 +14481,16 @@
               <a:r>
                 <a:rPr lang="en-US" altLang="ko-KR" sz="3600" dirty="0">
                   <a:solidFill>
-                    <a:srgbClr val="1F646B"/>
+                    <a:srgbClr val="541179"/>
                   </a:solidFill>
                   <a:latin typeface="배달의민족 주아" panose="02020603020101020101" pitchFamily="18" charset="-127"/>
                   <a:ea typeface="배달의민족 주아" panose="02020603020101020101" pitchFamily="18" charset="-127"/>
                 </a:rPr>
-                <a:t>test</a:t>
+                <a:t>PHP</a:t>
               </a:r>
               <a:endParaRPr lang="ko-KR" altLang="en-US" sz="2400" dirty="0">
                 <a:solidFill>
-                  <a:srgbClr val="1F646B"/>
+                  <a:srgbClr val="541179"/>
                 </a:solidFill>
                 <a:latin typeface="배달의민족 주아" panose="02020603020101020101" pitchFamily="18" charset="-127"/>
                 <a:ea typeface="배달의민족 주아" panose="02020603020101020101" pitchFamily="18" charset="-127"/>
@@ -14006,12 +14498,68 @@
             </a:p>
           </p:txBody>
         </p:sp>
+        <p:sp>
+          <p:nvSpPr>
+            <p:cNvPr id="15" name="타원 14">
+              <a:extLst>
+                <a:ext uri="{FF2B5EF4-FFF2-40B4-BE49-F238E27FC236}">
+                  <a16:creationId xmlns:a16="http://schemas.microsoft.com/office/drawing/2014/main" id="{B054604E-2366-4642-AA09-143B654A2B88}"/>
+                </a:ext>
+              </a:extLst>
+            </p:cNvPr>
+            <p:cNvSpPr/>
+            <p:nvPr/>
+          </p:nvSpPr>
+          <p:spPr>
+            <a:xfrm>
+              <a:off x="4801565" y="3281391"/>
+              <a:ext cx="1412994" cy="1404000"/>
+            </a:xfrm>
+            <a:prstGeom prst="ellipse">
+              <a:avLst/>
+            </a:prstGeom>
+            <a:noFill/>
+            <a:ln w="41275">
+              <a:solidFill>
+                <a:srgbClr val="541179"/>
+              </a:solidFill>
+            </a:ln>
+          </p:spPr>
+          <p:style>
+            <a:lnRef idx="2">
+              <a:schemeClr val="accent1">
+                <a:shade val="50000"/>
+              </a:schemeClr>
+            </a:lnRef>
+            <a:fillRef idx="1">
+              <a:schemeClr val="accent1"/>
+            </a:fillRef>
+            <a:effectRef idx="0">
+              <a:schemeClr val="accent1"/>
+            </a:effectRef>
+            <a:fontRef idx="minor">
+              <a:schemeClr val="lt1"/>
+            </a:fontRef>
+          </p:style>
+          <p:txBody>
+            <a:bodyPr rtlCol="0" anchor="ctr"/>
+            <a:lstStyle/>
+            <a:p>
+              <a:pPr algn="ctr"/>
+              <a:endParaRPr lang="ko-KR" altLang="en-US">
+                <a:solidFill>
+                  <a:srgbClr val="9933FF"/>
+                </a:solidFill>
+              </a:endParaRPr>
+            </a:p>
+          </p:txBody>
+        </p:sp>
         <p:grpSp>
           <p:nvGrpSpPr>
-            <p:cNvPr id="85" name="그룹 84">
+            <p:cNvPr id="16" name="그룹 15">
               <a:extLst>
                 <a:ext uri="{FF2B5EF4-FFF2-40B4-BE49-F238E27FC236}">
-                  <a16:creationId xmlns:a16="http://schemas.microsoft.com/office/drawing/2014/main" id="{CE5CE65F-6460-4C34-A252-F9493264AD03}"/>
+                  <a16:creationId xmlns:a16="http://schemas.microsoft.com/office/drawing/2014/main" id="{EDED27B1-088D-448D-A4D2-93442964F6A4}"/>
                 </a:ext>
               </a:extLst>
             </p:cNvPr>
@@ -14020,18 +14568,304 @@
           </p:nvGrpSpPr>
           <p:grpSpPr>
             <a:xfrm>
-              <a:off x="5278491" y="3281285"/>
-              <a:ext cx="1412994" cy="1404000"/>
-              <a:chOff x="2254844" y="3414766"/>
-              <a:chExt cx="1412994" cy="1404000"/>
+              <a:off x="5044998" y="3541898"/>
+              <a:ext cx="918000" cy="934876"/>
+              <a:chOff x="2970158" y="4220083"/>
+              <a:chExt cx="918000" cy="934876"/>
+            </a:xfrm>
+            <a:solidFill>
+              <a:schemeClr val="bg1"/>
+            </a:solidFill>
+          </p:grpSpPr>
+          <p:grpSp>
+            <p:nvGrpSpPr>
+              <p:cNvPr id="22" name="그룹 21">
+                <a:extLst>
+                  <a:ext uri="{FF2B5EF4-FFF2-40B4-BE49-F238E27FC236}">
+                    <a16:creationId xmlns:a16="http://schemas.microsoft.com/office/drawing/2014/main" id="{147C87D6-1749-4A3F-9205-4217F0339C1A}"/>
+                  </a:ext>
+                </a:extLst>
+              </p:cNvPr>
+              <p:cNvGrpSpPr/>
+              <p:nvPr/>
+            </p:nvGrpSpPr>
+            <p:grpSpPr>
+              <a:xfrm>
+                <a:off x="2978052" y="4220083"/>
+                <a:ext cx="902212" cy="934876"/>
+                <a:chOff x="2130548" y="3387155"/>
+                <a:chExt cx="1811542" cy="1877126"/>
+              </a:xfrm>
+              <a:grpFill/>
+            </p:grpSpPr>
+            <p:sp>
+              <p:nvSpPr>
+                <p:cNvPr id="24" name="사각형: 둥근 모서리 23">
+                  <a:extLst>
+                    <a:ext uri="{FF2B5EF4-FFF2-40B4-BE49-F238E27FC236}">
+                      <a16:creationId xmlns:a16="http://schemas.microsoft.com/office/drawing/2014/main" id="{12D8B7DF-F981-433A-AAA3-51A91895B606}"/>
+                    </a:ext>
+                  </a:extLst>
+                </p:cNvPr>
+                <p:cNvSpPr/>
+                <p:nvPr/>
+              </p:nvSpPr>
+              <p:spPr>
+                <a:xfrm>
+                  <a:off x="2130548" y="3387155"/>
+                  <a:ext cx="1811542" cy="1877126"/>
+                </a:xfrm>
+                <a:prstGeom prst="roundRect">
+                  <a:avLst>
+                    <a:gd name="adj" fmla="val 7396"/>
+                  </a:avLst>
+                </a:prstGeom>
+                <a:solidFill>
+                  <a:srgbClr val="CB97FF"/>
+                </a:solidFill>
+                <a:ln>
+                  <a:solidFill>
+                    <a:srgbClr val="541179"/>
+                  </a:solidFill>
+                </a:ln>
+              </p:spPr>
+              <p:style>
+                <a:lnRef idx="2">
+                  <a:schemeClr val="accent1">
+                    <a:shade val="50000"/>
+                  </a:schemeClr>
+                </a:lnRef>
+                <a:fillRef idx="1">
+                  <a:schemeClr val="accent1"/>
+                </a:fillRef>
+                <a:effectRef idx="0">
+                  <a:schemeClr val="accent1"/>
+                </a:effectRef>
+                <a:fontRef idx="minor">
+                  <a:schemeClr val="lt1"/>
+                </a:fontRef>
+              </p:style>
+              <p:txBody>
+                <a:bodyPr rtlCol="0" anchor="ctr"/>
+                <a:lstStyle/>
+                <a:p>
+                  <a:pPr algn="ctr"/>
+                  <a:endParaRPr lang="ko-KR" altLang="en-US">
+                    <a:solidFill>
+                      <a:srgbClr val="9933FF"/>
+                    </a:solidFill>
+                  </a:endParaRPr>
+                </a:p>
+              </p:txBody>
+            </p:sp>
+            <p:cxnSp>
+              <p:nvCxnSpPr>
+                <p:cNvPr id="25" name="직선 연결선 24">
+                  <a:extLst>
+                    <a:ext uri="{FF2B5EF4-FFF2-40B4-BE49-F238E27FC236}">
+                      <a16:creationId xmlns:a16="http://schemas.microsoft.com/office/drawing/2014/main" id="{55B5ECD6-D432-49C2-A654-4F47FF718FDE}"/>
+                    </a:ext>
+                  </a:extLst>
+                </p:cNvPr>
+                <p:cNvCxnSpPr>
+                  <a:cxnSpLocks/>
+                </p:cNvCxnSpPr>
+                <p:nvPr/>
+              </p:nvCxnSpPr>
+              <p:spPr>
+                <a:xfrm>
+                  <a:off x="2130548" y="3739861"/>
+                  <a:ext cx="1811542" cy="0"/>
+                </a:xfrm>
+                <a:prstGeom prst="line">
+                  <a:avLst/>
+                </a:prstGeom>
+                <a:grpFill/>
+                <a:ln>
+                  <a:solidFill>
+                    <a:srgbClr val="541179"/>
+                  </a:solidFill>
+                </a:ln>
+              </p:spPr>
+              <p:style>
+                <a:lnRef idx="1">
+                  <a:schemeClr val="accent1"/>
+                </a:lnRef>
+                <a:fillRef idx="0">
+                  <a:schemeClr val="accent1"/>
+                </a:fillRef>
+                <a:effectRef idx="0">
+                  <a:schemeClr val="accent1"/>
+                </a:effectRef>
+                <a:fontRef idx="minor">
+                  <a:schemeClr val="tx1"/>
+                </a:fontRef>
+              </p:style>
+            </p:cxnSp>
+            <p:sp>
+              <p:nvSpPr>
+                <p:cNvPr id="26" name="직사각형 25">
+                  <a:extLst>
+                    <a:ext uri="{FF2B5EF4-FFF2-40B4-BE49-F238E27FC236}">
+                      <a16:creationId xmlns:a16="http://schemas.microsoft.com/office/drawing/2014/main" id="{57069127-36C7-400D-B6F9-2BADBE4CD370}"/>
+                    </a:ext>
+                  </a:extLst>
+                </p:cNvPr>
+                <p:cNvSpPr/>
+                <p:nvPr/>
+              </p:nvSpPr>
+              <p:spPr>
+                <a:xfrm>
+                  <a:off x="2130548" y="3739861"/>
+                  <a:ext cx="1811542" cy="1523643"/>
+                </a:xfrm>
+                <a:prstGeom prst="rect">
+                  <a:avLst/>
+                </a:prstGeom>
+                <a:grpFill/>
+                <a:ln>
+                  <a:solidFill>
+                    <a:srgbClr val="541179"/>
+                  </a:solidFill>
+                </a:ln>
+              </p:spPr>
+              <p:style>
+                <a:lnRef idx="2">
+                  <a:schemeClr val="accent1">
+                    <a:shade val="50000"/>
+                  </a:schemeClr>
+                </a:lnRef>
+                <a:fillRef idx="1">
+                  <a:schemeClr val="accent1"/>
+                </a:fillRef>
+                <a:effectRef idx="0">
+                  <a:schemeClr val="accent1"/>
+                </a:effectRef>
+                <a:fontRef idx="minor">
+                  <a:schemeClr val="lt1"/>
+                </a:fontRef>
+              </p:style>
+              <p:txBody>
+                <a:bodyPr rtlCol="0" anchor="ctr"/>
+                <a:lstStyle/>
+                <a:p>
+                  <a:pPr algn="ctr"/>
+                  <a:endParaRPr lang="ko-KR" altLang="en-US">
+                    <a:solidFill>
+                      <a:srgbClr val="9933FF"/>
+                    </a:solidFill>
+                  </a:endParaRPr>
+                </a:p>
+              </p:txBody>
+            </p:sp>
+          </p:grpSp>
+          <p:cxnSp>
+            <p:nvCxnSpPr>
+              <p:cNvPr id="23" name="직선 연결선 22">
+                <a:extLst>
+                  <a:ext uri="{FF2B5EF4-FFF2-40B4-BE49-F238E27FC236}">
+                    <a16:creationId xmlns:a16="http://schemas.microsoft.com/office/drawing/2014/main" id="{AEF60C01-D09E-47B1-BC1F-E91D01135A51}"/>
+                  </a:ext>
+                </a:extLst>
+              </p:cNvPr>
+              <p:cNvCxnSpPr>
+                <a:cxnSpLocks/>
+              </p:cNvCxnSpPr>
+              <p:nvPr/>
+            </p:nvCxnSpPr>
+            <p:spPr>
+              <a:xfrm>
+                <a:off x="2970158" y="5154570"/>
+                <a:ext cx="918000" cy="0"/>
+              </a:xfrm>
+              <a:prstGeom prst="line">
+                <a:avLst/>
+              </a:prstGeom>
+              <a:grpFill/>
+              <a:ln w="15875">
+                <a:solidFill>
+                  <a:schemeClr val="bg1"/>
+                </a:solidFill>
+              </a:ln>
+            </p:spPr>
+            <p:style>
+              <a:lnRef idx="1">
+                <a:schemeClr val="accent1"/>
+              </a:lnRef>
+              <a:fillRef idx="0">
+                <a:schemeClr val="accent1"/>
+              </a:fillRef>
+              <a:effectRef idx="0">
+                <a:schemeClr val="accent1"/>
+              </a:effectRef>
+              <a:fontRef idx="minor">
+                <a:schemeClr val="tx1"/>
+              </a:fontRef>
+            </p:style>
+          </p:cxnSp>
+        </p:grpSp>
+        <p:pic>
+          <p:nvPicPr>
+            <p:cNvPr id="17" name="그림 16">
+              <a:extLst>
+                <a:ext uri="{FF2B5EF4-FFF2-40B4-BE49-F238E27FC236}">
+                  <a16:creationId xmlns:a16="http://schemas.microsoft.com/office/drawing/2014/main" id="{4199CFB6-293D-432B-B905-DF543D3DB3A9}"/>
+                </a:ext>
+              </a:extLst>
+            </p:cNvPr>
+            <p:cNvPicPr>
+              <a:picLocks noChangeAspect="1"/>
+            </p:cNvPicPr>
+            <p:nvPr/>
+          </p:nvPicPr>
+          <p:blipFill>
+            <a:blip r:embed="rId2">
+              <a:extLst>
+                <a:ext uri="{28A0092B-C50C-407E-A947-70E740481C1C}">
+                  <a14:useLocalDpi xmlns:a14="http://schemas.microsoft.com/office/drawing/2010/main" val="0"/>
+                </a:ext>
+              </a:extLst>
+            </a:blip>
+            <a:stretch>
+              <a:fillRect/>
+            </a:stretch>
+          </p:blipFill>
+          <p:spPr>
+            <a:xfrm>
+              <a:off x="5177345" y="3878224"/>
+              <a:ext cx="737530" cy="462202"/>
+            </a:xfrm>
+            <a:prstGeom prst="rect">
+              <a:avLst/>
+            </a:prstGeom>
+          </p:spPr>
+        </p:pic>
+        <p:grpSp>
+          <p:nvGrpSpPr>
+            <p:cNvPr id="18" name="그룹 17">
+              <a:extLst>
+                <a:ext uri="{FF2B5EF4-FFF2-40B4-BE49-F238E27FC236}">
+                  <a16:creationId xmlns:a16="http://schemas.microsoft.com/office/drawing/2014/main" id="{D6E5385B-9640-4523-AB13-2ADA3E21224C}"/>
+                </a:ext>
+              </a:extLst>
+            </p:cNvPr>
+            <p:cNvGrpSpPr/>
+            <p:nvPr/>
+          </p:nvGrpSpPr>
+          <p:grpSpPr>
+            <a:xfrm>
+              <a:off x="5132015" y="3590626"/>
+              <a:ext cx="371983" cy="71558"/>
+              <a:chOff x="1249369" y="2977802"/>
+              <a:chExt cx="371983" cy="71558"/>
             </a:xfrm>
           </p:grpSpPr>
           <p:sp>
             <p:nvSpPr>
-              <p:cNvPr id="65" name="타원 64">
+              <p:cNvPr id="19" name="타원 18">
                 <a:extLst>
                   <a:ext uri="{FF2B5EF4-FFF2-40B4-BE49-F238E27FC236}">
-                    <a16:creationId xmlns:a16="http://schemas.microsoft.com/office/drawing/2014/main" id="{A8144BB3-9BE0-41C1-A75D-26A17D8BD5D7}"/>
+                    <a16:creationId xmlns:a16="http://schemas.microsoft.com/office/drawing/2014/main" id="{807B5511-30E0-4F48-B37D-A6083FE529E6}"/>
                   </a:ext>
                 </a:extLst>
               </p:cNvPr>
@@ -14040,16 +14874,18 @@
             </p:nvSpPr>
             <p:spPr>
               <a:xfrm>
-                <a:off x="2254844" y="3414766"/>
-                <a:ext cx="1412994" cy="1404000"/>
+                <a:off x="1249369" y="2977802"/>
+                <a:ext cx="77781" cy="71558"/>
               </a:xfrm>
               <a:prstGeom prst="ellipse">
                 <a:avLst/>
               </a:prstGeom>
-              <a:noFill/>
-              <a:ln w="41275">
+              <a:solidFill>
+                <a:schemeClr val="bg1"/>
+              </a:solidFill>
+              <a:ln>
                 <a:solidFill>
-                  <a:srgbClr val="4B8B91"/>
+                  <a:srgbClr val="9933FF"/>
                 </a:solidFill>
               </a:ln>
             </p:spPr>
@@ -14078,12 +14914,918 @@
               </a:p>
             </p:txBody>
           </p:sp>
+          <p:sp>
+            <p:nvSpPr>
+              <p:cNvPr id="20" name="타원 19">
+                <a:extLst>
+                  <a:ext uri="{FF2B5EF4-FFF2-40B4-BE49-F238E27FC236}">
+                    <a16:creationId xmlns:a16="http://schemas.microsoft.com/office/drawing/2014/main" id="{52F56883-6D87-4EB4-A1BD-026A97938F78}"/>
+                  </a:ext>
+                </a:extLst>
+              </p:cNvPr>
+              <p:cNvSpPr/>
+              <p:nvPr/>
+            </p:nvSpPr>
+            <p:spPr>
+              <a:xfrm>
+                <a:off x="1396470" y="2977802"/>
+                <a:ext cx="77781" cy="71558"/>
+              </a:xfrm>
+              <a:prstGeom prst="ellipse">
+                <a:avLst/>
+              </a:prstGeom>
+              <a:solidFill>
+                <a:schemeClr val="bg1"/>
+              </a:solidFill>
+              <a:ln>
+                <a:solidFill>
+                  <a:srgbClr val="9933FF"/>
+                </a:solidFill>
+              </a:ln>
+            </p:spPr>
+            <p:style>
+              <a:lnRef idx="2">
+                <a:schemeClr val="accent1">
+                  <a:shade val="50000"/>
+                </a:schemeClr>
+              </a:lnRef>
+              <a:fillRef idx="1">
+                <a:schemeClr val="accent1"/>
+              </a:fillRef>
+              <a:effectRef idx="0">
+                <a:schemeClr val="accent1"/>
+              </a:effectRef>
+              <a:fontRef idx="minor">
+                <a:schemeClr val="lt1"/>
+              </a:fontRef>
+            </p:style>
+            <p:txBody>
+              <a:bodyPr rtlCol="0" anchor="ctr"/>
+              <a:lstStyle/>
+              <a:p>
+                <a:pPr algn="ctr"/>
+                <a:endParaRPr lang="ko-KR" altLang="en-US"/>
+              </a:p>
+            </p:txBody>
+          </p:sp>
+          <p:sp>
+            <p:nvSpPr>
+              <p:cNvPr id="21" name="타원 20">
+                <a:extLst>
+                  <a:ext uri="{FF2B5EF4-FFF2-40B4-BE49-F238E27FC236}">
+                    <a16:creationId xmlns:a16="http://schemas.microsoft.com/office/drawing/2014/main" id="{4DB39777-8196-4069-9956-63981B1493FA}"/>
+                  </a:ext>
+                </a:extLst>
+              </p:cNvPr>
+              <p:cNvSpPr/>
+              <p:nvPr/>
+            </p:nvSpPr>
+            <p:spPr>
+              <a:xfrm>
+                <a:off x="1543571" y="2977802"/>
+                <a:ext cx="77781" cy="71558"/>
+              </a:xfrm>
+              <a:prstGeom prst="ellipse">
+                <a:avLst/>
+              </a:prstGeom>
+              <a:solidFill>
+                <a:schemeClr val="bg1"/>
+              </a:solidFill>
+              <a:ln>
+                <a:solidFill>
+                  <a:srgbClr val="9933FF"/>
+                </a:solidFill>
+              </a:ln>
+            </p:spPr>
+            <p:style>
+              <a:lnRef idx="2">
+                <a:schemeClr val="accent1">
+                  <a:shade val="50000"/>
+                </a:schemeClr>
+              </a:lnRef>
+              <a:fillRef idx="1">
+                <a:schemeClr val="accent1"/>
+              </a:fillRef>
+              <a:effectRef idx="0">
+                <a:schemeClr val="accent1"/>
+              </a:effectRef>
+              <a:fontRef idx="minor">
+                <a:schemeClr val="lt1"/>
+              </a:fontRef>
+            </p:style>
+            <p:txBody>
+              <a:bodyPr rtlCol="0" anchor="ctr"/>
+              <a:lstStyle/>
+              <a:p>
+                <a:pPr algn="ctr"/>
+                <a:endParaRPr lang="ko-KR" altLang="en-US"/>
+              </a:p>
+            </p:txBody>
+          </p:sp>
+        </p:grpSp>
+      </p:grpSp>
+      <p:pic>
+        <p:nvPicPr>
+          <p:cNvPr id="28" name="그림 27">
+            <a:extLst>
+              <a:ext uri="{FF2B5EF4-FFF2-40B4-BE49-F238E27FC236}">
+                <a16:creationId xmlns:a16="http://schemas.microsoft.com/office/drawing/2014/main" id="{A433E069-71B6-4946-B525-E03632F7D177}"/>
+              </a:ext>
+            </a:extLst>
+          </p:cNvPr>
+          <p:cNvPicPr>
+            <a:picLocks noChangeAspect="1"/>
+          </p:cNvPicPr>
+          <p:nvPr/>
+        </p:nvPicPr>
+        <p:blipFill>
+          <a:blip r:embed="rId3">
+            <a:extLst>
+              <a:ext uri="{28A0092B-C50C-407E-A947-70E740481C1C}">
+                <a14:useLocalDpi xmlns:a14="http://schemas.microsoft.com/office/drawing/2010/main" val="0"/>
+              </a:ext>
+            </a:extLst>
+          </a:blip>
+          <a:stretch>
+            <a:fillRect/>
+          </a:stretch>
+        </p:blipFill>
+        <p:spPr>
+          <a:xfrm>
+            <a:off x="4024822" y="224687"/>
+            <a:ext cx="3328704" cy="3718882"/>
+          </a:xfrm>
+          <a:prstGeom prst="rect">
+            <a:avLst/>
+          </a:prstGeom>
+        </p:spPr>
+      </p:pic>
+      <p:grpSp>
+        <p:nvGrpSpPr>
+          <p:cNvPr id="121" name="그룹 120">
+            <a:extLst>
+              <a:ext uri="{FF2B5EF4-FFF2-40B4-BE49-F238E27FC236}">
+                <a16:creationId xmlns:a16="http://schemas.microsoft.com/office/drawing/2014/main" id="{08C1DDAD-E6B2-42FA-B859-377B41C819CE}"/>
+              </a:ext>
+            </a:extLst>
+          </p:cNvPr>
+          <p:cNvGrpSpPr/>
+          <p:nvPr/>
+        </p:nvGrpSpPr>
+        <p:grpSpPr>
+          <a:xfrm>
+            <a:off x="8022176" y="224687"/>
+            <a:ext cx="3312590" cy="3704870"/>
+            <a:chOff x="7733775" y="224687"/>
+            <a:chExt cx="3312590" cy="3704870"/>
+          </a:xfrm>
+        </p:grpSpPr>
+        <p:sp>
+          <p:nvSpPr>
+            <p:cNvPr id="30" name="사각형: 둥근 모서리 29">
+              <a:extLst>
+                <a:ext uri="{FF2B5EF4-FFF2-40B4-BE49-F238E27FC236}">
+                  <a16:creationId xmlns:a16="http://schemas.microsoft.com/office/drawing/2014/main" id="{16B946E3-D8CA-473D-85E0-B8E586D69590}"/>
+                </a:ext>
+              </a:extLst>
+            </p:cNvPr>
+            <p:cNvSpPr/>
+            <p:nvPr/>
+          </p:nvSpPr>
+          <p:spPr>
+            <a:xfrm>
+              <a:off x="7733775" y="224687"/>
+              <a:ext cx="3312590" cy="3704870"/>
+            </a:xfrm>
+            <a:prstGeom prst="roundRect">
+              <a:avLst>
+                <a:gd name="adj" fmla="val 2193"/>
+              </a:avLst>
+            </a:prstGeom>
+            <a:solidFill>
+              <a:schemeClr val="bg1"/>
+            </a:solidFill>
+            <a:ln>
+              <a:solidFill>
+                <a:srgbClr val="00B0F0"/>
+              </a:solidFill>
+            </a:ln>
+          </p:spPr>
+          <p:style>
+            <a:lnRef idx="2">
+              <a:schemeClr val="accent1">
+                <a:shade val="50000"/>
+              </a:schemeClr>
+            </a:lnRef>
+            <a:fillRef idx="1">
+              <a:schemeClr val="accent1"/>
+            </a:fillRef>
+            <a:effectRef idx="0">
+              <a:schemeClr val="accent1"/>
+            </a:effectRef>
+            <a:fontRef idx="minor">
+              <a:schemeClr val="lt1"/>
+            </a:fontRef>
+          </p:style>
+          <p:txBody>
+            <a:bodyPr rtlCol="0" anchor="ctr"/>
+            <a:lstStyle/>
+            <a:p>
+              <a:pPr algn="ctr"/>
+              <a:endParaRPr lang="ko-KR" altLang="en-US" dirty="0"/>
+            </a:p>
+          </p:txBody>
+        </p:sp>
+        <p:sp>
+          <p:nvSpPr>
+            <p:cNvPr id="31" name="타원 30">
+              <a:extLst>
+                <a:ext uri="{FF2B5EF4-FFF2-40B4-BE49-F238E27FC236}">
+                  <a16:creationId xmlns:a16="http://schemas.microsoft.com/office/drawing/2014/main" id="{65D1EC44-6F8E-4F97-A7E7-D1268F7EF002}"/>
+                </a:ext>
+              </a:extLst>
+            </p:cNvPr>
+            <p:cNvSpPr/>
+            <p:nvPr/>
+          </p:nvSpPr>
+          <p:spPr>
+            <a:xfrm>
+              <a:off x="9965079" y="1189070"/>
+              <a:ext cx="106497" cy="97977"/>
+            </a:xfrm>
+            <a:prstGeom prst="ellipse">
+              <a:avLst/>
+            </a:prstGeom>
+            <a:solidFill>
+              <a:schemeClr val="bg1"/>
+            </a:solidFill>
+            <a:ln>
+              <a:solidFill>
+                <a:srgbClr val="38ABF9"/>
+              </a:solidFill>
+            </a:ln>
+          </p:spPr>
+          <p:style>
+            <a:lnRef idx="2">
+              <a:schemeClr val="accent1">
+                <a:shade val="50000"/>
+              </a:schemeClr>
+            </a:lnRef>
+            <a:fillRef idx="1">
+              <a:schemeClr val="accent1"/>
+            </a:fillRef>
+            <a:effectRef idx="0">
+              <a:schemeClr val="accent1"/>
+            </a:effectRef>
+            <a:fontRef idx="minor">
+              <a:schemeClr val="lt1"/>
+            </a:fontRef>
+          </p:style>
+          <p:txBody>
+            <a:bodyPr rtlCol="0" anchor="ctr"/>
+            <a:lstStyle/>
+            <a:p>
+              <a:pPr algn="ctr"/>
+              <a:endParaRPr lang="ko-KR" altLang="en-US"/>
+            </a:p>
+          </p:txBody>
+        </p:sp>
+        <p:sp>
+          <p:nvSpPr>
+            <p:cNvPr id="32" name="타원 31">
+              <a:extLst>
+                <a:ext uri="{FF2B5EF4-FFF2-40B4-BE49-F238E27FC236}">
+                  <a16:creationId xmlns:a16="http://schemas.microsoft.com/office/drawing/2014/main" id="{5DE49F8D-825E-4C49-9ED5-842A3CC9A8ED}"/>
+                </a:ext>
+              </a:extLst>
+            </p:cNvPr>
+            <p:cNvSpPr/>
+            <p:nvPr/>
+          </p:nvSpPr>
+          <p:spPr>
+            <a:xfrm>
+              <a:off x="9795944" y="1205040"/>
+              <a:ext cx="53813" cy="49509"/>
+            </a:xfrm>
+            <a:prstGeom prst="ellipse">
+              <a:avLst/>
+            </a:prstGeom>
+            <a:solidFill>
+              <a:srgbClr val="3B83DA"/>
+            </a:solidFill>
+            <a:ln>
+              <a:noFill/>
+            </a:ln>
+          </p:spPr>
+          <p:style>
+            <a:lnRef idx="2">
+              <a:schemeClr val="accent1">
+                <a:shade val="50000"/>
+              </a:schemeClr>
+            </a:lnRef>
+            <a:fillRef idx="1">
+              <a:schemeClr val="accent1"/>
+            </a:fillRef>
+            <a:effectRef idx="0">
+              <a:schemeClr val="accent1"/>
+            </a:effectRef>
+            <a:fontRef idx="minor">
+              <a:schemeClr val="lt1"/>
+            </a:fontRef>
+          </p:style>
+          <p:txBody>
+            <a:bodyPr rtlCol="0" anchor="ctr"/>
+            <a:lstStyle/>
+            <a:p>
+              <a:pPr algn="ctr"/>
+              <a:endParaRPr lang="ko-KR" altLang="en-US"/>
+            </a:p>
+          </p:txBody>
+        </p:sp>
+        <p:sp>
+          <p:nvSpPr>
+            <p:cNvPr id="33" name="더하기 기호 32">
+              <a:extLst>
+                <a:ext uri="{FF2B5EF4-FFF2-40B4-BE49-F238E27FC236}">
+                  <a16:creationId xmlns:a16="http://schemas.microsoft.com/office/drawing/2014/main" id="{33845208-EF98-4A8E-A584-D53F0E222EE6}"/>
+                </a:ext>
+              </a:extLst>
+            </p:cNvPr>
+            <p:cNvSpPr/>
+            <p:nvPr/>
+          </p:nvSpPr>
+          <p:spPr>
+            <a:xfrm>
+              <a:off x="10148629" y="1390460"/>
+              <a:ext cx="184396" cy="184396"/>
+            </a:xfrm>
+            <a:prstGeom prst="mathPlus">
+              <a:avLst>
+                <a:gd name="adj1" fmla="val 5743"/>
+              </a:avLst>
+            </a:prstGeom>
+            <a:solidFill>
+              <a:srgbClr val="AECCFA"/>
+            </a:solidFill>
+            <a:ln>
+              <a:noFill/>
+            </a:ln>
+          </p:spPr>
+          <p:style>
+            <a:lnRef idx="2">
+              <a:schemeClr val="accent1">
+                <a:shade val="50000"/>
+              </a:schemeClr>
+            </a:lnRef>
+            <a:fillRef idx="1">
+              <a:schemeClr val="accent1"/>
+            </a:fillRef>
+            <a:effectRef idx="0">
+              <a:schemeClr val="accent1"/>
+            </a:effectRef>
+            <a:fontRef idx="minor">
+              <a:schemeClr val="lt1"/>
+            </a:fontRef>
+          </p:style>
+          <p:txBody>
+            <a:bodyPr rtlCol="0" anchor="ctr"/>
+            <a:lstStyle/>
+            <a:p>
+              <a:pPr algn="ctr"/>
+              <a:endParaRPr lang="ko-KR" altLang="en-US"/>
+            </a:p>
+          </p:txBody>
+        </p:sp>
+        <p:sp>
+          <p:nvSpPr>
+            <p:cNvPr id="34" name="타원 33">
+              <a:extLst>
+                <a:ext uri="{FF2B5EF4-FFF2-40B4-BE49-F238E27FC236}">
+                  <a16:creationId xmlns:a16="http://schemas.microsoft.com/office/drawing/2014/main" id="{5CA5EBCD-E0D7-4650-95A4-DF6D35B16757}"/>
+                </a:ext>
+              </a:extLst>
+            </p:cNvPr>
+            <p:cNvSpPr/>
+            <p:nvPr/>
+          </p:nvSpPr>
+          <p:spPr>
+            <a:xfrm>
+              <a:off x="8338277" y="1525867"/>
+              <a:ext cx="106497" cy="97977"/>
+            </a:xfrm>
+            <a:prstGeom prst="ellipse">
+              <a:avLst/>
+            </a:prstGeom>
+            <a:solidFill>
+              <a:schemeClr val="bg1"/>
+            </a:solidFill>
+            <a:ln>
+              <a:solidFill>
+                <a:srgbClr val="AECCFA"/>
+              </a:solidFill>
+            </a:ln>
+          </p:spPr>
+          <p:style>
+            <a:lnRef idx="2">
+              <a:schemeClr val="accent1">
+                <a:shade val="50000"/>
+              </a:schemeClr>
+            </a:lnRef>
+            <a:fillRef idx="1">
+              <a:schemeClr val="accent1"/>
+            </a:fillRef>
+            <a:effectRef idx="0">
+              <a:schemeClr val="accent1"/>
+            </a:effectRef>
+            <a:fontRef idx="minor">
+              <a:schemeClr val="lt1"/>
+            </a:fontRef>
+          </p:style>
+          <p:txBody>
+            <a:bodyPr rtlCol="0" anchor="ctr"/>
+            <a:lstStyle/>
+            <a:p>
+              <a:pPr algn="ctr"/>
+              <a:endParaRPr lang="ko-KR" altLang="en-US"/>
+            </a:p>
+          </p:txBody>
+        </p:sp>
+        <p:sp>
+          <p:nvSpPr>
+            <p:cNvPr id="35" name="타원 34">
+              <a:extLst>
+                <a:ext uri="{FF2B5EF4-FFF2-40B4-BE49-F238E27FC236}">
+                  <a16:creationId xmlns:a16="http://schemas.microsoft.com/office/drawing/2014/main" id="{CB3C1146-90B3-4F87-8A7F-9D4E02F8AF2E}"/>
+                </a:ext>
+              </a:extLst>
+            </p:cNvPr>
+            <p:cNvSpPr/>
+            <p:nvPr/>
+          </p:nvSpPr>
+          <p:spPr>
+            <a:xfrm>
+              <a:off x="8521826" y="1457903"/>
+              <a:ext cx="53813" cy="49509"/>
+            </a:xfrm>
+            <a:prstGeom prst="ellipse">
+              <a:avLst/>
+            </a:prstGeom>
+            <a:solidFill>
+              <a:srgbClr val="3B83DA"/>
+            </a:solidFill>
+            <a:ln>
+              <a:noFill/>
+            </a:ln>
+          </p:spPr>
+          <p:style>
+            <a:lnRef idx="2">
+              <a:schemeClr val="accent1">
+                <a:shade val="50000"/>
+              </a:schemeClr>
+            </a:lnRef>
+            <a:fillRef idx="1">
+              <a:schemeClr val="accent1"/>
+            </a:fillRef>
+            <a:effectRef idx="0">
+              <a:schemeClr val="accent1"/>
+            </a:effectRef>
+            <a:fontRef idx="minor">
+              <a:schemeClr val="lt1"/>
+            </a:fontRef>
+          </p:style>
+          <p:txBody>
+            <a:bodyPr rtlCol="0" anchor="ctr"/>
+            <a:lstStyle/>
+            <a:p>
+              <a:pPr algn="ctr"/>
+              <a:endParaRPr lang="ko-KR" altLang="en-US"/>
+            </a:p>
+          </p:txBody>
+        </p:sp>
+        <p:sp>
+          <p:nvSpPr>
+            <p:cNvPr id="36" name="더하기 기호 35">
+              <a:extLst>
+                <a:ext uri="{FF2B5EF4-FFF2-40B4-BE49-F238E27FC236}">
+                  <a16:creationId xmlns:a16="http://schemas.microsoft.com/office/drawing/2014/main" id="{C30156A9-F1D7-4A3B-A8A7-6EFF7D027BF9}"/>
+                </a:ext>
+              </a:extLst>
+            </p:cNvPr>
+            <p:cNvSpPr/>
+            <p:nvPr/>
+          </p:nvSpPr>
+          <p:spPr>
+            <a:xfrm>
+              <a:off x="8391525" y="1650966"/>
+              <a:ext cx="184396" cy="184396"/>
+            </a:xfrm>
+            <a:prstGeom prst="mathPlus">
+              <a:avLst>
+                <a:gd name="adj1" fmla="val 5743"/>
+              </a:avLst>
+            </a:prstGeom>
+            <a:solidFill>
+              <a:srgbClr val="0695F7"/>
+            </a:solidFill>
+            <a:ln>
+              <a:noFill/>
+            </a:ln>
+          </p:spPr>
+          <p:style>
+            <a:lnRef idx="2">
+              <a:schemeClr val="accent1">
+                <a:shade val="50000"/>
+              </a:schemeClr>
+            </a:lnRef>
+            <a:fillRef idx="1">
+              <a:schemeClr val="accent1"/>
+            </a:fillRef>
+            <a:effectRef idx="0">
+              <a:schemeClr val="accent1"/>
+            </a:effectRef>
+            <a:fontRef idx="minor">
+              <a:schemeClr val="lt1"/>
+            </a:fontRef>
+          </p:style>
+          <p:txBody>
+            <a:bodyPr rtlCol="0" anchor="ctr"/>
+            <a:lstStyle/>
+            <a:p>
+              <a:pPr algn="ctr"/>
+              <a:endParaRPr lang="ko-KR" altLang="en-US"/>
+            </a:p>
+          </p:txBody>
+        </p:sp>
+        <p:sp>
+          <p:nvSpPr>
+            <p:cNvPr id="37" name="더하기 기호 36">
+              <a:extLst>
+                <a:ext uri="{FF2B5EF4-FFF2-40B4-BE49-F238E27FC236}">
+                  <a16:creationId xmlns:a16="http://schemas.microsoft.com/office/drawing/2014/main" id="{09C7E219-AB71-437F-B083-60E197DD4691}"/>
+                </a:ext>
+              </a:extLst>
+            </p:cNvPr>
+            <p:cNvSpPr/>
+            <p:nvPr/>
+          </p:nvSpPr>
+          <p:spPr>
+            <a:xfrm>
+              <a:off x="10148629" y="2340110"/>
+              <a:ext cx="184396" cy="184396"/>
+            </a:xfrm>
+            <a:prstGeom prst="mathPlus">
+              <a:avLst>
+                <a:gd name="adj1" fmla="val 5743"/>
+              </a:avLst>
+            </a:prstGeom>
+            <a:solidFill>
+              <a:srgbClr val="1FA0F8"/>
+            </a:solidFill>
+            <a:ln>
+              <a:noFill/>
+            </a:ln>
+          </p:spPr>
+          <p:style>
+            <a:lnRef idx="2">
+              <a:schemeClr val="accent1">
+                <a:shade val="50000"/>
+              </a:schemeClr>
+            </a:lnRef>
+            <a:fillRef idx="1">
+              <a:schemeClr val="accent1"/>
+            </a:fillRef>
+            <a:effectRef idx="0">
+              <a:schemeClr val="accent1"/>
+            </a:effectRef>
+            <a:fontRef idx="minor">
+              <a:schemeClr val="lt1"/>
+            </a:fontRef>
+          </p:style>
+          <p:txBody>
+            <a:bodyPr rtlCol="0" anchor="ctr"/>
+            <a:lstStyle/>
+            <a:p>
+              <a:pPr algn="ctr"/>
+              <a:endParaRPr lang="ko-KR" altLang="en-US"/>
+            </a:p>
+          </p:txBody>
+        </p:sp>
+        <p:sp>
+          <p:nvSpPr>
+            <p:cNvPr id="38" name="별: 꼭짓점 12개 37">
+              <a:extLst>
+                <a:ext uri="{FF2B5EF4-FFF2-40B4-BE49-F238E27FC236}">
+                  <a16:creationId xmlns:a16="http://schemas.microsoft.com/office/drawing/2014/main" id="{7704A794-04C2-4154-8B4D-0BEA95ECC263}"/>
+                </a:ext>
+              </a:extLst>
+            </p:cNvPr>
+            <p:cNvSpPr/>
+            <p:nvPr/>
+          </p:nvSpPr>
+          <p:spPr>
+            <a:xfrm>
+              <a:off x="9102935" y="1123227"/>
+              <a:ext cx="112283" cy="87548"/>
+            </a:xfrm>
+            <a:prstGeom prst="star12">
+              <a:avLst>
+                <a:gd name="adj" fmla="val 25886"/>
+              </a:avLst>
+            </a:prstGeom>
+            <a:solidFill>
+              <a:schemeClr val="bg1"/>
+            </a:solidFill>
+            <a:ln>
+              <a:solidFill>
+                <a:srgbClr val="38ABF9"/>
+              </a:solidFill>
+            </a:ln>
+          </p:spPr>
+          <p:style>
+            <a:lnRef idx="2">
+              <a:schemeClr val="accent1">
+                <a:shade val="50000"/>
+              </a:schemeClr>
+            </a:lnRef>
+            <a:fillRef idx="1">
+              <a:schemeClr val="accent1"/>
+            </a:fillRef>
+            <a:effectRef idx="0">
+              <a:schemeClr val="accent1"/>
+            </a:effectRef>
+            <a:fontRef idx="minor">
+              <a:schemeClr val="lt1"/>
+            </a:fontRef>
+          </p:style>
+          <p:txBody>
+            <a:bodyPr rtlCol="0" anchor="ctr"/>
+            <a:lstStyle/>
+            <a:p>
+              <a:pPr algn="ctr"/>
+              <a:endParaRPr lang="ko-KR" altLang="en-US"/>
+            </a:p>
+          </p:txBody>
+        </p:sp>
+        <p:sp>
+          <p:nvSpPr>
+            <p:cNvPr id="39" name="별: 꼭짓점 12개 38">
+              <a:extLst>
+                <a:ext uri="{FF2B5EF4-FFF2-40B4-BE49-F238E27FC236}">
+                  <a16:creationId xmlns:a16="http://schemas.microsoft.com/office/drawing/2014/main" id="{5A2E0ABF-71EC-4FAB-8224-B457B31663AB}"/>
+                </a:ext>
+              </a:extLst>
+            </p:cNvPr>
+            <p:cNvSpPr/>
+            <p:nvPr/>
+          </p:nvSpPr>
+          <p:spPr>
+            <a:xfrm>
+              <a:off x="10274887" y="2237314"/>
+              <a:ext cx="96079" cy="74914"/>
+            </a:xfrm>
+            <a:prstGeom prst="star12">
+              <a:avLst>
+                <a:gd name="adj" fmla="val 25886"/>
+              </a:avLst>
+            </a:prstGeom>
+            <a:solidFill>
+              <a:schemeClr val="bg1"/>
+            </a:solidFill>
+            <a:ln>
+              <a:solidFill>
+                <a:srgbClr val="B0CEFA"/>
+              </a:solidFill>
+            </a:ln>
+          </p:spPr>
+          <p:style>
+            <a:lnRef idx="2">
+              <a:schemeClr val="accent1">
+                <a:shade val="50000"/>
+              </a:schemeClr>
+            </a:lnRef>
+            <a:fillRef idx="1">
+              <a:schemeClr val="accent1"/>
+            </a:fillRef>
+            <a:effectRef idx="0">
+              <a:schemeClr val="accent1"/>
+            </a:effectRef>
+            <a:fontRef idx="minor">
+              <a:schemeClr val="lt1"/>
+            </a:fontRef>
+          </p:style>
+          <p:txBody>
+            <a:bodyPr rtlCol="0" anchor="ctr"/>
+            <a:lstStyle/>
+            <a:p>
+              <a:pPr algn="ctr"/>
+              <a:endParaRPr lang="ko-KR" altLang="en-US"/>
+            </a:p>
+          </p:txBody>
+        </p:sp>
+        <p:sp>
+          <p:nvSpPr>
+            <p:cNvPr id="40" name="사각형: 둥근 모서리 39">
+              <a:extLst>
+                <a:ext uri="{FF2B5EF4-FFF2-40B4-BE49-F238E27FC236}">
+                  <a16:creationId xmlns:a16="http://schemas.microsoft.com/office/drawing/2014/main" id="{D55C9E45-2FAD-4D4D-AADB-E3EBFF6014EB}"/>
+                </a:ext>
+              </a:extLst>
+            </p:cNvPr>
+            <p:cNvSpPr/>
+            <p:nvPr/>
+          </p:nvSpPr>
+          <p:spPr>
+            <a:xfrm>
+              <a:off x="8285697" y="3099665"/>
+              <a:ext cx="2194606" cy="525629"/>
+            </a:xfrm>
+            <a:prstGeom prst="roundRect">
+              <a:avLst>
+                <a:gd name="adj" fmla="val 50000"/>
+              </a:avLst>
+            </a:prstGeom>
+            <a:solidFill>
+              <a:srgbClr val="7CB9FC"/>
+            </a:solidFill>
+            <a:ln>
+              <a:noFill/>
+            </a:ln>
+            <a:effectLst>
+              <a:outerShdw blurRad="76200" dist="12700" algn="ctr" rotWithShape="0">
+                <a:prstClr val="black">
+                  <a:alpha val="20000"/>
+                </a:prstClr>
+              </a:outerShdw>
+            </a:effectLst>
+          </p:spPr>
+          <p:style>
+            <a:lnRef idx="2">
+              <a:schemeClr val="accent1">
+                <a:shade val="50000"/>
+              </a:schemeClr>
+            </a:lnRef>
+            <a:fillRef idx="1">
+              <a:schemeClr val="accent1"/>
+            </a:fillRef>
+            <a:effectRef idx="0">
+              <a:schemeClr val="accent1"/>
+            </a:effectRef>
+            <a:fontRef idx="minor">
+              <a:schemeClr val="lt1"/>
+            </a:fontRef>
+          </p:style>
+          <p:txBody>
+            <a:bodyPr rtlCol="0" anchor="ctr"/>
+            <a:lstStyle/>
+            <a:p>
+              <a:pPr algn="ctr"/>
+              <a:r>
+                <a:rPr lang="ko-KR" altLang="en-US" sz="2400" dirty="0">
+                  <a:latin typeface="배달의민족 주아" panose="02020603020101020101" pitchFamily="18" charset="-127"/>
+                  <a:ea typeface="배달의민족 주아" panose="02020603020101020101" pitchFamily="18" charset="-127"/>
+                </a:rPr>
+                <a:t>자세히</a:t>
+              </a:r>
+              <a:endParaRPr lang="en-US" altLang="ko-KR" dirty="0">
+                <a:latin typeface="배달의민족 주아" panose="02020603020101020101" pitchFamily="18" charset="-127"/>
+                <a:ea typeface="배달의민족 주아" panose="02020603020101020101" pitchFamily="18" charset="-127"/>
+              </a:endParaRPr>
+            </a:p>
+          </p:txBody>
+        </p:sp>
+        <p:sp>
+          <p:nvSpPr>
+            <p:cNvPr id="41" name="TextBox 40">
+              <a:extLst>
+                <a:ext uri="{FF2B5EF4-FFF2-40B4-BE49-F238E27FC236}">
+                  <a16:creationId xmlns:a16="http://schemas.microsoft.com/office/drawing/2014/main" id="{D0391613-B06D-4215-8796-67B9E800CB94}"/>
+                </a:ext>
+              </a:extLst>
+            </p:cNvPr>
+            <p:cNvSpPr txBox="1"/>
+            <p:nvPr/>
+          </p:nvSpPr>
+          <p:spPr>
+            <a:xfrm>
+              <a:off x="8878727" y="431228"/>
+              <a:ext cx="1149125" cy="646331"/>
+            </a:xfrm>
+            <a:prstGeom prst="rect">
+              <a:avLst/>
+            </a:prstGeom>
+            <a:noFill/>
+          </p:spPr>
+          <p:txBody>
+            <a:bodyPr wrap="square" rtlCol="0">
+              <a:spAutoFit/>
+            </a:bodyPr>
+            <a:lstStyle/>
+            <a:p>
+              <a:r>
+                <a:rPr lang="en-US" altLang="ko-KR" sz="3600" dirty="0">
+                  <a:solidFill>
+                    <a:srgbClr val="00B0F0"/>
+                  </a:solidFill>
+                  <a:latin typeface="배달의민족 주아" panose="02020603020101020101" pitchFamily="18" charset="-127"/>
+                  <a:ea typeface="배달의민족 주아" panose="02020603020101020101" pitchFamily="18" charset="-127"/>
+                </a:rPr>
+                <a:t>SQL</a:t>
+              </a:r>
+              <a:endParaRPr lang="ko-KR" altLang="en-US" sz="2400" dirty="0">
+                <a:solidFill>
+                  <a:srgbClr val="00B0F0"/>
+                </a:solidFill>
+                <a:latin typeface="배달의민족 주아" panose="02020603020101020101" pitchFamily="18" charset="-127"/>
+                <a:ea typeface="배달의민족 주아" panose="02020603020101020101" pitchFamily="18" charset="-127"/>
+              </a:endParaRPr>
+            </a:p>
+          </p:txBody>
+        </p:sp>
+        <p:sp>
+          <p:nvSpPr>
+            <p:cNvPr id="42" name="타원 41">
+              <a:extLst>
+                <a:ext uri="{FF2B5EF4-FFF2-40B4-BE49-F238E27FC236}">
+                  <a16:creationId xmlns:a16="http://schemas.microsoft.com/office/drawing/2014/main" id="{B9E240E7-0925-4787-ACF1-B5BE587B273A}"/>
+                </a:ext>
+              </a:extLst>
+            </p:cNvPr>
+            <p:cNvSpPr/>
+            <p:nvPr/>
+          </p:nvSpPr>
+          <p:spPr>
+            <a:xfrm>
+              <a:off x="8680567" y="1349177"/>
+              <a:ext cx="1412994" cy="1404000"/>
+            </a:xfrm>
+            <a:prstGeom prst="ellipse">
+              <a:avLst/>
+            </a:prstGeom>
+            <a:noFill/>
+            <a:ln w="41275">
+              <a:solidFill>
+                <a:srgbClr val="5291DF"/>
+              </a:solidFill>
+            </a:ln>
+          </p:spPr>
+          <p:style>
+            <a:lnRef idx="2">
+              <a:schemeClr val="accent1">
+                <a:shade val="50000"/>
+              </a:schemeClr>
+            </a:lnRef>
+            <a:fillRef idx="1">
+              <a:schemeClr val="accent1"/>
+            </a:fillRef>
+            <a:effectRef idx="0">
+              <a:schemeClr val="accent1"/>
+            </a:effectRef>
+            <a:fontRef idx="minor">
+              <a:schemeClr val="lt1"/>
+            </a:fontRef>
+          </p:style>
+          <p:txBody>
+            <a:bodyPr rtlCol="0" anchor="ctr"/>
+            <a:lstStyle/>
+            <a:p>
+              <a:pPr algn="ctr"/>
+              <a:endParaRPr lang="ko-KR" altLang="en-US">
+                <a:solidFill>
+                  <a:srgbClr val="9933FF"/>
+                </a:solidFill>
+              </a:endParaRPr>
+            </a:p>
+          </p:txBody>
+        </p:sp>
+        <p:grpSp>
+          <p:nvGrpSpPr>
+            <p:cNvPr id="43" name="그룹 42">
+              <a:extLst>
+                <a:ext uri="{FF2B5EF4-FFF2-40B4-BE49-F238E27FC236}">
+                  <a16:creationId xmlns:a16="http://schemas.microsoft.com/office/drawing/2014/main" id="{2137F70F-1FD6-4390-AC6D-10EA74791378}"/>
+                </a:ext>
+              </a:extLst>
+            </p:cNvPr>
+            <p:cNvGrpSpPr/>
+            <p:nvPr/>
+          </p:nvGrpSpPr>
+          <p:grpSpPr>
+            <a:xfrm>
+              <a:off x="8924000" y="1609684"/>
+              <a:ext cx="918000" cy="934876"/>
+              <a:chOff x="2970158" y="4220083"/>
+              <a:chExt cx="918000" cy="934876"/>
+            </a:xfrm>
+            <a:solidFill>
+              <a:schemeClr val="bg1"/>
+            </a:solidFill>
+          </p:grpSpPr>
           <p:grpSp>
             <p:nvGrpSpPr>
-              <p:cNvPr id="84" name="그룹 83">
+              <p:cNvPr id="49" name="그룹 48">
                 <a:extLst>
                   <a:ext uri="{FF2B5EF4-FFF2-40B4-BE49-F238E27FC236}">
-                    <a16:creationId xmlns:a16="http://schemas.microsoft.com/office/drawing/2014/main" id="{1A2433A1-BE72-444C-9CD8-449F30C4292B}"/>
+                    <a16:creationId xmlns:a16="http://schemas.microsoft.com/office/drawing/2014/main" id="{0E3ECA79-F79D-422B-B530-2F17959E2DE7}"/>
                   </a:ext>
                 </a:extLst>
               </p:cNvPr>
@@ -14092,343 +15834,79 @@
             </p:nvGrpSpPr>
             <p:grpSpPr>
               <a:xfrm>
-                <a:off x="2498277" y="3675273"/>
-                <a:ext cx="918000" cy="934876"/>
-                <a:chOff x="2970158" y="4220083"/>
-                <a:chExt cx="918000" cy="934876"/>
+                <a:off x="2978052" y="4220083"/>
+                <a:ext cx="902212" cy="934876"/>
+                <a:chOff x="2130548" y="3387155"/>
+                <a:chExt cx="1811542" cy="1877126"/>
               </a:xfrm>
+              <a:grpFill/>
             </p:grpSpPr>
-            <p:grpSp>
-              <p:nvGrpSpPr>
-                <p:cNvPr id="63" name="그룹 62">
+            <p:sp>
+              <p:nvSpPr>
+                <p:cNvPr id="51" name="사각형: 둥근 모서리 50">
                   <a:extLst>
                     <a:ext uri="{FF2B5EF4-FFF2-40B4-BE49-F238E27FC236}">
-                      <a16:creationId xmlns:a16="http://schemas.microsoft.com/office/drawing/2014/main" id="{875B4837-79CE-4032-9007-0AE737E9F676}"/>
+                      <a16:creationId xmlns:a16="http://schemas.microsoft.com/office/drawing/2014/main" id="{69D9B656-36A7-4BA9-BF13-B6981A3952D8}"/>
                     </a:ext>
                   </a:extLst>
                 </p:cNvPr>
-                <p:cNvGrpSpPr/>
+                <p:cNvSpPr/>
                 <p:nvPr/>
-              </p:nvGrpSpPr>
-              <p:grpSpPr>
+              </p:nvSpPr>
+              <p:spPr>
                 <a:xfrm>
-                  <a:off x="2978052" y="4220083"/>
-                  <a:ext cx="902212" cy="934876"/>
-                  <a:chOff x="2130548" y="3387157"/>
-                  <a:chExt cx="1811542" cy="1877127"/>
+                  <a:off x="2130548" y="3387155"/>
+                  <a:ext cx="1811542" cy="1877126"/>
                 </a:xfrm>
-              </p:grpSpPr>
-              <p:sp>
-                <p:nvSpPr>
-                  <p:cNvPr id="40" name="사각형: 둥근 모서리 39">
-                    <a:extLst>
-                      <a:ext uri="{FF2B5EF4-FFF2-40B4-BE49-F238E27FC236}">
-                        <a16:creationId xmlns:a16="http://schemas.microsoft.com/office/drawing/2014/main" id="{A5708832-6DC9-4279-B73A-17D68EC60D9F}"/>
-                      </a:ext>
-                    </a:extLst>
-                  </p:cNvPr>
-                  <p:cNvSpPr/>
-                  <p:nvPr/>
-                </p:nvSpPr>
-                <p:spPr>
-                  <a:xfrm>
-                    <a:off x="2130548" y="3387157"/>
-                    <a:ext cx="1811542" cy="1877127"/>
-                  </a:xfrm>
-                  <a:prstGeom prst="roundRect">
-                    <a:avLst>
-                      <a:gd name="adj" fmla="val 7396"/>
-                    </a:avLst>
-                  </a:prstGeom>
+                <a:prstGeom prst="roundRect">
+                  <a:avLst>
+                    <a:gd name="adj" fmla="val 7396"/>
+                  </a:avLst>
+                </a:prstGeom>
+                <a:solidFill>
+                  <a:srgbClr val="83B6E5"/>
+                </a:solidFill>
+                <a:ln>
                   <a:solidFill>
-                    <a:srgbClr val="37AEBB"/>
+                    <a:srgbClr val="541179"/>
                   </a:solidFill>
-                  <a:ln>
+                </a:ln>
+              </p:spPr>
+              <p:style>
+                <a:lnRef idx="2">
+                  <a:schemeClr val="accent1">
+                    <a:shade val="50000"/>
+                  </a:schemeClr>
+                </a:lnRef>
+                <a:fillRef idx="1">
+                  <a:schemeClr val="accent1"/>
+                </a:fillRef>
+                <a:effectRef idx="0">
+                  <a:schemeClr val="accent1"/>
+                </a:effectRef>
+                <a:fontRef idx="minor">
+                  <a:schemeClr val="lt1"/>
+                </a:fontRef>
+              </p:style>
+              <p:txBody>
+                <a:bodyPr rtlCol="0" anchor="ctr"/>
+                <a:lstStyle/>
+                <a:p>
+                  <a:pPr algn="ctr"/>
+                  <a:endParaRPr lang="ko-KR" altLang="en-US">
                     <a:solidFill>
-                      <a:srgbClr val="1F646B"/>
+                      <a:srgbClr val="9933FF"/>
                     </a:solidFill>
-                  </a:ln>
-                </p:spPr>
-                <p:style>
-                  <a:lnRef idx="2">
-                    <a:schemeClr val="accent1">
-                      <a:shade val="50000"/>
-                    </a:schemeClr>
-                  </a:lnRef>
-                  <a:fillRef idx="1">
-                    <a:schemeClr val="accent1"/>
-                  </a:fillRef>
-                  <a:effectRef idx="0">
-                    <a:schemeClr val="accent1"/>
-                  </a:effectRef>
-                  <a:fontRef idx="minor">
-                    <a:schemeClr val="lt1"/>
-                  </a:fontRef>
-                </p:style>
-                <p:txBody>
-                  <a:bodyPr rtlCol="0" anchor="ctr"/>
-                  <a:lstStyle/>
-                  <a:p>
-                    <a:pPr algn="ctr"/>
-                    <a:endParaRPr lang="ko-KR" altLang="en-US"/>
-                  </a:p>
-                </p:txBody>
-              </p:sp>
-              <p:cxnSp>
-                <p:nvCxnSpPr>
-                  <p:cNvPr id="42" name="직선 연결선 41">
-                    <a:extLst>
-                      <a:ext uri="{FF2B5EF4-FFF2-40B4-BE49-F238E27FC236}">
-                        <a16:creationId xmlns:a16="http://schemas.microsoft.com/office/drawing/2014/main" id="{FFCAF9DB-AE7A-4D4B-94EC-109E5DB13660}"/>
-                      </a:ext>
-                    </a:extLst>
-                  </p:cNvPr>
-                  <p:cNvCxnSpPr>
-                    <a:cxnSpLocks/>
-                  </p:cNvCxnSpPr>
-                  <p:nvPr/>
-                </p:nvCxnSpPr>
-                <p:spPr>
-                  <a:xfrm>
-                    <a:off x="2130548" y="3739861"/>
-                    <a:ext cx="1811542" cy="0"/>
-                  </a:xfrm>
-                  <a:prstGeom prst="line">
-                    <a:avLst/>
-                  </a:prstGeom>
-                  <a:ln>
-                    <a:solidFill>
-                      <a:srgbClr val="1F646B"/>
-                    </a:solidFill>
-                  </a:ln>
-                </p:spPr>
-                <p:style>
-                  <a:lnRef idx="1">
-                    <a:schemeClr val="accent1"/>
-                  </a:lnRef>
-                  <a:fillRef idx="0">
-                    <a:schemeClr val="accent1"/>
-                  </a:fillRef>
-                  <a:effectRef idx="0">
-                    <a:schemeClr val="accent1"/>
-                  </a:effectRef>
-                  <a:fontRef idx="minor">
-                    <a:schemeClr val="tx1"/>
-                  </a:fontRef>
-                </p:style>
-              </p:cxnSp>
-              <p:sp>
-                <p:nvSpPr>
-                  <p:cNvPr id="46" name="직사각형 45">
-                    <a:extLst>
-                      <a:ext uri="{FF2B5EF4-FFF2-40B4-BE49-F238E27FC236}">
-                        <a16:creationId xmlns:a16="http://schemas.microsoft.com/office/drawing/2014/main" id="{872D812C-4643-4416-BD49-12AE8A38B2BA}"/>
-                      </a:ext>
-                    </a:extLst>
-                  </p:cNvPr>
-                  <p:cNvSpPr/>
-                  <p:nvPr/>
-                </p:nvSpPr>
-                <p:spPr>
-                  <a:xfrm>
-                    <a:off x="2130548" y="3739861"/>
-                    <a:ext cx="1811542" cy="1523643"/>
-                  </a:xfrm>
-                  <a:prstGeom prst="rect">
-                    <a:avLst/>
-                  </a:prstGeom>
-                  <a:solidFill>
-                    <a:schemeClr val="bg1"/>
-                  </a:solidFill>
-                  <a:ln>
-                    <a:solidFill>
-                      <a:srgbClr val="1F646B"/>
-                    </a:solidFill>
-                  </a:ln>
-                </p:spPr>
-                <p:style>
-                  <a:lnRef idx="2">
-                    <a:schemeClr val="accent1">
-                      <a:shade val="50000"/>
-                    </a:schemeClr>
-                  </a:lnRef>
-                  <a:fillRef idx="1">
-                    <a:schemeClr val="accent1"/>
-                  </a:fillRef>
-                  <a:effectRef idx="0">
-                    <a:schemeClr val="accent1"/>
-                  </a:effectRef>
-                  <a:fontRef idx="minor">
-                    <a:schemeClr val="lt1"/>
-                  </a:fontRef>
-                </p:style>
-                <p:txBody>
-                  <a:bodyPr rtlCol="0" anchor="ctr"/>
-                  <a:lstStyle/>
-                  <a:p>
-                    <a:pPr algn="ctr"/>
-                    <a:endParaRPr lang="ko-KR" altLang="en-US"/>
-                  </a:p>
-                </p:txBody>
-              </p:sp>
-              <p:grpSp>
-                <p:nvGrpSpPr>
-                  <p:cNvPr id="62" name="그룹 61">
-                    <a:extLst>
-                      <a:ext uri="{FF2B5EF4-FFF2-40B4-BE49-F238E27FC236}">
-                        <a16:creationId xmlns:a16="http://schemas.microsoft.com/office/drawing/2014/main" id="{5AC7A8E2-63B0-448B-9D80-3159D902F0B2}"/>
-                      </a:ext>
-                    </a:extLst>
-                  </p:cNvPr>
-                  <p:cNvGrpSpPr/>
-                  <p:nvPr/>
-                </p:nvGrpSpPr>
-                <p:grpSpPr>
-                  <a:xfrm>
-                    <a:off x="2250189" y="3495675"/>
-                    <a:ext cx="232421" cy="162462"/>
-                    <a:chOff x="2263754" y="2695575"/>
-                    <a:chExt cx="412498" cy="288335"/>
-                  </a:xfrm>
-                </p:grpSpPr>
-                <p:cxnSp>
-                  <p:nvCxnSpPr>
-                    <p:cNvPr id="55" name="직선 연결선 54">
-                      <a:extLst>
-                        <a:ext uri="{FF2B5EF4-FFF2-40B4-BE49-F238E27FC236}">
-                          <a16:creationId xmlns:a16="http://schemas.microsoft.com/office/drawing/2014/main" id="{3466E302-61C9-4A76-A6F8-C3F11B46070E}"/>
-                        </a:ext>
-                      </a:extLst>
-                    </p:cNvPr>
-                    <p:cNvCxnSpPr/>
-                    <p:nvPr/>
-                  </p:nvCxnSpPr>
-                  <p:spPr>
-                    <a:xfrm>
-                      <a:off x="2266028" y="2695575"/>
-                      <a:ext cx="145524" cy="145524"/>
-                    </a:xfrm>
-                    <a:prstGeom prst="line">
-                      <a:avLst/>
-                    </a:prstGeom>
-                    <a:ln w="22225" cap="rnd">
-                      <a:solidFill>
-                        <a:srgbClr val="1F646B"/>
-                      </a:solidFill>
-                      <a:round/>
-                    </a:ln>
-                  </p:spPr>
-                  <p:style>
-                    <a:lnRef idx="1">
-                      <a:schemeClr val="accent1"/>
-                    </a:lnRef>
-                    <a:fillRef idx="0">
-                      <a:schemeClr val="accent1"/>
-                    </a:fillRef>
-                    <a:effectRef idx="0">
-                      <a:schemeClr val="accent1"/>
-                    </a:effectRef>
-                    <a:fontRef idx="minor">
-                      <a:schemeClr val="tx1"/>
-                    </a:fontRef>
-                  </p:style>
-                </p:cxnSp>
-                <p:cxnSp>
-                  <p:nvCxnSpPr>
-                    <p:cNvPr id="56" name="직선 연결선 55">
-                      <a:extLst>
-                        <a:ext uri="{FF2B5EF4-FFF2-40B4-BE49-F238E27FC236}">
-                          <a16:creationId xmlns:a16="http://schemas.microsoft.com/office/drawing/2014/main" id="{633DF1EB-444F-405D-B47B-60AB8981C014}"/>
-                        </a:ext>
-                      </a:extLst>
-                    </p:cNvPr>
-                    <p:cNvCxnSpPr>
-                      <a:cxnSpLocks/>
-                    </p:cNvCxnSpPr>
-                    <p:nvPr/>
-                  </p:nvCxnSpPr>
-                  <p:spPr>
-                    <a:xfrm flipV="1">
-                      <a:off x="2263754" y="2850298"/>
-                      <a:ext cx="147798" cy="121182"/>
-                    </a:xfrm>
-                    <a:prstGeom prst="line">
-                      <a:avLst/>
-                    </a:prstGeom>
-                    <a:ln w="22225" cap="rnd">
-                      <a:solidFill>
-                        <a:srgbClr val="1F646B"/>
-                      </a:solidFill>
-                      <a:round/>
-                    </a:ln>
-                  </p:spPr>
-                  <p:style>
-                    <a:lnRef idx="1">
-                      <a:schemeClr val="accent1"/>
-                    </a:lnRef>
-                    <a:fillRef idx="0">
-                      <a:schemeClr val="accent1"/>
-                    </a:fillRef>
-                    <a:effectRef idx="0">
-                      <a:schemeClr val="accent1"/>
-                    </a:effectRef>
-                    <a:fontRef idx="minor">
-                      <a:schemeClr val="tx1"/>
-                    </a:fontRef>
-                  </p:style>
-                </p:cxnSp>
-                <p:cxnSp>
-                  <p:nvCxnSpPr>
-                    <p:cNvPr id="60" name="직선 연결선 59">
-                      <a:extLst>
-                        <a:ext uri="{FF2B5EF4-FFF2-40B4-BE49-F238E27FC236}">
-                          <a16:creationId xmlns:a16="http://schemas.microsoft.com/office/drawing/2014/main" id="{F861C017-82C4-4A20-891D-72E0A3055F9A}"/>
-                        </a:ext>
-                      </a:extLst>
-                    </p:cNvPr>
-                    <p:cNvCxnSpPr>
-                      <a:cxnSpLocks/>
-                    </p:cNvCxnSpPr>
-                    <p:nvPr/>
-                  </p:nvCxnSpPr>
-                  <p:spPr>
-                    <a:xfrm>
-                      <a:off x="2411552" y="2983910"/>
-                      <a:ext cx="264700" cy="0"/>
-                    </a:xfrm>
-                    <a:prstGeom prst="line">
-                      <a:avLst/>
-                    </a:prstGeom>
-                    <a:ln w="22225" cap="rnd">
-                      <a:solidFill>
-                        <a:srgbClr val="1F646B"/>
-                      </a:solidFill>
-                      <a:round/>
-                    </a:ln>
-                  </p:spPr>
-                  <p:style>
-                    <a:lnRef idx="1">
-                      <a:schemeClr val="accent1"/>
-                    </a:lnRef>
-                    <a:fillRef idx="0">
-                      <a:schemeClr val="accent1"/>
-                    </a:fillRef>
-                    <a:effectRef idx="0">
-                      <a:schemeClr val="accent1"/>
-                    </a:effectRef>
-                    <a:fontRef idx="minor">
-                      <a:schemeClr val="tx1"/>
-                    </a:fontRef>
-                  </p:style>
-                </p:cxnSp>
-              </p:grpSp>
-            </p:grpSp>
+                  </a:endParaRPr>
+                </a:p>
+              </p:txBody>
+            </p:sp>
             <p:cxnSp>
               <p:nvCxnSpPr>
-                <p:cNvPr id="74" name="직선 연결선 73">
+                <p:cNvPr id="52" name="직선 연결선 51">
                   <a:extLst>
                     <a:ext uri="{FF2B5EF4-FFF2-40B4-BE49-F238E27FC236}">
-                      <a16:creationId xmlns:a16="http://schemas.microsoft.com/office/drawing/2014/main" id="{E0E277B6-A555-4D51-AB8E-1D67AC80C0EE}"/>
+                      <a16:creationId xmlns:a16="http://schemas.microsoft.com/office/drawing/2014/main" id="{80EB3B06-C6F8-4D5B-B6E0-319ECD7437DF}"/>
                     </a:ext>
                   </a:extLst>
                 </p:cNvPr>
@@ -14439,15 +15917,16 @@
               </p:nvCxnSpPr>
               <p:spPr>
                 <a:xfrm>
-                  <a:off x="2970158" y="5154570"/>
-                  <a:ext cx="918000" cy="0"/>
+                  <a:off x="2130548" y="3739861"/>
+                  <a:ext cx="1811542" cy="0"/>
                 </a:xfrm>
                 <a:prstGeom prst="line">
                   <a:avLst/>
                 </a:prstGeom>
-                <a:ln w="15875">
+                <a:grpFill/>
+                <a:ln>
                   <a:solidFill>
-                    <a:schemeClr val="bg1"/>
+                    <a:srgbClr val="541179"/>
                   </a:solidFill>
                 </a:ln>
               </p:spPr>
@@ -14466,13 +15945,1307 @@
                 </a:fontRef>
               </p:style>
             </p:cxnSp>
+            <p:sp>
+              <p:nvSpPr>
+                <p:cNvPr id="53" name="직사각형 52">
+                  <a:extLst>
+                    <a:ext uri="{FF2B5EF4-FFF2-40B4-BE49-F238E27FC236}">
+                      <a16:creationId xmlns:a16="http://schemas.microsoft.com/office/drawing/2014/main" id="{95337DA6-2FE9-4C2E-9CF6-83CDBDB2D83F}"/>
+                    </a:ext>
+                  </a:extLst>
+                </p:cNvPr>
+                <p:cNvSpPr/>
+                <p:nvPr/>
+              </p:nvSpPr>
+              <p:spPr>
+                <a:xfrm>
+                  <a:off x="2130548" y="3739861"/>
+                  <a:ext cx="1811542" cy="1523643"/>
+                </a:xfrm>
+                <a:prstGeom prst="rect">
+                  <a:avLst/>
+                </a:prstGeom>
+                <a:grpFill/>
+                <a:ln>
+                  <a:solidFill>
+                    <a:srgbClr val="541179"/>
+                  </a:solidFill>
+                </a:ln>
+              </p:spPr>
+              <p:style>
+                <a:lnRef idx="2">
+                  <a:schemeClr val="accent1">
+                    <a:shade val="50000"/>
+                  </a:schemeClr>
+                </a:lnRef>
+                <a:fillRef idx="1">
+                  <a:schemeClr val="accent1"/>
+                </a:fillRef>
+                <a:effectRef idx="0">
+                  <a:schemeClr val="accent1"/>
+                </a:effectRef>
+                <a:fontRef idx="minor">
+                  <a:schemeClr val="lt1"/>
+                </a:fontRef>
+              </p:style>
+              <p:txBody>
+                <a:bodyPr rtlCol="0" anchor="ctr"/>
+                <a:lstStyle/>
+                <a:p>
+                  <a:pPr algn="ctr"/>
+                  <a:endParaRPr lang="ko-KR" altLang="en-US">
+                    <a:solidFill>
+                      <a:srgbClr val="9933FF"/>
+                    </a:solidFill>
+                  </a:endParaRPr>
+                </a:p>
+              </p:txBody>
+            </p:sp>
+          </p:grpSp>
+          <p:cxnSp>
+            <p:nvCxnSpPr>
+              <p:cNvPr id="50" name="직선 연결선 49">
+                <a:extLst>
+                  <a:ext uri="{FF2B5EF4-FFF2-40B4-BE49-F238E27FC236}">
+                    <a16:creationId xmlns:a16="http://schemas.microsoft.com/office/drawing/2014/main" id="{8A683A5A-AEF9-40C3-A690-4BA2505BB7B5}"/>
+                  </a:ext>
+                </a:extLst>
+              </p:cNvPr>
+              <p:cNvCxnSpPr>
+                <a:cxnSpLocks/>
+              </p:cNvCxnSpPr>
+              <p:nvPr/>
+            </p:nvCxnSpPr>
+            <p:spPr>
+              <a:xfrm>
+                <a:off x="2970158" y="5154570"/>
+                <a:ext cx="918000" cy="0"/>
+              </a:xfrm>
+              <a:prstGeom prst="line">
+                <a:avLst/>
+              </a:prstGeom>
+              <a:grpFill/>
+              <a:ln w="15875">
+                <a:solidFill>
+                  <a:schemeClr val="bg1"/>
+                </a:solidFill>
+              </a:ln>
+            </p:spPr>
+            <p:style>
+              <a:lnRef idx="1">
+                <a:schemeClr val="accent1"/>
+              </a:lnRef>
+              <a:fillRef idx="0">
+                <a:schemeClr val="accent1"/>
+              </a:fillRef>
+              <a:effectRef idx="0">
+                <a:schemeClr val="accent1"/>
+              </a:effectRef>
+              <a:fontRef idx="minor">
+                <a:schemeClr val="tx1"/>
+              </a:fontRef>
+            </p:style>
+          </p:cxnSp>
+        </p:grpSp>
+        <p:grpSp>
+          <p:nvGrpSpPr>
+            <p:cNvPr id="77" name="그룹 76">
+              <a:extLst>
+                <a:ext uri="{FF2B5EF4-FFF2-40B4-BE49-F238E27FC236}">
+                  <a16:creationId xmlns:a16="http://schemas.microsoft.com/office/drawing/2014/main" id="{AA48D9F6-6390-4F39-A7E1-8AD1BFCB8DC7}"/>
+                </a:ext>
+              </a:extLst>
+            </p:cNvPr>
+            <p:cNvGrpSpPr/>
+            <p:nvPr/>
+          </p:nvGrpSpPr>
+          <p:grpSpPr>
+            <a:xfrm>
+              <a:off x="8991321" y="1649385"/>
+              <a:ext cx="130051" cy="89268"/>
+              <a:chOff x="5636239" y="1919288"/>
+              <a:chExt cx="114481" cy="78581"/>
+            </a:xfrm>
+          </p:grpSpPr>
+          <p:cxnSp>
+            <p:nvCxnSpPr>
+              <p:cNvPr id="78" name="직선 연결선 77">
+                <a:extLst>
+                  <a:ext uri="{FF2B5EF4-FFF2-40B4-BE49-F238E27FC236}">
+                    <a16:creationId xmlns:a16="http://schemas.microsoft.com/office/drawing/2014/main" id="{5D6E3755-6F0B-45E3-B335-935A0574503E}"/>
+                  </a:ext>
+                </a:extLst>
+              </p:cNvPr>
+              <p:cNvCxnSpPr>
+                <a:cxnSpLocks/>
+              </p:cNvCxnSpPr>
+              <p:nvPr/>
+            </p:nvCxnSpPr>
+            <p:spPr>
+              <a:xfrm>
+                <a:off x="5636419" y="1919288"/>
+                <a:ext cx="48486" cy="43779"/>
+              </a:xfrm>
+              <a:prstGeom prst="line">
+                <a:avLst/>
+              </a:prstGeom>
+              <a:ln w="22225" cap="rnd">
+                <a:solidFill>
+                  <a:srgbClr val="0070C0"/>
+                </a:solidFill>
+                <a:round/>
+              </a:ln>
+            </p:spPr>
+            <p:style>
+              <a:lnRef idx="1">
+                <a:schemeClr val="accent1"/>
+              </a:lnRef>
+              <a:fillRef idx="0">
+                <a:schemeClr val="accent1"/>
+              </a:fillRef>
+              <a:effectRef idx="0">
+                <a:schemeClr val="accent1"/>
+              </a:effectRef>
+              <a:fontRef idx="minor">
+                <a:schemeClr val="tx1"/>
+              </a:fontRef>
+            </p:style>
+          </p:cxnSp>
+          <p:cxnSp>
+            <p:nvCxnSpPr>
+              <p:cNvPr id="79" name="직선 연결선 78">
+                <a:extLst>
+                  <a:ext uri="{FF2B5EF4-FFF2-40B4-BE49-F238E27FC236}">
+                    <a16:creationId xmlns:a16="http://schemas.microsoft.com/office/drawing/2014/main" id="{CF398EB9-7DD2-45FA-81F3-CCA0F5103009}"/>
+                  </a:ext>
+                </a:extLst>
+              </p:cNvPr>
+              <p:cNvCxnSpPr>
+                <a:cxnSpLocks/>
+              </p:cNvCxnSpPr>
+              <p:nvPr/>
+            </p:nvCxnSpPr>
+            <p:spPr>
+              <a:xfrm flipH="1">
+                <a:off x="5636239" y="1963067"/>
+                <a:ext cx="48666" cy="34802"/>
+              </a:xfrm>
+              <a:prstGeom prst="line">
+                <a:avLst/>
+              </a:prstGeom>
+              <a:ln w="22225" cap="rnd">
+                <a:solidFill>
+                  <a:srgbClr val="0070C0"/>
+                </a:solidFill>
+                <a:round/>
+              </a:ln>
+            </p:spPr>
+            <p:style>
+              <a:lnRef idx="1">
+                <a:schemeClr val="accent1"/>
+              </a:lnRef>
+              <a:fillRef idx="0">
+                <a:schemeClr val="accent1"/>
+              </a:fillRef>
+              <a:effectRef idx="0">
+                <a:schemeClr val="accent1"/>
+              </a:effectRef>
+              <a:fontRef idx="minor">
+                <a:schemeClr val="tx1"/>
+              </a:fontRef>
+            </p:style>
+          </p:cxnSp>
+          <p:cxnSp>
+            <p:nvCxnSpPr>
+              <p:cNvPr id="80" name="직선 연결선 79">
+                <a:extLst>
+                  <a:ext uri="{FF2B5EF4-FFF2-40B4-BE49-F238E27FC236}">
+                    <a16:creationId xmlns:a16="http://schemas.microsoft.com/office/drawing/2014/main" id="{FF25B155-432B-44FA-8C78-3239B51B4187}"/>
+                  </a:ext>
+                </a:extLst>
+              </p:cNvPr>
+              <p:cNvCxnSpPr>
+                <a:cxnSpLocks/>
+              </p:cNvCxnSpPr>
+              <p:nvPr/>
+            </p:nvCxnSpPr>
+            <p:spPr>
+              <a:xfrm flipH="1">
+                <a:off x="5684905" y="1997869"/>
+                <a:ext cx="65815" cy="0"/>
+              </a:xfrm>
+              <a:prstGeom prst="line">
+                <a:avLst/>
+              </a:prstGeom>
+              <a:ln w="22225" cap="rnd">
+                <a:solidFill>
+                  <a:srgbClr val="0070C0"/>
+                </a:solidFill>
+                <a:round/>
+              </a:ln>
+            </p:spPr>
+            <p:style>
+              <a:lnRef idx="1">
+                <a:schemeClr val="accent1"/>
+              </a:lnRef>
+              <a:fillRef idx="0">
+                <a:schemeClr val="accent1"/>
+              </a:fillRef>
+              <a:effectRef idx="0">
+                <a:schemeClr val="accent1"/>
+              </a:effectRef>
+              <a:fontRef idx="minor">
+                <a:schemeClr val="tx1"/>
+              </a:fontRef>
+            </p:style>
+          </p:cxnSp>
+        </p:grpSp>
+        <p:grpSp>
+          <p:nvGrpSpPr>
+            <p:cNvPr id="117" name="그룹 116">
+              <a:extLst>
+                <a:ext uri="{FF2B5EF4-FFF2-40B4-BE49-F238E27FC236}">
+                  <a16:creationId xmlns:a16="http://schemas.microsoft.com/office/drawing/2014/main" id="{51C7A4AA-7631-45B8-B2E5-E683279F2F01}"/>
+                </a:ext>
+              </a:extLst>
+            </p:cNvPr>
+            <p:cNvGrpSpPr/>
+            <p:nvPr/>
+          </p:nvGrpSpPr>
+          <p:grpSpPr>
+            <a:xfrm>
+              <a:off x="9081819" y="1946010"/>
+              <a:ext cx="588010" cy="539750"/>
+              <a:chOff x="7029411" y="4984750"/>
+              <a:chExt cx="812839" cy="746126"/>
+            </a:xfrm>
+          </p:grpSpPr>
+          <p:sp>
+            <p:nvSpPr>
+              <p:cNvPr id="95" name="직사각형 94">
+                <a:extLst>
+                  <a:ext uri="{FF2B5EF4-FFF2-40B4-BE49-F238E27FC236}">
+                    <a16:creationId xmlns:a16="http://schemas.microsoft.com/office/drawing/2014/main" id="{C70D2D60-5719-418B-A8B3-3C63CB7019FD}"/>
+                  </a:ext>
+                </a:extLst>
+              </p:cNvPr>
+              <p:cNvSpPr/>
+              <p:nvPr/>
+            </p:nvSpPr>
+            <p:spPr>
+              <a:xfrm>
+                <a:off x="7029514" y="5026024"/>
+                <a:ext cx="812697" cy="639605"/>
+              </a:xfrm>
+              <a:prstGeom prst="rect">
+                <a:avLst/>
+              </a:prstGeom>
+              <a:solidFill>
+                <a:srgbClr val="92B6EF"/>
+              </a:solidFill>
+            </p:spPr>
+            <p:style>
+              <a:lnRef idx="2">
+                <a:schemeClr val="accent1">
+                  <a:shade val="50000"/>
+                </a:schemeClr>
+              </a:lnRef>
+              <a:fillRef idx="1">
+                <a:schemeClr val="accent1"/>
+              </a:fillRef>
+              <a:effectRef idx="0">
+                <a:schemeClr val="accent1"/>
+              </a:effectRef>
+              <a:fontRef idx="minor">
+                <a:schemeClr val="lt1"/>
+              </a:fontRef>
+            </p:style>
+            <p:txBody>
+              <a:bodyPr rtlCol="0" anchor="ctr"/>
+              <a:lstStyle/>
+              <a:p>
+                <a:pPr algn="ctr"/>
+                <a:endParaRPr lang="ko-KR" altLang="en-US"/>
+              </a:p>
+            </p:txBody>
+          </p:sp>
+          <p:sp>
+            <p:nvSpPr>
+              <p:cNvPr id="81" name="타원 80">
+                <a:extLst>
+                  <a:ext uri="{FF2B5EF4-FFF2-40B4-BE49-F238E27FC236}">
+                    <a16:creationId xmlns:a16="http://schemas.microsoft.com/office/drawing/2014/main" id="{978C462F-9427-450A-945A-6CFF03A57BC0}"/>
+                  </a:ext>
+                </a:extLst>
+              </p:cNvPr>
+              <p:cNvSpPr/>
+              <p:nvPr/>
+            </p:nvSpPr>
+            <p:spPr>
+              <a:xfrm>
+                <a:off x="7029450" y="4984750"/>
+                <a:ext cx="812800" cy="82550"/>
+              </a:xfrm>
+              <a:prstGeom prst="ellipse">
+                <a:avLst/>
+              </a:prstGeom>
+              <a:solidFill>
+                <a:schemeClr val="bg1"/>
+              </a:solidFill>
+            </p:spPr>
+            <p:style>
+              <a:lnRef idx="2">
+                <a:schemeClr val="accent1">
+                  <a:shade val="50000"/>
+                </a:schemeClr>
+              </a:lnRef>
+              <a:fillRef idx="1">
+                <a:schemeClr val="accent1"/>
+              </a:fillRef>
+              <a:effectRef idx="0">
+                <a:schemeClr val="accent1"/>
+              </a:effectRef>
+              <a:fontRef idx="minor">
+                <a:schemeClr val="lt1"/>
+              </a:fontRef>
+            </p:style>
+            <p:txBody>
+              <a:bodyPr rtlCol="0" anchor="ctr"/>
+              <a:lstStyle/>
+              <a:p>
+                <a:pPr algn="ctr"/>
+                <a:endParaRPr lang="ko-KR" altLang="en-US"/>
+              </a:p>
+            </p:txBody>
+          </p:sp>
+          <p:cxnSp>
+            <p:nvCxnSpPr>
+              <p:cNvPr id="83" name="직선 연결선 82">
+                <a:extLst>
+                  <a:ext uri="{FF2B5EF4-FFF2-40B4-BE49-F238E27FC236}">
+                    <a16:creationId xmlns:a16="http://schemas.microsoft.com/office/drawing/2014/main" id="{9BBC6A9F-4143-4F3C-8613-8C9E901559C5}"/>
+                  </a:ext>
+                </a:extLst>
+              </p:cNvPr>
+              <p:cNvCxnSpPr>
+                <a:stCxn id="81" idx="6"/>
+              </p:cNvCxnSpPr>
+              <p:nvPr/>
+            </p:nvCxnSpPr>
+            <p:spPr>
+              <a:xfrm>
+                <a:off x="7842250" y="5026025"/>
+                <a:ext cx="0" cy="217488"/>
+              </a:xfrm>
+              <a:prstGeom prst="line">
+                <a:avLst/>
+              </a:prstGeom>
+            </p:spPr>
+            <p:style>
+              <a:lnRef idx="1">
+                <a:schemeClr val="accent1"/>
+              </a:lnRef>
+              <a:fillRef idx="0">
+                <a:schemeClr val="accent1"/>
+              </a:fillRef>
+              <a:effectRef idx="0">
+                <a:schemeClr val="accent1"/>
+              </a:effectRef>
+              <a:fontRef idx="minor">
+                <a:schemeClr val="tx1"/>
+              </a:fontRef>
+            </p:style>
+          </p:cxnSp>
+          <p:cxnSp>
+            <p:nvCxnSpPr>
+              <p:cNvPr id="84" name="직선 연결선 83">
+                <a:extLst>
+                  <a:ext uri="{FF2B5EF4-FFF2-40B4-BE49-F238E27FC236}">
+                    <a16:creationId xmlns:a16="http://schemas.microsoft.com/office/drawing/2014/main" id="{4AAF5394-292C-4B1F-92E8-F8DB51E8C67C}"/>
+                  </a:ext>
+                </a:extLst>
+              </p:cNvPr>
+              <p:cNvCxnSpPr/>
+              <p:nvPr/>
+            </p:nvCxnSpPr>
+            <p:spPr>
+              <a:xfrm>
+                <a:off x="7029450" y="5026025"/>
+                <a:ext cx="0" cy="217488"/>
+              </a:xfrm>
+              <a:prstGeom prst="line">
+                <a:avLst/>
+              </a:prstGeom>
+            </p:spPr>
+            <p:style>
+              <a:lnRef idx="1">
+                <a:schemeClr val="accent1"/>
+              </a:lnRef>
+              <a:fillRef idx="0">
+                <a:schemeClr val="accent1"/>
+              </a:fillRef>
+              <a:effectRef idx="0">
+                <a:schemeClr val="accent1"/>
+              </a:effectRef>
+              <a:fontRef idx="minor">
+                <a:schemeClr val="tx1"/>
+              </a:fontRef>
+            </p:style>
+          </p:cxnSp>
+          <p:sp>
+            <p:nvSpPr>
+              <p:cNvPr id="85" name="원호 84">
+                <a:extLst>
+                  <a:ext uri="{FF2B5EF4-FFF2-40B4-BE49-F238E27FC236}">
+                    <a16:creationId xmlns:a16="http://schemas.microsoft.com/office/drawing/2014/main" id="{B53B48AD-96F1-4473-B991-897BEDC1604B}"/>
+                  </a:ext>
+                </a:extLst>
+              </p:cNvPr>
+              <p:cNvSpPr/>
+              <p:nvPr/>
+            </p:nvSpPr>
+            <p:spPr>
+              <a:xfrm flipV="1">
+                <a:off x="7029450" y="5178266"/>
+                <a:ext cx="812761" cy="130494"/>
+              </a:xfrm>
+              <a:prstGeom prst="arc">
+                <a:avLst>
+                  <a:gd name="adj1" fmla="val 10787115"/>
+                  <a:gd name="adj2" fmla="val 0"/>
+                </a:avLst>
+              </a:prstGeom>
+            </p:spPr>
+            <p:style>
+              <a:lnRef idx="1">
+                <a:schemeClr val="accent1"/>
+              </a:lnRef>
+              <a:fillRef idx="0">
+                <a:schemeClr val="accent1"/>
+              </a:fillRef>
+              <a:effectRef idx="0">
+                <a:schemeClr val="accent1"/>
+              </a:effectRef>
+              <a:fontRef idx="minor">
+                <a:schemeClr val="tx1"/>
+              </a:fontRef>
+            </p:style>
+            <p:txBody>
+              <a:bodyPr rtlCol="0" anchor="ctr"/>
+              <a:lstStyle/>
+              <a:p>
+                <a:pPr algn="ctr"/>
+                <a:endParaRPr lang="ko-KR" altLang="en-US"/>
+              </a:p>
+            </p:txBody>
+          </p:sp>
+          <p:cxnSp>
+            <p:nvCxnSpPr>
+              <p:cNvPr id="87" name="직선 연결선 86">
+                <a:extLst>
+                  <a:ext uri="{FF2B5EF4-FFF2-40B4-BE49-F238E27FC236}">
+                    <a16:creationId xmlns:a16="http://schemas.microsoft.com/office/drawing/2014/main" id="{30514645-A395-4BD5-8B76-39C91E22A3FA}"/>
+                  </a:ext>
+                </a:extLst>
+              </p:cNvPr>
+              <p:cNvCxnSpPr>
+                <a:cxnSpLocks/>
+              </p:cNvCxnSpPr>
+              <p:nvPr/>
+            </p:nvCxnSpPr>
+            <p:spPr>
+              <a:xfrm>
+                <a:off x="7842250" y="5245735"/>
+                <a:ext cx="0" cy="217488"/>
+              </a:xfrm>
+              <a:prstGeom prst="line">
+                <a:avLst/>
+              </a:prstGeom>
+            </p:spPr>
+            <p:style>
+              <a:lnRef idx="1">
+                <a:schemeClr val="accent1"/>
+              </a:lnRef>
+              <a:fillRef idx="0">
+                <a:schemeClr val="accent1"/>
+              </a:fillRef>
+              <a:effectRef idx="0">
+                <a:schemeClr val="accent1"/>
+              </a:effectRef>
+              <a:fontRef idx="minor">
+                <a:schemeClr val="tx1"/>
+              </a:fontRef>
+            </p:style>
+          </p:cxnSp>
+          <p:cxnSp>
+            <p:nvCxnSpPr>
+              <p:cNvPr id="88" name="직선 연결선 87">
+                <a:extLst>
+                  <a:ext uri="{FF2B5EF4-FFF2-40B4-BE49-F238E27FC236}">
+                    <a16:creationId xmlns:a16="http://schemas.microsoft.com/office/drawing/2014/main" id="{04FE7F65-5B9A-469F-8B6F-F81AB2493475}"/>
+                  </a:ext>
+                </a:extLst>
+              </p:cNvPr>
+              <p:cNvCxnSpPr/>
+              <p:nvPr/>
+            </p:nvCxnSpPr>
+            <p:spPr>
+              <a:xfrm>
+                <a:off x="7029450" y="5245735"/>
+                <a:ext cx="0" cy="217488"/>
+              </a:xfrm>
+              <a:prstGeom prst="line">
+                <a:avLst/>
+              </a:prstGeom>
+            </p:spPr>
+            <p:style>
+              <a:lnRef idx="1">
+                <a:schemeClr val="accent1"/>
+              </a:lnRef>
+              <a:fillRef idx="0">
+                <a:schemeClr val="accent1"/>
+              </a:fillRef>
+              <a:effectRef idx="0">
+                <a:schemeClr val="accent1"/>
+              </a:effectRef>
+              <a:fontRef idx="minor">
+                <a:schemeClr val="tx1"/>
+              </a:fontRef>
+            </p:style>
+          </p:cxnSp>
+          <p:sp>
+            <p:nvSpPr>
+              <p:cNvPr id="89" name="원호 88">
+                <a:extLst>
+                  <a:ext uri="{FF2B5EF4-FFF2-40B4-BE49-F238E27FC236}">
+                    <a16:creationId xmlns:a16="http://schemas.microsoft.com/office/drawing/2014/main" id="{F05EEA1D-27B3-4CE2-8F4F-128B2C9323F2}"/>
+                  </a:ext>
+                </a:extLst>
+              </p:cNvPr>
+              <p:cNvSpPr/>
+              <p:nvPr/>
+            </p:nvSpPr>
+            <p:spPr>
+              <a:xfrm flipV="1">
+                <a:off x="7029450" y="5397976"/>
+                <a:ext cx="812761" cy="130494"/>
+              </a:xfrm>
+              <a:prstGeom prst="arc">
+                <a:avLst>
+                  <a:gd name="adj1" fmla="val 10787115"/>
+                  <a:gd name="adj2" fmla="val 0"/>
+                </a:avLst>
+              </a:prstGeom>
+            </p:spPr>
+            <p:style>
+              <a:lnRef idx="1">
+                <a:schemeClr val="accent1"/>
+              </a:lnRef>
+              <a:fillRef idx="0">
+                <a:schemeClr val="accent1"/>
+              </a:fillRef>
+              <a:effectRef idx="0">
+                <a:schemeClr val="accent1"/>
+              </a:effectRef>
+              <a:fontRef idx="minor">
+                <a:schemeClr val="tx1"/>
+              </a:fontRef>
+            </p:style>
+            <p:txBody>
+              <a:bodyPr rtlCol="0" anchor="ctr"/>
+              <a:lstStyle/>
+              <a:p>
+                <a:pPr algn="ctr"/>
+                <a:endParaRPr lang="ko-KR" altLang="en-US"/>
+              </a:p>
+            </p:txBody>
+          </p:sp>
+          <p:cxnSp>
+            <p:nvCxnSpPr>
+              <p:cNvPr id="91" name="직선 연결선 90">
+                <a:extLst>
+                  <a:ext uri="{FF2B5EF4-FFF2-40B4-BE49-F238E27FC236}">
+                    <a16:creationId xmlns:a16="http://schemas.microsoft.com/office/drawing/2014/main" id="{4ACC8DBE-C5A6-470F-80E8-33E5C5DE03EA}"/>
+                  </a:ext>
+                </a:extLst>
+              </p:cNvPr>
+              <p:cNvCxnSpPr>
+                <a:cxnSpLocks/>
+              </p:cNvCxnSpPr>
+              <p:nvPr/>
+            </p:nvCxnSpPr>
+            <p:spPr>
+              <a:xfrm>
+                <a:off x="7842250" y="5448141"/>
+                <a:ext cx="0" cy="217488"/>
+              </a:xfrm>
+              <a:prstGeom prst="line">
+                <a:avLst/>
+              </a:prstGeom>
+            </p:spPr>
+            <p:style>
+              <a:lnRef idx="1">
+                <a:schemeClr val="accent1"/>
+              </a:lnRef>
+              <a:fillRef idx="0">
+                <a:schemeClr val="accent1"/>
+              </a:fillRef>
+              <a:effectRef idx="0">
+                <a:schemeClr val="accent1"/>
+              </a:effectRef>
+              <a:fontRef idx="minor">
+                <a:schemeClr val="tx1"/>
+              </a:fontRef>
+            </p:style>
+          </p:cxnSp>
+          <p:cxnSp>
+            <p:nvCxnSpPr>
+              <p:cNvPr id="92" name="직선 연결선 91">
+                <a:extLst>
+                  <a:ext uri="{FF2B5EF4-FFF2-40B4-BE49-F238E27FC236}">
+                    <a16:creationId xmlns:a16="http://schemas.microsoft.com/office/drawing/2014/main" id="{FD191FD8-56B1-4F30-9AF8-9BB6B32F539D}"/>
+                  </a:ext>
+                </a:extLst>
+              </p:cNvPr>
+              <p:cNvCxnSpPr/>
+              <p:nvPr/>
+            </p:nvCxnSpPr>
+            <p:spPr>
+              <a:xfrm>
+                <a:off x="7029450" y="5448141"/>
+                <a:ext cx="0" cy="217488"/>
+              </a:xfrm>
+              <a:prstGeom prst="line">
+                <a:avLst/>
+              </a:prstGeom>
+            </p:spPr>
+            <p:style>
+              <a:lnRef idx="1">
+                <a:schemeClr val="accent1"/>
+              </a:lnRef>
+              <a:fillRef idx="0">
+                <a:schemeClr val="accent1"/>
+              </a:fillRef>
+              <a:effectRef idx="0">
+                <a:schemeClr val="accent1"/>
+              </a:effectRef>
+              <a:fontRef idx="minor">
+                <a:schemeClr val="tx1"/>
+              </a:fontRef>
+            </p:style>
+          </p:cxnSp>
+          <p:sp>
+            <p:nvSpPr>
+              <p:cNvPr id="93" name="원호 92">
+                <a:extLst>
+                  <a:ext uri="{FF2B5EF4-FFF2-40B4-BE49-F238E27FC236}">
+                    <a16:creationId xmlns:a16="http://schemas.microsoft.com/office/drawing/2014/main" id="{DCACBAD6-5385-407A-B4A1-28FB9D409F23}"/>
+                  </a:ext>
+                </a:extLst>
+              </p:cNvPr>
+              <p:cNvSpPr/>
+              <p:nvPr/>
+            </p:nvSpPr>
+            <p:spPr>
+              <a:xfrm flipV="1">
+                <a:off x="7029450" y="5600382"/>
+                <a:ext cx="812761" cy="130494"/>
+              </a:xfrm>
+              <a:prstGeom prst="arc">
+                <a:avLst>
+                  <a:gd name="adj1" fmla="val 10787115"/>
+                  <a:gd name="adj2" fmla="val 0"/>
+                </a:avLst>
+              </a:prstGeom>
+            </p:spPr>
+            <p:style>
+              <a:lnRef idx="1">
+                <a:schemeClr val="accent1"/>
+              </a:lnRef>
+              <a:fillRef idx="0">
+                <a:schemeClr val="accent1"/>
+              </a:fillRef>
+              <a:effectRef idx="0">
+                <a:schemeClr val="accent1"/>
+              </a:effectRef>
+              <a:fontRef idx="minor">
+                <a:schemeClr val="tx1"/>
+              </a:fontRef>
+            </p:style>
+            <p:txBody>
+              <a:bodyPr rtlCol="0" anchor="ctr"/>
+              <a:lstStyle/>
+              <a:p>
+                <a:pPr algn="ctr"/>
+                <a:endParaRPr lang="ko-KR" altLang="en-US"/>
+              </a:p>
+            </p:txBody>
+          </p:sp>
+          <p:sp>
+            <p:nvSpPr>
+              <p:cNvPr id="98" name="타원 97">
+                <a:extLst>
+                  <a:ext uri="{FF2B5EF4-FFF2-40B4-BE49-F238E27FC236}">
+                    <a16:creationId xmlns:a16="http://schemas.microsoft.com/office/drawing/2014/main" id="{7AC120CD-15F3-4C6B-BA3C-9A4D949B4DE1}"/>
+                  </a:ext>
+                </a:extLst>
+              </p:cNvPr>
+              <p:cNvSpPr/>
+              <p:nvPr/>
+            </p:nvSpPr>
+            <p:spPr>
+              <a:xfrm>
+                <a:off x="7029411" y="5594944"/>
+                <a:ext cx="812800" cy="126724"/>
+              </a:xfrm>
+              <a:prstGeom prst="ellipse">
+                <a:avLst/>
+              </a:prstGeom>
+              <a:solidFill>
+                <a:srgbClr val="92B6EF"/>
+              </a:solidFill>
+              <a:ln>
+                <a:noFill/>
+              </a:ln>
+            </p:spPr>
+            <p:style>
+              <a:lnRef idx="2">
+                <a:schemeClr val="accent1">
+                  <a:shade val="50000"/>
+                </a:schemeClr>
+              </a:lnRef>
+              <a:fillRef idx="1">
+                <a:schemeClr val="accent1"/>
+              </a:fillRef>
+              <a:effectRef idx="0">
+                <a:schemeClr val="accent1"/>
+              </a:effectRef>
+              <a:fontRef idx="minor">
+                <a:schemeClr val="lt1"/>
+              </a:fontRef>
+            </p:style>
+            <p:txBody>
+              <a:bodyPr rtlCol="0" anchor="ctr"/>
+              <a:lstStyle/>
+              <a:p>
+                <a:pPr algn="ctr"/>
+                <a:endParaRPr lang="ko-KR" altLang="en-US"/>
+              </a:p>
+            </p:txBody>
+          </p:sp>
+          <p:cxnSp>
+            <p:nvCxnSpPr>
+              <p:cNvPr id="102" name="직선 연결선 101">
+                <a:extLst>
+                  <a:ext uri="{FF2B5EF4-FFF2-40B4-BE49-F238E27FC236}">
+                    <a16:creationId xmlns:a16="http://schemas.microsoft.com/office/drawing/2014/main" id="{6A418CCE-743B-47A0-BCE1-ABE9143117D7}"/>
+                  </a:ext>
+                </a:extLst>
+              </p:cNvPr>
+              <p:cNvCxnSpPr>
+                <a:cxnSpLocks/>
+              </p:cNvCxnSpPr>
+              <p:nvPr/>
+            </p:nvCxnSpPr>
+            <p:spPr>
+              <a:xfrm>
+                <a:off x="7070726" y="5308124"/>
+                <a:ext cx="0" cy="137478"/>
+              </a:xfrm>
+              <a:prstGeom prst="line">
+                <a:avLst/>
+              </a:prstGeom>
+              <a:ln w="34925" cap="rnd">
+                <a:solidFill>
+                  <a:schemeClr val="bg1"/>
+                </a:solidFill>
+                <a:round/>
+              </a:ln>
+            </p:spPr>
+            <p:style>
+              <a:lnRef idx="1">
+                <a:schemeClr val="accent1"/>
+              </a:lnRef>
+              <a:fillRef idx="0">
+                <a:schemeClr val="accent1"/>
+              </a:fillRef>
+              <a:effectRef idx="0">
+                <a:schemeClr val="accent1"/>
+              </a:effectRef>
+              <a:fontRef idx="minor">
+                <a:schemeClr val="tx1"/>
+              </a:fontRef>
+            </p:style>
+          </p:cxnSp>
+          <p:cxnSp>
+            <p:nvCxnSpPr>
+              <p:cNvPr id="106" name="직선 연결선 105">
+                <a:extLst>
+                  <a:ext uri="{FF2B5EF4-FFF2-40B4-BE49-F238E27FC236}">
+                    <a16:creationId xmlns:a16="http://schemas.microsoft.com/office/drawing/2014/main" id="{94A7CCB9-CB30-4D81-86F8-89A53E2B2D27}"/>
+                  </a:ext>
+                </a:extLst>
+              </p:cNvPr>
+              <p:cNvCxnSpPr>
+                <a:cxnSpLocks/>
+              </p:cNvCxnSpPr>
+              <p:nvPr/>
+            </p:nvCxnSpPr>
+            <p:spPr>
+              <a:xfrm>
+                <a:off x="7076283" y="5082699"/>
+                <a:ext cx="0" cy="137478"/>
+              </a:xfrm>
+              <a:prstGeom prst="line">
+                <a:avLst/>
+              </a:prstGeom>
+              <a:ln w="34925" cap="rnd">
+                <a:solidFill>
+                  <a:schemeClr val="bg1"/>
+                </a:solidFill>
+                <a:round/>
+              </a:ln>
+            </p:spPr>
+            <p:style>
+              <a:lnRef idx="1">
+                <a:schemeClr val="accent1"/>
+              </a:lnRef>
+              <a:fillRef idx="0">
+                <a:schemeClr val="accent1"/>
+              </a:fillRef>
+              <a:effectRef idx="0">
+                <a:schemeClr val="accent1"/>
+              </a:effectRef>
+              <a:fontRef idx="minor">
+                <a:schemeClr val="tx1"/>
+              </a:fontRef>
+            </p:style>
+          </p:cxnSp>
+          <p:cxnSp>
+            <p:nvCxnSpPr>
+              <p:cNvPr id="107" name="직선 연결선 106">
+                <a:extLst>
+                  <a:ext uri="{FF2B5EF4-FFF2-40B4-BE49-F238E27FC236}">
+                    <a16:creationId xmlns:a16="http://schemas.microsoft.com/office/drawing/2014/main" id="{0863F527-C0AD-44FE-BF07-7B9E0EFD878A}"/>
+                  </a:ext>
+                </a:extLst>
+              </p:cNvPr>
+              <p:cNvCxnSpPr>
+                <a:cxnSpLocks/>
+              </p:cNvCxnSpPr>
+              <p:nvPr/>
+            </p:nvCxnSpPr>
+            <p:spPr>
+              <a:xfrm>
+                <a:off x="7070726" y="5520828"/>
+                <a:ext cx="0" cy="137478"/>
+              </a:xfrm>
+              <a:prstGeom prst="line">
+                <a:avLst/>
+              </a:prstGeom>
+              <a:ln w="34925" cap="rnd">
+                <a:solidFill>
+                  <a:schemeClr val="bg1"/>
+                </a:solidFill>
+                <a:round/>
+              </a:ln>
+            </p:spPr>
+            <p:style>
+              <a:lnRef idx="1">
+                <a:schemeClr val="accent1"/>
+              </a:lnRef>
+              <a:fillRef idx="0">
+                <a:schemeClr val="accent1"/>
+              </a:fillRef>
+              <a:effectRef idx="0">
+                <a:schemeClr val="accent1"/>
+              </a:effectRef>
+              <a:fontRef idx="minor">
+                <a:schemeClr val="tx1"/>
+              </a:fontRef>
+            </p:style>
+          </p:cxnSp>
+          <p:grpSp>
+            <p:nvGrpSpPr>
+              <p:cNvPr id="110" name="그룹 109">
+                <a:extLst>
+                  <a:ext uri="{FF2B5EF4-FFF2-40B4-BE49-F238E27FC236}">
+                    <a16:creationId xmlns:a16="http://schemas.microsoft.com/office/drawing/2014/main" id="{E8EBD54C-7129-4E69-BCEF-AC1788765B63}"/>
+                  </a:ext>
+                </a:extLst>
+              </p:cNvPr>
+              <p:cNvGrpSpPr/>
+              <p:nvPr/>
+            </p:nvGrpSpPr>
+            <p:grpSpPr>
+              <a:xfrm>
+                <a:off x="7123053" y="5079602"/>
+                <a:ext cx="69841" cy="159809"/>
+                <a:chOff x="7123053" y="5079602"/>
+                <a:chExt cx="69841" cy="159809"/>
+              </a:xfrm>
+            </p:grpSpPr>
+            <p:sp>
+              <p:nvSpPr>
+                <p:cNvPr id="108" name="타원 107">
+                  <a:extLst>
+                    <a:ext uri="{FF2B5EF4-FFF2-40B4-BE49-F238E27FC236}">
+                      <a16:creationId xmlns:a16="http://schemas.microsoft.com/office/drawing/2014/main" id="{5890148C-F3E5-4C73-9252-388EF5BC37BF}"/>
+                    </a:ext>
+                  </a:extLst>
+                </p:cNvPr>
+                <p:cNvSpPr/>
+                <p:nvPr/>
+              </p:nvSpPr>
+              <p:spPr>
+                <a:xfrm>
+                  <a:off x="7123053" y="5079602"/>
+                  <a:ext cx="69841" cy="57943"/>
+                </a:xfrm>
+                <a:prstGeom prst="ellipse">
+                  <a:avLst/>
+                </a:prstGeom>
+                <a:solidFill>
+                  <a:schemeClr val="bg1"/>
+                </a:solidFill>
+                <a:ln>
+                  <a:noFill/>
+                </a:ln>
+              </p:spPr>
+              <p:style>
+                <a:lnRef idx="2">
+                  <a:schemeClr val="accent1">
+                    <a:shade val="50000"/>
+                  </a:schemeClr>
+                </a:lnRef>
+                <a:fillRef idx="1">
+                  <a:schemeClr val="accent1"/>
+                </a:fillRef>
+                <a:effectRef idx="0">
+                  <a:schemeClr val="accent1"/>
+                </a:effectRef>
+                <a:fontRef idx="minor">
+                  <a:schemeClr val="lt1"/>
+                </a:fontRef>
+              </p:style>
+              <p:txBody>
+                <a:bodyPr rtlCol="0" anchor="ctr"/>
+                <a:lstStyle/>
+                <a:p>
+                  <a:pPr algn="ctr"/>
+                  <a:endParaRPr lang="ko-KR" altLang="en-US"/>
+                </a:p>
+              </p:txBody>
+            </p:sp>
+            <p:sp>
+              <p:nvSpPr>
+                <p:cNvPr id="109" name="타원 108">
+                  <a:extLst>
+                    <a:ext uri="{FF2B5EF4-FFF2-40B4-BE49-F238E27FC236}">
+                      <a16:creationId xmlns:a16="http://schemas.microsoft.com/office/drawing/2014/main" id="{8B3D3382-F0D8-472B-8075-F21799E46937}"/>
+                    </a:ext>
+                  </a:extLst>
+                </p:cNvPr>
+                <p:cNvSpPr/>
+                <p:nvPr/>
+              </p:nvSpPr>
+              <p:spPr>
+                <a:xfrm>
+                  <a:off x="7123053" y="5181468"/>
+                  <a:ext cx="69841" cy="57943"/>
+                </a:xfrm>
+                <a:prstGeom prst="ellipse">
+                  <a:avLst/>
+                </a:prstGeom>
+                <a:solidFill>
+                  <a:schemeClr val="bg1"/>
+                </a:solidFill>
+                <a:ln>
+                  <a:noFill/>
+                </a:ln>
+              </p:spPr>
+              <p:style>
+                <a:lnRef idx="2">
+                  <a:schemeClr val="accent1">
+                    <a:shade val="50000"/>
+                  </a:schemeClr>
+                </a:lnRef>
+                <a:fillRef idx="1">
+                  <a:schemeClr val="accent1"/>
+                </a:fillRef>
+                <a:effectRef idx="0">
+                  <a:schemeClr val="accent1"/>
+                </a:effectRef>
+                <a:fontRef idx="minor">
+                  <a:schemeClr val="lt1"/>
+                </a:fontRef>
+              </p:style>
+              <p:txBody>
+                <a:bodyPr rtlCol="0" anchor="ctr"/>
+                <a:lstStyle/>
+                <a:p>
+                  <a:pPr algn="ctr"/>
+                  <a:endParaRPr lang="ko-KR" altLang="en-US"/>
+                </a:p>
+              </p:txBody>
+            </p:sp>
+          </p:grpSp>
+          <p:grpSp>
+            <p:nvGrpSpPr>
+              <p:cNvPr id="111" name="그룹 110">
+                <a:extLst>
+                  <a:ext uri="{FF2B5EF4-FFF2-40B4-BE49-F238E27FC236}">
+                    <a16:creationId xmlns:a16="http://schemas.microsoft.com/office/drawing/2014/main" id="{C4A14C03-4C0F-45C0-8F84-E85D105822F7}"/>
+                  </a:ext>
+                </a:extLst>
+              </p:cNvPr>
+              <p:cNvGrpSpPr/>
+              <p:nvPr/>
+            </p:nvGrpSpPr>
+            <p:grpSpPr>
+              <a:xfrm>
+                <a:off x="7123053" y="5318070"/>
+                <a:ext cx="69841" cy="159809"/>
+                <a:chOff x="7123053" y="5079602"/>
+                <a:chExt cx="69841" cy="159809"/>
+              </a:xfrm>
+            </p:grpSpPr>
+            <p:sp>
+              <p:nvSpPr>
+                <p:cNvPr id="112" name="타원 111">
+                  <a:extLst>
+                    <a:ext uri="{FF2B5EF4-FFF2-40B4-BE49-F238E27FC236}">
+                      <a16:creationId xmlns:a16="http://schemas.microsoft.com/office/drawing/2014/main" id="{42375F0A-2AFC-49D7-BAE0-504C192F25BE}"/>
+                    </a:ext>
+                  </a:extLst>
+                </p:cNvPr>
+                <p:cNvSpPr/>
+                <p:nvPr/>
+              </p:nvSpPr>
+              <p:spPr>
+                <a:xfrm>
+                  <a:off x="7123053" y="5079602"/>
+                  <a:ext cx="69841" cy="57943"/>
+                </a:xfrm>
+                <a:prstGeom prst="ellipse">
+                  <a:avLst/>
+                </a:prstGeom>
+                <a:solidFill>
+                  <a:schemeClr val="bg1"/>
+                </a:solidFill>
+                <a:ln>
+                  <a:noFill/>
+                </a:ln>
+              </p:spPr>
+              <p:style>
+                <a:lnRef idx="2">
+                  <a:schemeClr val="accent1">
+                    <a:shade val="50000"/>
+                  </a:schemeClr>
+                </a:lnRef>
+                <a:fillRef idx="1">
+                  <a:schemeClr val="accent1"/>
+                </a:fillRef>
+                <a:effectRef idx="0">
+                  <a:schemeClr val="accent1"/>
+                </a:effectRef>
+                <a:fontRef idx="minor">
+                  <a:schemeClr val="lt1"/>
+                </a:fontRef>
+              </p:style>
+              <p:txBody>
+                <a:bodyPr rtlCol="0" anchor="ctr"/>
+                <a:lstStyle/>
+                <a:p>
+                  <a:pPr algn="ctr"/>
+                  <a:endParaRPr lang="ko-KR" altLang="en-US"/>
+                </a:p>
+              </p:txBody>
+            </p:sp>
+            <p:sp>
+              <p:nvSpPr>
+                <p:cNvPr id="113" name="타원 112">
+                  <a:extLst>
+                    <a:ext uri="{FF2B5EF4-FFF2-40B4-BE49-F238E27FC236}">
+                      <a16:creationId xmlns:a16="http://schemas.microsoft.com/office/drawing/2014/main" id="{C1D2E334-1AE4-4D9B-A3CD-A8021F06D53E}"/>
+                    </a:ext>
+                  </a:extLst>
+                </p:cNvPr>
+                <p:cNvSpPr/>
+                <p:nvPr/>
+              </p:nvSpPr>
+              <p:spPr>
+                <a:xfrm>
+                  <a:off x="7123053" y="5181468"/>
+                  <a:ext cx="69841" cy="57943"/>
+                </a:xfrm>
+                <a:prstGeom prst="ellipse">
+                  <a:avLst/>
+                </a:prstGeom>
+                <a:solidFill>
+                  <a:schemeClr val="bg1"/>
+                </a:solidFill>
+                <a:ln>
+                  <a:noFill/>
+                </a:ln>
+              </p:spPr>
+              <p:style>
+                <a:lnRef idx="2">
+                  <a:schemeClr val="accent1">
+                    <a:shade val="50000"/>
+                  </a:schemeClr>
+                </a:lnRef>
+                <a:fillRef idx="1">
+                  <a:schemeClr val="accent1"/>
+                </a:fillRef>
+                <a:effectRef idx="0">
+                  <a:schemeClr val="accent1"/>
+                </a:effectRef>
+                <a:fontRef idx="minor">
+                  <a:schemeClr val="lt1"/>
+                </a:fontRef>
+              </p:style>
+              <p:txBody>
+                <a:bodyPr rtlCol="0" anchor="ctr"/>
+                <a:lstStyle/>
+                <a:p>
+                  <a:pPr algn="ctr"/>
+                  <a:endParaRPr lang="ko-KR" altLang="en-US"/>
+                </a:p>
+              </p:txBody>
+            </p:sp>
+          </p:grpSp>
+          <p:grpSp>
+            <p:nvGrpSpPr>
+              <p:cNvPr id="114" name="그룹 113">
+                <a:extLst>
+                  <a:ext uri="{FF2B5EF4-FFF2-40B4-BE49-F238E27FC236}">
+                    <a16:creationId xmlns:a16="http://schemas.microsoft.com/office/drawing/2014/main" id="{5A2CD1BD-68E4-4B4D-8E4F-88F2B1F4D540}"/>
+                  </a:ext>
+                </a:extLst>
+              </p:cNvPr>
+              <p:cNvGrpSpPr/>
+              <p:nvPr/>
+            </p:nvGrpSpPr>
+            <p:grpSpPr>
+              <a:xfrm>
+                <a:off x="7123053" y="5527780"/>
+                <a:ext cx="69841" cy="159809"/>
+                <a:chOff x="7123053" y="5079602"/>
+                <a:chExt cx="69841" cy="159809"/>
+              </a:xfrm>
+            </p:grpSpPr>
+            <p:sp>
+              <p:nvSpPr>
+                <p:cNvPr id="115" name="타원 114">
+                  <a:extLst>
+                    <a:ext uri="{FF2B5EF4-FFF2-40B4-BE49-F238E27FC236}">
+                      <a16:creationId xmlns:a16="http://schemas.microsoft.com/office/drawing/2014/main" id="{6B4CAF1A-211F-4604-BEB6-AB27A95CC75D}"/>
+                    </a:ext>
+                  </a:extLst>
+                </p:cNvPr>
+                <p:cNvSpPr/>
+                <p:nvPr/>
+              </p:nvSpPr>
+              <p:spPr>
+                <a:xfrm>
+                  <a:off x="7123053" y="5079602"/>
+                  <a:ext cx="69841" cy="57943"/>
+                </a:xfrm>
+                <a:prstGeom prst="ellipse">
+                  <a:avLst/>
+                </a:prstGeom>
+                <a:solidFill>
+                  <a:schemeClr val="bg1"/>
+                </a:solidFill>
+                <a:ln>
+                  <a:noFill/>
+                </a:ln>
+              </p:spPr>
+              <p:style>
+                <a:lnRef idx="2">
+                  <a:schemeClr val="accent1">
+                    <a:shade val="50000"/>
+                  </a:schemeClr>
+                </a:lnRef>
+                <a:fillRef idx="1">
+                  <a:schemeClr val="accent1"/>
+                </a:fillRef>
+                <a:effectRef idx="0">
+                  <a:schemeClr val="accent1"/>
+                </a:effectRef>
+                <a:fontRef idx="minor">
+                  <a:schemeClr val="lt1"/>
+                </a:fontRef>
+              </p:style>
+              <p:txBody>
+                <a:bodyPr rtlCol="0" anchor="ctr"/>
+                <a:lstStyle/>
+                <a:p>
+                  <a:pPr algn="ctr"/>
+                  <a:endParaRPr lang="ko-KR" altLang="en-US"/>
+                </a:p>
+              </p:txBody>
+            </p:sp>
+            <p:sp>
+              <p:nvSpPr>
+                <p:cNvPr id="116" name="타원 115">
+                  <a:extLst>
+                    <a:ext uri="{FF2B5EF4-FFF2-40B4-BE49-F238E27FC236}">
+                      <a16:creationId xmlns:a16="http://schemas.microsoft.com/office/drawing/2014/main" id="{BB455159-30EC-46D0-8CF0-5CA27012A531}"/>
+                    </a:ext>
+                  </a:extLst>
+                </p:cNvPr>
+                <p:cNvSpPr/>
+                <p:nvPr/>
+              </p:nvSpPr>
+              <p:spPr>
+                <a:xfrm>
+                  <a:off x="7123053" y="5181468"/>
+                  <a:ext cx="69841" cy="57943"/>
+                </a:xfrm>
+                <a:prstGeom prst="ellipse">
+                  <a:avLst/>
+                </a:prstGeom>
+                <a:solidFill>
+                  <a:schemeClr val="bg1"/>
+                </a:solidFill>
+                <a:ln>
+                  <a:noFill/>
+                </a:ln>
+              </p:spPr>
+              <p:style>
+                <a:lnRef idx="2">
+                  <a:schemeClr val="accent1">
+                    <a:shade val="50000"/>
+                  </a:schemeClr>
+                </a:lnRef>
+                <a:fillRef idx="1">
+                  <a:schemeClr val="accent1"/>
+                </a:fillRef>
+                <a:effectRef idx="0">
+                  <a:schemeClr val="accent1"/>
+                </a:effectRef>
+                <a:fontRef idx="minor">
+                  <a:schemeClr val="lt1"/>
+                </a:fontRef>
+              </p:style>
+              <p:txBody>
+                <a:bodyPr rtlCol="0" anchor="ctr"/>
+                <a:lstStyle/>
+                <a:p>
+                  <a:pPr algn="ctr"/>
+                  <a:endParaRPr lang="ko-KR" altLang="en-US"/>
+                </a:p>
+              </p:txBody>
+            </p:sp>
           </p:grpSp>
         </p:grpSp>
       </p:grpSp>
     </p:spTree>
     <p:extLst>
       <p:ext uri="{BB962C8B-B14F-4D97-AF65-F5344CB8AC3E}">
-        <p14:creationId xmlns:p14="http://schemas.microsoft.com/office/powerpoint/2010/main" val="2618606824"/>
+        <p14:creationId xmlns:p14="http://schemas.microsoft.com/office/powerpoint/2010/main" val="1383628516"/>
       </p:ext>
     </p:extLst>
   </p:cSld>

</xml_diff>